<commit_message>
220622 SW: docker study update
</commit_message>
<xml_diff>
--- a/markdown_image.pptx
+++ b/markdown_image.pptx
@@ -104,6 +104,11 @@
       </a:defRPr>
     </a:lvl9pPr>
   </p:defaultTextStyle>
+  <p:extLst>
+    <p:ext uri="{EFAFB233-063F-42B5-8137-9DF3F51BA10A}">
+      <p15:sldGuideLst xmlns:p15="http://schemas.microsoft.com/office/powerpoint/2012/main"/>
+    </p:ext>
+  </p:extLst>
 </p:presentation>
 </file>
 
@@ -238,7 +243,7 @@
           <a:p>
             <a:fld id="{0CB960C3-B77A-4865-944D-F41BAAC8ADB3}" type="datetimeFigureOut">
               <a:rPr lang="ko-KR" altLang="en-US" smtClean="0"/>
-              <a:t>2022-06-18</a:t>
+              <a:t>2022-06-22</a:t>
             </a:fld>
             <a:endParaRPr lang="ko-KR" altLang="en-US"/>
           </a:p>
@@ -408,7 +413,7 @@
           <a:p>
             <a:fld id="{0CB960C3-B77A-4865-944D-F41BAAC8ADB3}" type="datetimeFigureOut">
               <a:rPr lang="ko-KR" altLang="en-US" smtClean="0"/>
-              <a:t>2022-06-18</a:t>
+              <a:t>2022-06-22</a:t>
             </a:fld>
             <a:endParaRPr lang="ko-KR" altLang="en-US"/>
           </a:p>
@@ -588,7 +593,7 @@
           <a:p>
             <a:fld id="{0CB960C3-B77A-4865-944D-F41BAAC8ADB3}" type="datetimeFigureOut">
               <a:rPr lang="ko-KR" altLang="en-US" smtClean="0"/>
-              <a:t>2022-06-18</a:t>
+              <a:t>2022-06-22</a:t>
             </a:fld>
             <a:endParaRPr lang="ko-KR" altLang="en-US"/>
           </a:p>
@@ -758,7 +763,7 @@
           <a:p>
             <a:fld id="{0CB960C3-B77A-4865-944D-F41BAAC8ADB3}" type="datetimeFigureOut">
               <a:rPr lang="ko-KR" altLang="en-US" smtClean="0"/>
-              <a:t>2022-06-18</a:t>
+              <a:t>2022-06-22</a:t>
             </a:fld>
             <a:endParaRPr lang="ko-KR" altLang="en-US"/>
           </a:p>
@@ -1004,7 +1009,7 @@
           <a:p>
             <a:fld id="{0CB960C3-B77A-4865-944D-F41BAAC8ADB3}" type="datetimeFigureOut">
               <a:rPr lang="ko-KR" altLang="en-US" smtClean="0"/>
-              <a:t>2022-06-18</a:t>
+              <a:t>2022-06-22</a:t>
             </a:fld>
             <a:endParaRPr lang="ko-KR" altLang="en-US"/>
           </a:p>
@@ -1236,7 +1241,7 @@
           <a:p>
             <a:fld id="{0CB960C3-B77A-4865-944D-F41BAAC8ADB3}" type="datetimeFigureOut">
               <a:rPr lang="ko-KR" altLang="en-US" smtClean="0"/>
-              <a:t>2022-06-18</a:t>
+              <a:t>2022-06-22</a:t>
             </a:fld>
             <a:endParaRPr lang="ko-KR" altLang="en-US"/>
           </a:p>
@@ -1603,7 +1608,7 @@
           <a:p>
             <a:fld id="{0CB960C3-B77A-4865-944D-F41BAAC8ADB3}" type="datetimeFigureOut">
               <a:rPr lang="ko-KR" altLang="en-US" smtClean="0"/>
-              <a:t>2022-06-18</a:t>
+              <a:t>2022-06-22</a:t>
             </a:fld>
             <a:endParaRPr lang="ko-KR" altLang="en-US"/>
           </a:p>
@@ -1721,7 +1726,7 @@
           <a:p>
             <a:fld id="{0CB960C3-B77A-4865-944D-F41BAAC8ADB3}" type="datetimeFigureOut">
               <a:rPr lang="ko-KR" altLang="en-US" smtClean="0"/>
-              <a:t>2022-06-18</a:t>
+              <a:t>2022-06-22</a:t>
             </a:fld>
             <a:endParaRPr lang="ko-KR" altLang="en-US"/>
           </a:p>
@@ -1816,7 +1821,7 @@
           <a:p>
             <a:fld id="{0CB960C3-B77A-4865-944D-F41BAAC8ADB3}" type="datetimeFigureOut">
               <a:rPr lang="ko-KR" altLang="en-US" smtClean="0"/>
-              <a:t>2022-06-18</a:t>
+              <a:t>2022-06-22</a:t>
             </a:fld>
             <a:endParaRPr lang="ko-KR" altLang="en-US"/>
           </a:p>
@@ -2093,7 +2098,7 @@
           <a:p>
             <a:fld id="{0CB960C3-B77A-4865-944D-F41BAAC8ADB3}" type="datetimeFigureOut">
               <a:rPr lang="ko-KR" altLang="en-US" smtClean="0"/>
-              <a:t>2022-06-18</a:t>
+              <a:t>2022-06-22</a:t>
             </a:fld>
             <a:endParaRPr lang="ko-KR" altLang="en-US"/>
           </a:p>
@@ -2346,7 +2351,7 @@
           <a:p>
             <a:fld id="{0CB960C3-B77A-4865-944D-F41BAAC8ADB3}" type="datetimeFigureOut">
               <a:rPr lang="ko-KR" altLang="en-US" smtClean="0"/>
-              <a:t>2022-06-18</a:t>
+              <a:t>2022-06-22</a:t>
             </a:fld>
             <a:endParaRPr lang="ko-KR" altLang="en-US"/>
           </a:p>
@@ -2559,7 +2564,7 @@
           <a:p>
             <a:fld id="{0CB960C3-B77A-4865-944D-F41BAAC8ADB3}" type="datetimeFigureOut">
               <a:rPr lang="ko-KR" altLang="en-US" smtClean="0"/>
-              <a:t>2022-06-18</a:t>
+              <a:t>2022-06-22</a:t>
             </a:fld>
             <a:endParaRPr lang="ko-KR" altLang="en-US"/>
           </a:p>
@@ -2972,7 +2977,7 @@
         </p:nvSpPr>
         <p:spPr>
           <a:xfrm>
-            <a:off x="438150" y="3019425"/>
+            <a:off x="438150" y="2222300"/>
             <a:ext cx="4320000" cy="540000"/>
           </a:xfrm>
           <a:prstGeom prst="roundRect">
@@ -3016,7 +3021,7 @@
         </p:nvGrpSpPr>
         <p:grpSpPr>
           <a:xfrm>
-            <a:off x="3390150" y="1133475"/>
+            <a:off x="3390150" y="336350"/>
             <a:ext cx="1368000" cy="1800000"/>
             <a:chOff x="3390150" y="1133475"/>
             <a:chExt cx="1368000" cy="1800000"/>
@@ -3263,7 +3268,7 @@
         </p:nvGrpSpPr>
         <p:grpSpPr>
           <a:xfrm>
-            <a:off x="438150" y="1133475"/>
+            <a:off x="438150" y="336350"/>
             <a:ext cx="1368000" cy="1800000"/>
             <a:chOff x="3390150" y="1133475"/>
             <a:chExt cx="1368000" cy="1800000"/>
@@ -3510,7 +3515,7 @@
         </p:nvGrpSpPr>
         <p:grpSpPr>
           <a:xfrm>
-            <a:off x="1914150" y="1133475"/>
+            <a:off x="1914150" y="336350"/>
             <a:ext cx="1368000" cy="1800000"/>
             <a:chOff x="3390150" y="1133475"/>
             <a:chExt cx="1368000" cy="1800000"/>
@@ -3757,7 +3762,7 @@
         </p:nvGrpSpPr>
         <p:grpSpPr>
           <a:xfrm>
-            <a:off x="6581025" y="797125"/>
+            <a:off x="6581025" y="0"/>
             <a:ext cx="4320000" cy="2762300"/>
             <a:chOff x="6581025" y="797125"/>
             <a:chExt cx="4320000" cy="2762300"/>
@@ -4619,6 +4624,306 @@
           </p:txBody>
         </p:sp>
       </p:grpSp>
+      <p:sp>
+        <p:nvSpPr>
+          <p:cNvPr id="39" name="모서리가 둥근 직사각형 38"/>
+          <p:cNvSpPr/>
+          <p:nvPr/>
+        </p:nvSpPr>
+        <p:spPr>
+          <a:xfrm>
+            <a:off x="438150" y="3278909"/>
+            <a:ext cx="4320000" cy="3311864"/>
+          </a:xfrm>
+          <a:prstGeom prst="roundRect">
+            <a:avLst/>
+          </a:prstGeom>
+          <a:solidFill>
+            <a:schemeClr val="accent5">
+              <a:lumMod val="60000"/>
+              <a:lumOff val="40000"/>
+            </a:schemeClr>
+          </a:solidFill>
+        </p:spPr>
+        <p:style>
+          <a:lnRef idx="2">
+            <a:schemeClr val="accent1">
+              <a:shade val="50000"/>
+            </a:schemeClr>
+          </a:lnRef>
+          <a:fillRef idx="1">
+            <a:schemeClr val="accent1"/>
+          </a:fillRef>
+          <a:effectRef idx="0">
+            <a:schemeClr val="accent1"/>
+          </a:effectRef>
+          <a:fontRef idx="minor">
+            <a:schemeClr val="lt1"/>
+          </a:fontRef>
+        </p:style>
+        <p:txBody>
+          <a:bodyPr lIns="36000" tIns="36000" rIns="36000" bIns="36000" rtlCol="0" anchor="t"/>
+          <a:lstStyle/>
+          <a:p>
+            <a:pPr algn="ctr"/>
+            <a:r>
+              <a:rPr lang="en-US" altLang="ko-KR" b="1" dirty="0" smtClean="0"/>
+              <a:t>Container</a:t>
+            </a:r>
+            <a:endParaRPr lang="ko-KR" altLang="en-US" b="1" dirty="0"/>
+          </a:p>
+        </p:txBody>
+      </p:sp>
+      <p:sp>
+        <p:nvSpPr>
+          <p:cNvPr id="44" name="모서리가 둥근 직사각형 43"/>
+          <p:cNvSpPr/>
+          <p:nvPr/>
+        </p:nvSpPr>
+        <p:spPr>
+          <a:xfrm>
+            <a:off x="618150" y="4738256"/>
+            <a:ext cx="3960000" cy="1736434"/>
+          </a:xfrm>
+          <a:prstGeom prst="roundRect">
+            <a:avLst/>
+          </a:prstGeom>
+          <a:solidFill>
+            <a:schemeClr val="accent1">
+              <a:lumMod val="60000"/>
+              <a:lumOff val="40000"/>
+            </a:schemeClr>
+          </a:solidFill>
+        </p:spPr>
+        <p:style>
+          <a:lnRef idx="2">
+            <a:schemeClr val="accent1">
+              <a:shade val="50000"/>
+            </a:schemeClr>
+          </a:lnRef>
+          <a:fillRef idx="1">
+            <a:schemeClr val="accent1"/>
+          </a:fillRef>
+          <a:effectRef idx="0">
+            <a:schemeClr val="accent1"/>
+          </a:effectRef>
+          <a:fontRef idx="minor">
+            <a:schemeClr val="lt1"/>
+          </a:fontRef>
+        </p:style>
+        <p:txBody>
+          <a:bodyPr lIns="36000" tIns="36000" rIns="36000" bIns="36000" rtlCol="0" anchor="t"/>
+          <a:lstStyle/>
+          <a:p>
+            <a:pPr algn="ctr"/>
+            <a:r>
+              <a:rPr lang="en-US" altLang="ko-KR" sz="1600" b="1" dirty="0" smtClean="0"/>
+              <a:t>Image(Read Only)</a:t>
+            </a:r>
+            <a:endParaRPr lang="ko-KR" altLang="en-US" sz="1600" b="1" dirty="0"/>
+          </a:p>
+        </p:txBody>
+      </p:sp>
+      <p:sp>
+        <p:nvSpPr>
+          <p:cNvPr id="46" name="모서리가 둥근 직사각형 45"/>
+          <p:cNvSpPr/>
+          <p:nvPr/>
+        </p:nvSpPr>
+        <p:spPr>
+          <a:xfrm>
+            <a:off x="762150" y="5320362"/>
+            <a:ext cx="3652832" cy="288000"/>
+          </a:xfrm>
+          <a:prstGeom prst="roundRect">
+            <a:avLst/>
+          </a:prstGeom>
+          <a:solidFill>
+            <a:schemeClr val="accent1">
+              <a:lumMod val="40000"/>
+              <a:lumOff val="60000"/>
+            </a:schemeClr>
+          </a:solidFill>
+        </p:spPr>
+        <p:style>
+          <a:lnRef idx="2">
+            <a:schemeClr val="accent1">
+              <a:shade val="50000"/>
+            </a:schemeClr>
+          </a:lnRef>
+          <a:fillRef idx="1">
+            <a:schemeClr val="accent1"/>
+          </a:fillRef>
+          <a:effectRef idx="0">
+            <a:schemeClr val="accent1"/>
+          </a:effectRef>
+          <a:fontRef idx="minor">
+            <a:schemeClr val="lt1"/>
+          </a:fontRef>
+        </p:style>
+        <p:txBody>
+          <a:bodyPr lIns="36000" tIns="36000" rIns="36000" bIns="36000" rtlCol="0" anchor="ctr"/>
+          <a:lstStyle/>
+          <a:p>
+            <a:pPr algn="ctr"/>
+            <a:r>
+              <a:rPr lang="en-US" altLang="ko-KR" sz="1600" b="1" dirty="0" smtClean="0"/>
+              <a:t>Image Layer #3</a:t>
+            </a:r>
+            <a:endParaRPr lang="ko-KR" altLang="en-US" sz="1600" b="1" dirty="0"/>
+          </a:p>
+        </p:txBody>
+      </p:sp>
+      <p:sp>
+        <p:nvSpPr>
+          <p:cNvPr id="47" name="모서리가 둥근 직사각형 46"/>
+          <p:cNvSpPr/>
+          <p:nvPr/>
+        </p:nvSpPr>
+        <p:spPr>
+          <a:xfrm>
+            <a:off x="762150" y="5704037"/>
+            <a:ext cx="3652832" cy="288000"/>
+          </a:xfrm>
+          <a:prstGeom prst="roundRect">
+            <a:avLst/>
+          </a:prstGeom>
+          <a:solidFill>
+            <a:schemeClr val="accent1">
+              <a:lumMod val="40000"/>
+              <a:lumOff val="60000"/>
+            </a:schemeClr>
+          </a:solidFill>
+        </p:spPr>
+        <p:style>
+          <a:lnRef idx="2">
+            <a:schemeClr val="accent1">
+              <a:shade val="50000"/>
+            </a:schemeClr>
+          </a:lnRef>
+          <a:fillRef idx="1">
+            <a:schemeClr val="accent1"/>
+          </a:fillRef>
+          <a:effectRef idx="0">
+            <a:schemeClr val="accent1"/>
+          </a:effectRef>
+          <a:fontRef idx="minor">
+            <a:schemeClr val="lt1"/>
+          </a:fontRef>
+        </p:style>
+        <p:txBody>
+          <a:bodyPr lIns="36000" tIns="36000" rIns="36000" bIns="36000" rtlCol="0" anchor="ctr"/>
+          <a:lstStyle/>
+          <a:p>
+            <a:pPr algn="ctr"/>
+            <a:r>
+              <a:rPr lang="en-US" altLang="ko-KR" sz="1600" b="1" dirty="0" smtClean="0"/>
+              <a:t>Image Layer #2</a:t>
+            </a:r>
+            <a:endParaRPr lang="ko-KR" altLang="en-US" sz="1600" b="1" dirty="0"/>
+          </a:p>
+        </p:txBody>
+      </p:sp>
+      <p:sp>
+        <p:nvSpPr>
+          <p:cNvPr id="48" name="모서리가 둥근 직사각형 47"/>
+          <p:cNvSpPr/>
+          <p:nvPr/>
+        </p:nvSpPr>
+        <p:spPr>
+          <a:xfrm>
+            <a:off x="762150" y="6087711"/>
+            <a:ext cx="3652832" cy="288000"/>
+          </a:xfrm>
+          <a:prstGeom prst="roundRect">
+            <a:avLst/>
+          </a:prstGeom>
+          <a:solidFill>
+            <a:schemeClr val="accent1">
+              <a:lumMod val="40000"/>
+              <a:lumOff val="60000"/>
+            </a:schemeClr>
+          </a:solidFill>
+        </p:spPr>
+        <p:style>
+          <a:lnRef idx="2">
+            <a:schemeClr val="accent1">
+              <a:shade val="50000"/>
+            </a:schemeClr>
+          </a:lnRef>
+          <a:fillRef idx="1">
+            <a:schemeClr val="accent1"/>
+          </a:fillRef>
+          <a:effectRef idx="0">
+            <a:schemeClr val="accent1"/>
+          </a:effectRef>
+          <a:fontRef idx="minor">
+            <a:schemeClr val="lt1"/>
+          </a:fontRef>
+        </p:style>
+        <p:txBody>
+          <a:bodyPr lIns="36000" tIns="36000" rIns="36000" bIns="36000" rtlCol="0" anchor="ctr"/>
+          <a:lstStyle/>
+          <a:p>
+            <a:pPr algn="ctr"/>
+            <a:r>
+              <a:rPr lang="en-US" altLang="ko-KR" sz="1600" b="1" dirty="0" smtClean="0"/>
+              <a:t>Image Layer #1</a:t>
+            </a:r>
+            <a:endParaRPr lang="ko-KR" altLang="en-US" sz="1600" b="1" dirty="0"/>
+          </a:p>
+        </p:txBody>
+      </p:sp>
+      <p:sp>
+        <p:nvSpPr>
+          <p:cNvPr id="49" name="모서리가 둥근 직사각형 48"/>
+          <p:cNvSpPr/>
+          <p:nvPr/>
+        </p:nvSpPr>
+        <p:spPr>
+          <a:xfrm>
+            <a:off x="618150" y="3938786"/>
+            <a:ext cx="3960000" cy="323625"/>
+          </a:xfrm>
+          <a:prstGeom prst="roundRect">
+            <a:avLst/>
+          </a:prstGeom>
+          <a:solidFill>
+            <a:schemeClr val="accent5">
+              <a:lumMod val="40000"/>
+              <a:lumOff val="60000"/>
+            </a:schemeClr>
+          </a:solidFill>
+        </p:spPr>
+        <p:style>
+          <a:lnRef idx="2">
+            <a:schemeClr val="accent1">
+              <a:shade val="50000"/>
+            </a:schemeClr>
+          </a:lnRef>
+          <a:fillRef idx="1">
+            <a:schemeClr val="accent1"/>
+          </a:fillRef>
+          <a:effectRef idx="0">
+            <a:schemeClr val="accent1"/>
+          </a:effectRef>
+          <a:fontRef idx="minor">
+            <a:schemeClr val="lt1"/>
+          </a:fontRef>
+        </p:style>
+        <p:txBody>
+          <a:bodyPr lIns="36000" tIns="36000" rIns="36000" bIns="36000" rtlCol="0" anchor="ctr"/>
+          <a:lstStyle/>
+          <a:p>
+            <a:pPr algn="ctr"/>
+            <a:r>
+              <a:rPr lang="en-US" altLang="ko-KR" sz="1600" b="1" dirty="0" smtClean="0"/>
+              <a:t>Container Layer(Read/Write)</a:t>
+            </a:r>
+            <a:endParaRPr lang="ko-KR" altLang="en-US" sz="1600" b="1" dirty="0"/>
+          </a:p>
+        </p:txBody>
+      </p:sp>
     </p:spTree>
     <p:extLst>
       <p:ext uri="{BB962C8B-B14F-4D97-AF65-F5344CB8AC3E}">

</xml_diff>

<commit_message>
Docker Volume Learned and Markdown Edited
</commit_message>
<xml_diff>
--- a/markdown_image.pptx
+++ b/markdown_image.pptx
@@ -6,6 +6,7 @@
   </p:sldMasterIdLst>
   <p:sldIdLst>
     <p:sldId id="256" r:id="rId2"/>
+    <p:sldId id="257" r:id="rId3"/>
   </p:sldIdLst>
   <p:sldSz cx="12192000" cy="6858000"/>
   <p:notesSz cx="6858000" cy="9144000"/>
@@ -243,7 +244,7 @@
           <a:p>
             <a:fld id="{0CB960C3-B77A-4865-944D-F41BAAC8ADB3}" type="datetimeFigureOut">
               <a:rPr lang="ko-KR" altLang="en-US" smtClean="0"/>
-              <a:t>2022-06-22</a:t>
+              <a:t>2022-07-24</a:t>
             </a:fld>
             <a:endParaRPr lang="ko-KR" altLang="en-US"/>
           </a:p>
@@ -413,7 +414,7 @@
           <a:p>
             <a:fld id="{0CB960C3-B77A-4865-944D-F41BAAC8ADB3}" type="datetimeFigureOut">
               <a:rPr lang="ko-KR" altLang="en-US" smtClean="0"/>
-              <a:t>2022-06-22</a:t>
+              <a:t>2022-07-24</a:t>
             </a:fld>
             <a:endParaRPr lang="ko-KR" altLang="en-US"/>
           </a:p>
@@ -593,7 +594,7 @@
           <a:p>
             <a:fld id="{0CB960C3-B77A-4865-944D-F41BAAC8ADB3}" type="datetimeFigureOut">
               <a:rPr lang="ko-KR" altLang="en-US" smtClean="0"/>
-              <a:t>2022-06-22</a:t>
+              <a:t>2022-07-24</a:t>
             </a:fld>
             <a:endParaRPr lang="ko-KR" altLang="en-US"/>
           </a:p>
@@ -763,7 +764,7 @@
           <a:p>
             <a:fld id="{0CB960C3-B77A-4865-944D-F41BAAC8ADB3}" type="datetimeFigureOut">
               <a:rPr lang="ko-KR" altLang="en-US" smtClean="0"/>
-              <a:t>2022-06-22</a:t>
+              <a:t>2022-07-24</a:t>
             </a:fld>
             <a:endParaRPr lang="ko-KR" altLang="en-US"/>
           </a:p>
@@ -1009,7 +1010,7 @@
           <a:p>
             <a:fld id="{0CB960C3-B77A-4865-944D-F41BAAC8ADB3}" type="datetimeFigureOut">
               <a:rPr lang="ko-KR" altLang="en-US" smtClean="0"/>
-              <a:t>2022-06-22</a:t>
+              <a:t>2022-07-24</a:t>
             </a:fld>
             <a:endParaRPr lang="ko-KR" altLang="en-US"/>
           </a:p>
@@ -1241,7 +1242,7 @@
           <a:p>
             <a:fld id="{0CB960C3-B77A-4865-944D-F41BAAC8ADB3}" type="datetimeFigureOut">
               <a:rPr lang="ko-KR" altLang="en-US" smtClean="0"/>
-              <a:t>2022-06-22</a:t>
+              <a:t>2022-07-24</a:t>
             </a:fld>
             <a:endParaRPr lang="ko-KR" altLang="en-US"/>
           </a:p>
@@ -1608,7 +1609,7 @@
           <a:p>
             <a:fld id="{0CB960C3-B77A-4865-944D-F41BAAC8ADB3}" type="datetimeFigureOut">
               <a:rPr lang="ko-KR" altLang="en-US" smtClean="0"/>
-              <a:t>2022-06-22</a:t>
+              <a:t>2022-07-24</a:t>
             </a:fld>
             <a:endParaRPr lang="ko-KR" altLang="en-US"/>
           </a:p>
@@ -1726,7 +1727,7 @@
           <a:p>
             <a:fld id="{0CB960C3-B77A-4865-944D-F41BAAC8ADB3}" type="datetimeFigureOut">
               <a:rPr lang="ko-KR" altLang="en-US" smtClean="0"/>
-              <a:t>2022-06-22</a:t>
+              <a:t>2022-07-24</a:t>
             </a:fld>
             <a:endParaRPr lang="ko-KR" altLang="en-US"/>
           </a:p>
@@ -1821,7 +1822,7 @@
           <a:p>
             <a:fld id="{0CB960C3-B77A-4865-944D-F41BAAC8ADB3}" type="datetimeFigureOut">
               <a:rPr lang="ko-KR" altLang="en-US" smtClean="0"/>
-              <a:t>2022-06-22</a:t>
+              <a:t>2022-07-24</a:t>
             </a:fld>
             <a:endParaRPr lang="ko-KR" altLang="en-US"/>
           </a:p>
@@ -2098,7 +2099,7 @@
           <a:p>
             <a:fld id="{0CB960C3-B77A-4865-944D-F41BAAC8ADB3}" type="datetimeFigureOut">
               <a:rPr lang="ko-KR" altLang="en-US" smtClean="0"/>
-              <a:t>2022-06-22</a:t>
+              <a:t>2022-07-24</a:t>
             </a:fld>
             <a:endParaRPr lang="ko-KR" altLang="en-US"/>
           </a:p>
@@ -2351,7 +2352,7 @@
           <a:p>
             <a:fld id="{0CB960C3-B77A-4865-944D-F41BAAC8ADB3}" type="datetimeFigureOut">
               <a:rPr lang="ko-KR" altLang="en-US" smtClean="0"/>
-              <a:t>2022-06-22</a:t>
+              <a:t>2022-07-24</a:t>
             </a:fld>
             <a:endParaRPr lang="ko-KR" altLang="en-US"/>
           </a:p>
@@ -2564,7 +2565,7 @@
           <a:p>
             <a:fld id="{0CB960C3-B77A-4865-944D-F41BAAC8ADB3}" type="datetimeFigureOut">
               <a:rPr lang="ko-KR" altLang="en-US" smtClean="0"/>
-              <a:t>2022-06-22</a:t>
+              <a:t>2022-07-24</a:t>
             </a:fld>
             <a:endParaRPr lang="ko-KR" altLang="en-US"/>
           </a:p>
@@ -4944,6 +4945,367 @@
 </p:sld>
 </file>
 
+<file path=ppt/slides/slide2.xml><?xml version="1.0" encoding="utf-8"?>
+<p:sld xmlns:a="http://schemas.openxmlformats.org/drawingml/2006/main" xmlns:r="http://schemas.openxmlformats.org/officeDocument/2006/relationships" xmlns:p="http://schemas.openxmlformats.org/presentationml/2006/main">
+  <p:cSld>
+    <p:spTree>
+      <p:nvGrpSpPr>
+        <p:cNvPr id="1" name=""/>
+        <p:cNvGrpSpPr/>
+        <p:nvPr/>
+      </p:nvGrpSpPr>
+      <p:grpSpPr>
+        <a:xfrm>
+          <a:off x="0" y="0"/>
+          <a:ext cx="0" cy="0"/>
+          <a:chOff x="0" y="0"/>
+          <a:chExt cx="0" cy="0"/>
+        </a:xfrm>
+      </p:grpSpPr>
+      <p:sp>
+        <p:nvSpPr>
+          <p:cNvPr id="5" name="모서리가 둥근 직사각형 4"/>
+          <p:cNvSpPr/>
+          <p:nvPr/>
+        </p:nvSpPr>
+        <p:spPr>
+          <a:xfrm>
+            <a:off x="2831950" y="1589162"/>
+            <a:ext cx="5400000" cy="1260000"/>
+          </a:xfrm>
+          <a:prstGeom prst="roundRect">
+            <a:avLst/>
+          </a:prstGeom>
+          <a:solidFill>
+            <a:schemeClr val="accent1">
+              <a:lumMod val="40000"/>
+              <a:lumOff val="60000"/>
+            </a:schemeClr>
+          </a:solidFill>
+        </p:spPr>
+        <p:style>
+          <a:lnRef idx="2">
+            <a:schemeClr val="accent1">
+              <a:shade val="50000"/>
+            </a:schemeClr>
+          </a:lnRef>
+          <a:fillRef idx="1">
+            <a:schemeClr val="accent1"/>
+          </a:fillRef>
+          <a:effectRef idx="0">
+            <a:schemeClr val="accent1"/>
+          </a:effectRef>
+          <a:fontRef idx="minor">
+            <a:schemeClr val="lt1"/>
+          </a:fontRef>
+        </p:style>
+        <p:txBody>
+          <a:bodyPr lIns="36000" tIns="36000" rIns="36000" bIns="36000" rtlCol="0" anchor="ctr"/>
+          <a:lstStyle/>
+          <a:p>
+            <a:pPr algn="ctr"/>
+            <a:endParaRPr lang="ko-KR" altLang="en-US" sz="1600" b="1" dirty="0"/>
+          </a:p>
+        </p:txBody>
+      </p:sp>
+      <p:sp>
+        <p:nvSpPr>
+          <p:cNvPr id="4" name="모서리가 둥근 직사각형 3"/>
+          <p:cNvSpPr/>
+          <p:nvPr/>
+        </p:nvSpPr>
+        <p:spPr>
+          <a:xfrm>
+            <a:off x="4361950" y="1413487"/>
+            <a:ext cx="2340000" cy="360000"/>
+          </a:xfrm>
+          <a:prstGeom prst="roundRect">
+            <a:avLst/>
+          </a:prstGeom>
+        </p:spPr>
+        <p:style>
+          <a:lnRef idx="2">
+            <a:schemeClr val="accent1">
+              <a:shade val="50000"/>
+            </a:schemeClr>
+          </a:lnRef>
+          <a:fillRef idx="1">
+            <a:schemeClr val="accent1"/>
+          </a:fillRef>
+          <a:effectRef idx="0">
+            <a:schemeClr val="accent1"/>
+          </a:effectRef>
+          <a:fontRef idx="minor">
+            <a:schemeClr val="lt1"/>
+          </a:fontRef>
+        </p:style>
+        <p:txBody>
+          <a:bodyPr lIns="36000" tIns="36000" rIns="36000" bIns="36000" rtlCol="0" anchor="ctr"/>
+          <a:lstStyle/>
+          <a:p>
+            <a:pPr algn="ctr"/>
+            <a:r>
+              <a:rPr lang="ko-KR" altLang="en-US" sz="1600" b="1" dirty="0" smtClean="0"/>
+              <a:t>호스트</a:t>
+            </a:r>
+            <a:r>
+              <a:rPr lang="en-US" altLang="ko-KR" sz="1600" b="1" dirty="0" smtClean="0"/>
+              <a:t>(</a:t>
+            </a:r>
+            <a:r>
+              <a:rPr lang="ko-KR" altLang="en-US" sz="1600" b="1" dirty="0" smtClean="0"/>
+              <a:t>내 컴퓨터</a:t>
+            </a:r>
+            <a:r>
+              <a:rPr lang="en-US" altLang="ko-KR" sz="1600" b="1" dirty="0" smtClean="0"/>
+              <a:t>)</a:t>
+            </a:r>
+            <a:endParaRPr lang="ko-KR" altLang="en-US" sz="1600" b="1" dirty="0"/>
+          </a:p>
+        </p:txBody>
+      </p:sp>
+      <p:grpSp>
+        <p:nvGrpSpPr>
+          <p:cNvPr id="11" name="그룹 10"/>
+          <p:cNvGrpSpPr/>
+          <p:nvPr/>
+        </p:nvGrpSpPr>
+        <p:grpSpPr>
+          <a:xfrm>
+            <a:off x="3034244" y="1861324"/>
+            <a:ext cx="4995411" cy="900000"/>
+            <a:chOff x="3050670" y="2783904"/>
+            <a:chExt cx="4995411" cy="900000"/>
+          </a:xfrm>
+        </p:grpSpPr>
+        <p:sp>
+          <p:nvSpPr>
+            <p:cNvPr id="6" name="모서리가 둥근 직사각형 5"/>
+            <p:cNvSpPr/>
+            <p:nvPr/>
+          </p:nvSpPr>
+          <p:spPr>
+            <a:xfrm>
+              <a:off x="3050670" y="3215616"/>
+              <a:ext cx="1224000" cy="360000"/>
+            </a:xfrm>
+            <a:prstGeom prst="roundRect">
+              <a:avLst/>
+            </a:prstGeom>
+            <a:solidFill>
+              <a:schemeClr val="accent6">
+                <a:lumMod val="60000"/>
+                <a:lumOff val="40000"/>
+              </a:schemeClr>
+            </a:solidFill>
+          </p:spPr>
+          <p:style>
+            <a:lnRef idx="2">
+              <a:schemeClr val="accent1">
+                <a:shade val="50000"/>
+              </a:schemeClr>
+            </a:lnRef>
+            <a:fillRef idx="1">
+              <a:schemeClr val="accent1"/>
+            </a:fillRef>
+            <a:effectRef idx="0">
+              <a:schemeClr val="accent1"/>
+            </a:effectRef>
+            <a:fontRef idx="minor">
+              <a:schemeClr val="lt1"/>
+            </a:fontRef>
+          </p:style>
+          <p:txBody>
+            <a:bodyPr lIns="36000" tIns="36000" rIns="36000" bIns="36000" rtlCol="0" anchor="ctr"/>
+            <a:lstStyle/>
+            <a:p>
+              <a:pPr algn="ctr"/>
+              <a:r>
+                <a:rPr lang="en-US" altLang="ko-KR" sz="1400" b="1" dirty="0" smtClean="0">
+                  <a:solidFill>
+                    <a:schemeClr val="bg1"/>
+                  </a:solidFill>
+                </a:rPr>
+                <a:t>/</a:t>
+              </a:r>
+              <a:r>
+                <a:rPr lang="en-US" altLang="ko-KR" sz="1400" b="1" dirty="0" err="1" smtClean="0">
+                  <a:solidFill>
+                    <a:schemeClr val="bg1"/>
+                  </a:solidFill>
+                </a:rPr>
+                <a:t>some_path</a:t>
+              </a:r>
+              <a:endParaRPr lang="ko-KR" altLang="en-US" sz="1400" b="1" dirty="0">
+                <a:solidFill>
+                  <a:schemeClr val="bg1"/>
+                </a:solidFill>
+              </a:endParaRPr>
+            </a:p>
+          </p:txBody>
+        </p:sp>
+        <p:sp>
+          <p:nvSpPr>
+            <p:cNvPr id="8" name="모서리가 둥근 직사각형 7"/>
+            <p:cNvSpPr/>
+            <p:nvPr/>
+          </p:nvSpPr>
+          <p:spPr>
+            <a:xfrm>
+              <a:off x="5886081" y="2783904"/>
+              <a:ext cx="2160000" cy="900000"/>
+            </a:xfrm>
+            <a:prstGeom prst="roundRect">
+              <a:avLst/>
+            </a:prstGeom>
+            <a:solidFill>
+              <a:schemeClr val="accent5">
+                <a:lumMod val="60000"/>
+                <a:lumOff val="40000"/>
+              </a:schemeClr>
+            </a:solidFill>
+          </p:spPr>
+          <p:style>
+            <a:lnRef idx="2">
+              <a:schemeClr val="accent1">
+                <a:shade val="50000"/>
+              </a:schemeClr>
+            </a:lnRef>
+            <a:fillRef idx="1">
+              <a:schemeClr val="accent1"/>
+            </a:fillRef>
+            <a:effectRef idx="0">
+              <a:schemeClr val="accent1"/>
+            </a:effectRef>
+            <a:fontRef idx="minor">
+              <a:schemeClr val="lt1"/>
+            </a:fontRef>
+          </p:style>
+          <p:txBody>
+            <a:bodyPr lIns="36000" tIns="36000" rIns="36000" bIns="36000" rtlCol="0" anchor="t"/>
+            <a:lstStyle/>
+            <a:p>
+              <a:pPr algn="ctr"/>
+              <a:r>
+                <a:rPr lang="ko-KR" altLang="en-US" sz="1600" b="1" dirty="0" smtClean="0"/>
+                <a:t>컨테이너</a:t>
+              </a:r>
+              <a:endParaRPr lang="ko-KR" altLang="en-US" sz="1600" b="1" dirty="0"/>
+            </a:p>
+          </p:txBody>
+        </p:sp>
+        <p:sp>
+          <p:nvSpPr>
+            <p:cNvPr id="7" name="모서리가 둥근 직사각형 6"/>
+            <p:cNvSpPr/>
+            <p:nvPr/>
+          </p:nvSpPr>
+          <p:spPr>
+            <a:xfrm>
+              <a:off x="6237420" y="3215616"/>
+              <a:ext cx="1457322" cy="360000"/>
+            </a:xfrm>
+            <a:prstGeom prst="roundRect">
+              <a:avLst/>
+            </a:prstGeom>
+            <a:solidFill>
+              <a:schemeClr val="accent6">
+                <a:lumMod val="60000"/>
+                <a:lumOff val="40000"/>
+              </a:schemeClr>
+            </a:solidFill>
+          </p:spPr>
+          <p:style>
+            <a:lnRef idx="2">
+              <a:schemeClr val="accent1">
+                <a:shade val="50000"/>
+              </a:schemeClr>
+            </a:lnRef>
+            <a:fillRef idx="1">
+              <a:schemeClr val="accent1"/>
+            </a:fillRef>
+            <a:effectRef idx="0">
+              <a:schemeClr val="accent1"/>
+            </a:effectRef>
+            <a:fontRef idx="minor">
+              <a:schemeClr val="lt1"/>
+            </a:fontRef>
+          </p:style>
+          <p:txBody>
+            <a:bodyPr lIns="36000" tIns="36000" rIns="36000" bIns="36000" rtlCol="0" anchor="ctr"/>
+            <a:lstStyle/>
+            <a:p>
+              <a:pPr algn="ctr"/>
+              <a:r>
+                <a:rPr lang="en-US" altLang="ko-KR" sz="1400" b="1" dirty="0" smtClean="0">
+                  <a:solidFill>
+                    <a:schemeClr val="bg1"/>
+                  </a:solidFill>
+                </a:rPr>
+                <a:t>/app/user-data</a:t>
+              </a:r>
+              <a:endParaRPr lang="ko-KR" altLang="en-US" sz="1400" b="1" dirty="0">
+                <a:solidFill>
+                  <a:schemeClr val="bg1"/>
+                </a:solidFill>
+              </a:endParaRPr>
+            </a:p>
+          </p:txBody>
+        </p:sp>
+        <p:cxnSp>
+          <p:nvCxnSpPr>
+            <p:cNvPr id="10" name="직선 화살표 연결선 9"/>
+            <p:cNvCxnSpPr>
+              <a:stCxn id="6" idx="3"/>
+              <a:endCxn id="7" idx="1"/>
+            </p:cNvCxnSpPr>
+            <p:nvPr/>
+          </p:nvCxnSpPr>
+          <p:spPr>
+            <a:xfrm>
+              <a:off x="4274670" y="3395616"/>
+              <a:ext cx="1962750" cy="0"/>
+            </a:xfrm>
+            <a:prstGeom prst="straightConnector1">
+              <a:avLst/>
+            </a:prstGeom>
+            <a:ln w="28575">
+              <a:solidFill>
+                <a:schemeClr val="accent2"/>
+              </a:solidFill>
+              <a:headEnd type="triangle"/>
+              <a:tailEnd type="triangle"/>
+            </a:ln>
+          </p:spPr>
+          <p:style>
+            <a:lnRef idx="1">
+              <a:schemeClr val="accent1"/>
+            </a:lnRef>
+            <a:fillRef idx="0">
+              <a:schemeClr val="accent1"/>
+            </a:fillRef>
+            <a:effectRef idx="0">
+              <a:schemeClr val="accent1"/>
+            </a:effectRef>
+            <a:fontRef idx="minor">
+              <a:schemeClr val="tx1"/>
+            </a:fontRef>
+          </p:style>
+        </p:cxnSp>
+      </p:grpSp>
+    </p:spTree>
+    <p:extLst>
+      <p:ext uri="{BB962C8B-B14F-4D97-AF65-F5344CB8AC3E}">
+        <p14:creationId xmlns:p14="http://schemas.microsoft.com/office/powerpoint/2010/main" val="2067360014"/>
+      </p:ext>
+    </p:extLst>
+  </p:cSld>
+  <p:clrMapOvr>
+    <a:masterClrMapping/>
+  </p:clrMapOvr>
+</p:sld>
+</file>
+
 <file path=ppt/theme/theme1.xml><?xml version="1.0" encoding="utf-8"?>
 <a:theme xmlns:a="http://schemas.openxmlformats.org/drawingml/2006/main" name="Office 테마">
   <a:themeElements>

</xml_diff>

<commit_message>
docs: DinD vs. DooD
</commit_message>
<xml_diff>
--- a/markdown_image.pptx
+++ b/markdown_image.pptx
@@ -5,14 +5,15 @@
     <p:sldMasterId id="2147483648" r:id="rId1"/>
   </p:sldMasterIdLst>
   <p:notesMasterIdLst>
-    <p:notesMasterId r:id="rId7"/>
+    <p:notesMasterId r:id="rId8"/>
   </p:notesMasterIdLst>
   <p:sldIdLst>
     <p:sldId id="256" r:id="rId2"/>
     <p:sldId id="258" r:id="rId3"/>
     <p:sldId id="259" r:id="rId4"/>
-    <p:sldId id="260" r:id="rId5"/>
-    <p:sldId id="261" r:id="rId6"/>
+    <p:sldId id="262" r:id="rId5"/>
+    <p:sldId id="260" r:id="rId6"/>
+    <p:sldId id="261" r:id="rId7"/>
   </p:sldIdLst>
   <p:sldSz cx="12192000" cy="6858000"/>
   <p:notesSz cx="6858000" cy="9144000"/>
@@ -201,7 +202,7 @@
           <a:p>
             <a:fld id="{06073691-9509-499D-804B-789F8428B2A1}" type="datetimeFigureOut">
               <a:rPr lang="ko-KR" altLang="en-US" smtClean="0"/>
-              <a:t>2022-10-27</a:t>
+              <a:t>2023-01-08</a:t>
             </a:fld>
             <a:endParaRPr lang="ko-KR" altLang="en-US"/>
           </a:p>
@@ -618,7 +619,7 @@
           <a:p>
             <a:fld id="{0EEAD409-0A73-4A8A-B948-17E588047228}" type="slidenum">
               <a:rPr lang="ko-KR" altLang="en-US" smtClean="0"/>
-              <a:t>4</a:t>
+              <a:t>5</a:t>
             </a:fld>
             <a:endParaRPr lang="ko-KR" altLang="en-US"/>
           </a:p>
@@ -768,7 +769,7 @@
           <a:p>
             <a:fld id="{0CB960C3-B77A-4865-944D-F41BAAC8ADB3}" type="datetimeFigureOut">
               <a:rPr lang="ko-KR" altLang="en-US" smtClean="0"/>
-              <a:t>2022-10-27</a:t>
+              <a:t>2023-01-08</a:t>
             </a:fld>
             <a:endParaRPr lang="ko-KR" altLang="en-US"/>
           </a:p>
@@ -938,7 +939,7 @@
           <a:p>
             <a:fld id="{0CB960C3-B77A-4865-944D-F41BAAC8ADB3}" type="datetimeFigureOut">
               <a:rPr lang="ko-KR" altLang="en-US" smtClean="0"/>
-              <a:t>2022-10-27</a:t>
+              <a:t>2023-01-08</a:t>
             </a:fld>
             <a:endParaRPr lang="ko-KR" altLang="en-US"/>
           </a:p>
@@ -1118,7 +1119,7 @@
           <a:p>
             <a:fld id="{0CB960C3-B77A-4865-944D-F41BAAC8ADB3}" type="datetimeFigureOut">
               <a:rPr lang="ko-KR" altLang="en-US" smtClean="0"/>
-              <a:t>2022-10-27</a:t>
+              <a:t>2023-01-08</a:t>
             </a:fld>
             <a:endParaRPr lang="ko-KR" altLang="en-US"/>
           </a:p>
@@ -1288,7 +1289,7 @@
           <a:p>
             <a:fld id="{0CB960C3-B77A-4865-944D-F41BAAC8ADB3}" type="datetimeFigureOut">
               <a:rPr lang="ko-KR" altLang="en-US" smtClean="0"/>
-              <a:t>2022-10-27</a:t>
+              <a:t>2023-01-08</a:t>
             </a:fld>
             <a:endParaRPr lang="ko-KR" altLang="en-US"/>
           </a:p>
@@ -1534,7 +1535,7 @@
           <a:p>
             <a:fld id="{0CB960C3-B77A-4865-944D-F41BAAC8ADB3}" type="datetimeFigureOut">
               <a:rPr lang="ko-KR" altLang="en-US" smtClean="0"/>
-              <a:t>2022-10-27</a:t>
+              <a:t>2023-01-08</a:t>
             </a:fld>
             <a:endParaRPr lang="ko-KR" altLang="en-US"/>
           </a:p>
@@ -1766,7 +1767,7 @@
           <a:p>
             <a:fld id="{0CB960C3-B77A-4865-944D-F41BAAC8ADB3}" type="datetimeFigureOut">
               <a:rPr lang="ko-KR" altLang="en-US" smtClean="0"/>
-              <a:t>2022-10-27</a:t>
+              <a:t>2023-01-08</a:t>
             </a:fld>
             <a:endParaRPr lang="ko-KR" altLang="en-US"/>
           </a:p>
@@ -2133,7 +2134,7 @@
           <a:p>
             <a:fld id="{0CB960C3-B77A-4865-944D-F41BAAC8ADB3}" type="datetimeFigureOut">
               <a:rPr lang="ko-KR" altLang="en-US" smtClean="0"/>
-              <a:t>2022-10-27</a:t>
+              <a:t>2023-01-08</a:t>
             </a:fld>
             <a:endParaRPr lang="ko-KR" altLang="en-US"/>
           </a:p>
@@ -2251,7 +2252,7 @@
           <a:p>
             <a:fld id="{0CB960C3-B77A-4865-944D-F41BAAC8ADB3}" type="datetimeFigureOut">
               <a:rPr lang="ko-KR" altLang="en-US" smtClean="0"/>
-              <a:t>2022-10-27</a:t>
+              <a:t>2023-01-08</a:t>
             </a:fld>
             <a:endParaRPr lang="ko-KR" altLang="en-US"/>
           </a:p>
@@ -2346,7 +2347,7 @@
           <a:p>
             <a:fld id="{0CB960C3-B77A-4865-944D-F41BAAC8ADB3}" type="datetimeFigureOut">
               <a:rPr lang="ko-KR" altLang="en-US" smtClean="0"/>
-              <a:t>2022-10-27</a:t>
+              <a:t>2023-01-08</a:t>
             </a:fld>
             <a:endParaRPr lang="ko-KR" altLang="en-US"/>
           </a:p>
@@ -2623,7 +2624,7 @@
           <a:p>
             <a:fld id="{0CB960C3-B77A-4865-944D-F41BAAC8ADB3}" type="datetimeFigureOut">
               <a:rPr lang="ko-KR" altLang="en-US" smtClean="0"/>
-              <a:t>2022-10-27</a:t>
+              <a:t>2023-01-08</a:t>
             </a:fld>
             <a:endParaRPr lang="ko-KR" altLang="en-US"/>
           </a:p>
@@ -2876,7 +2877,7 @@
           <a:p>
             <a:fld id="{0CB960C3-B77A-4865-944D-F41BAAC8ADB3}" type="datetimeFigureOut">
               <a:rPr lang="ko-KR" altLang="en-US" smtClean="0"/>
-              <a:t>2022-10-27</a:t>
+              <a:t>2023-01-08</a:t>
             </a:fld>
             <a:endParaRPr lang="ko-KR" altLang="en-US"/>
           </a:p>
@@ -3089,7 +3090,7 @@
           <a:p>
             <a:fld id="{0CB960C3-B77A-4865-944D-F41BAAC8ADB3}" type="datetimeFigureOut">
               <a:rPr lang="ko-KR" altLang="en-US" smtClean="0"/>
-              <a:t>2022-10-27</a:t>
+              <a:t>2023-01-08</a:t>
             </a:fld>
             <a:endParaRPr lang="ko-KR" altLang="en-US"/>
           </a:p>
@@ -8843,6 +8844,1383 @@
           <a:chExt cx="0" cy="0"/>
         </a:xfrm>
       </p:grpSpPr>
+      <p:sp>
+        <p:nvSpPr>
+          <p:cNvPr id="4" name="모서리가 둥근 직사각형 3"/>
+          <p:cNvSpPr/>
+          <p:nvPr/>
+        </p:nvSpPr>
+        <p:spPr>
+          <a:xfrm>
+            <a:off x="438150" y="2249732"/>
+            <a:ext cx="5040000" cy="648000"/>
+          </a:xfrm>
+          <a:prstGeom prst="roundRect">
+            <a:avLst/>
+          </a:prstGeom>
+        </p:spPr>
+        <p:style>
+          <a:lnRef idx="2">
+            <a:schemeClr val="accent1">
+              <a:shade val="50000"/>
+            </a:schemeClr>
+          </a:lnRef>
+          <a:fillRef idx="1">
+            <a:schemeClr val="accent1"/>
+          </a:fillRef>
+          <a:effectRef idx="0">
+            <a:schemeClr val="accent1"/>
+          </a:effectRef>
+          <a:fontRef idx="minor">
+            <a:schemeClr val="lt1"/>
+          </a:fontRef>
+        </p:style>
+        <p:txBody>
+          <a:bodyPr lIns="36000" tIns="36000" rIns="36000" bIns="36000" rtlCol="0" anchor="ctr"/>
+          <a:lstStyle/>
+          <a:p>
+            <a:pPr algn="ctr"/>
+            <a:r>
+              <a:rPr lang="en-US" altLang="ko-KR" b="1" dirty="0" smtClean="0"/>
+              <a:t>Docker</a:t>
+            </a:r>
+            <a:br>
+              <a:rPr lang="en-US" altLang="ko-KR" b="1" dirty="0" smtClean="0"/>
+            </a:br>
+            <a:r>
+              <a:rPr lang="en-US" altLang="ko-KR" b="1" dirty="0" smtClean="0"/>
+              <a:t>(Host Machine)</a:t>
+            </a:r>
+            <a:endParaRPr lang="ko-KR" altLang="en-US" b="1" dirty="0"/>
+          </a:p>
+        </p:txBody>
+      </p:sp>
+      <p:sp>
+        <p:nvSpPr>
+          <p:cNvPr id="22" name="모서리가 둥근 직사각형 21"/>
+          <p:cNvSpPr/>
+          <p:nvPr/>
+        </p:nvSpPr>
+        <p:spPr>
+          <a:xfrm>
+            <a:off x="458124" y="1008147"/>
+            <a:ext cx="1416396" cy="431209"/>
+          </a:xfrm>
+          <a:prstGeom prst="roundRect">
+            <a:avLst/>
+          </a:prstGeom>
+          <a:solidFill>
+            <a:schemeClr val="accent1">
+              <a:lumMod val="20000"/>
+              <a:lumOff val="80000"/>
+            </a:schemeClr>
+          </a:solidFill>
+          <a:ln>
+            <a:solidFill>
+              <a:schemeClr val="accent1">
+                <a:lumMod val="60000"/>
+                <a:lumOff val="40000"/>
+              </a:schemeClr>
+            </a:solidFill>
+          </a:ln>
+        </p:spPr>
+        <p:style>
+          <a:lnRef idx="2">
+            <a:schemeClr val="accent1">
+              <a:shade val="50000"/>
+            </a:schemeClr>
+          </a:lnRef>
+          <a:fillRef idx="1">
+            <a:schemeClr val="accent1"/>
+          </a:fillRef>
+          <a:effectRef idx="0">
+            <a:schemeClr val="accent1"/>
+          </a:effectRef>
+          <a:fontRef idx="minor">
+            <a:schemeClr val="lt1"/>
+          </a:fontRef>
+        </p:style>
+        <p:txBody>
+          <a:bodyPr lIns="36000" tIns="36000" rIns="36000" bIns="36000" rtlCol="0" anchor="ctr"/>
+          <a:lstStyle/>
+          <a:p>
+            <a:pPr algn="ctr"/>
+            <a:r>
+              <a:rPr lang="en-US" altLang="ko-KR" sz="1600" b="1" dirty="0" smtClean="0">
+                <a:solidFill>
+                  <a:schemeClr val="tx1"/>
+                </a:solidFill>
+              </a:rPr>
+              <a:t>Container 3</a:t>
+            </a:r>
+            <a:endParaRPr lang="ko-KR" altLang="en-US" sz="1600" b="1" dirty="0">
+              <a:solidFill>
+                <a:schemeClr val="tx1"/>
+              </a:solidFill>
+            </a:endParaRPr>
+          </a:p>
+        </p:txBody>
+      </p:sp>
+      <p:sp>
+        <p:nvSpPr>
+          <p:cNvPr id="23" name="모서리가 둥근 직사각형 22"/>
+          <p:cNvSpPr/>
+          <p:nvPr/>
+        </p:nvSpPr>
+        <p:spPr>
+          <a:xfrm>
+            <a:off x="458124" y="495750"/>
+            <a:ext cx="1416396" cy="431209"/>
+          </a:xfrm>
+          <a:prstGeom prst="roundRect">
+            <a:avLst/>
+          </a:prstGeom>
+          <a:solidFill>
+            <a:schemeClr val="accent1">
+              <a:lumMod val="20000"/>
+              <a:lumOff val="80000"/>
+            </a:schemeClr>
+          </a:solidFill>
+          <a:ln>
+            <a:solidFill>
+              <a:schemeClr val="accent1">
+                <a:lumMod val="60000"/>
+                <a:lumOff val="40000"/>
+              </a:schemeClr>
+            </a:solidFill>
+          </a:ln>
+        </p:spPr>
+        <p:style>
+          <a:lnRef idx="2">
+            <a:schemeClr val="accent1">
+              <a:shade val="50000"/>
+            </a:schemeClr>
+          </a:lnRef>
+          <a:fillRef idx="1">
+            <a:schemeClr val="accent1"/>
+          </a:fillRef>
+          <a:effectRef idx="0">
+            <a:schemeClr val="accent1"/>
+          </a:effectRef>
+          <a:fontRef idx="minor">
+            <a:schemeClr val="lt1"/>
+          </a:fontRef>
+        </p:style>
+        <p:txBody>
+          <a:bodyPr lIns="36000" tIns="36000" rIns="36000" bIns="36000" rtlCol="0" anchor="ctr"/>
+          <a:lstStyle/>
+          <a:p>
+            <a:pPr algn="ctr"/>
+            <a:r>
+              <a:rPr lang="en-US" altLang="ko-KR" sz="1600" b="1" dirty="0" smtClean="0">
+                <a:solidFill>
+                  <a:schemeClr val="tx1"/>
+                </a:solidFill>
+              </a:rPr>
+              <a:t>Container 4</a:t>
+            </a:r>
+            <a:endParaRPr lang="ko-KR" altLang="en-US" sz="1600" b="1" dirty="0">
+              <a:solidFill>
+                <a:schemeClr val="tx1"/>
+              </a:solidFill>
+            </a:endParaRPr>
+          </a:p>
+        </p:txBody>
+      </p:sp>
+      <p:cxnSp>
+        <p:nvCxnSpPr>
+          <p:cNvPr id="25" name="꺾인 연결선 24"/>
+          <p:cNvCxnSpPr>
+            <a:endCxn id="23" idx="3"/>
+          </p:cNvCxnSpPr>
+          <p:nvPr/>
+        </p:nvCxnSpPr>
+        <p:spPr>
+          <a:xfrm rot="16200000" flipV="1">
+            <a:off x="1559259" y="1026617"/>
+            <a:ext cx="804259" cy="173736"/>
+          </a:xfrm>
+          <a:prstGeom prst="bentConnector2">
+            <a:avLst/>
+          </a:prstGeom>
+          <a:ln w="12700">
+            <a:solidFill>
+              <a:srgbClr val="FF0000"/>
+            </a:solidFill>
+            <a:tailEnd type="triangle"/>
+          </a:ln>
+        </p:spPr>
+        <p:style>
+          <a:lnRef idx="1">
+            <a:schemeClr val="accent1"/>
+          </a:lnRef>
+          <a:fillRef idx="0">
+            <a:schemeClr val="accent1"/>
+          </a:fillRef>
+          <a:effectRef idx="0">
+            <a:schemeClr val="accent1"/>
+          </a:effectRef>
+          <a:fontRef idx="minor">
+            <a:schemeClr val="tx1"/>
+          </a:fontRef>
+        </p:style>
+      </p:cxnSp>
+      <p:cxnSp>
+        <p:nvCxnSpPr>
+          <p:cNvPr id="34" name="꺾인 연결선 33"/>
+          <p:cNvCxnSpPr>
+            <a:endCxn id="22" idx="3"/>
+          </p:cNvCxnSpPr>
+          <p:nvPr/>
+        </p:nvCxnSpPr>
+        <p:spPr>
+          <a:xfrm rot="16200000" flipV="1">
+            <a:off x="1815458" y="1282814"/>
+            <a:ext cx="291862" cy="173737"/>
+          </a:xfrm>
+          <a:prstGeom prst="bentConnector2">
+            <a:avLst/>
+          </a:prstGeom>
+          <a:ln w="12700">
+            <a:solidFill>
+              <a:srgbClr val="FF0000"/>
+            </a:solidFill>
+            <a:tailEnd type="triangle"/>
+          </a:ln>
+        </p:spPr>
+        <p:style>
+          <a:lnRef idx="1">
+            <a:schemeClr val="accent1"/>
+          </a:lnRef>
+          <a:fillRef idx="0">
+            <a:schemeClr val="accent1"/>
+          </a:fillRef>
+          <a:effectRef idx="0">
+            <a:schemeClr val="accent1"/>
+          </a:effectRef>
+          <a:fontRef idx="minor">
+            <a:schemeClr val="tx1"/>
+          </a:fontRef>
+        </p:style>
+      </p:cxnSp>
+      <p:sp>
+        <p:nvSpPr>
+          <p:cNvPr id="38" name="TextBox 37"/>
+          <p:cNvSpPr txBox="1"/>
+          <p:nvPr/>
+        </p:nvSpPr>
+        <p:spPr>
+          <a:xfrm>
+            <a:off x="2066106" y="854258"/>
+            <a:ext cx="704088" cy="307777"/>
+          </a:xfrm>
+          <a:prstGeom prst="rect">
+            <a:avLst/>
+          </a:prstGeom>
+          <a:noFill/>
+        </p:spPr>
+        <p:txBody>
+          <a:bodyPr wrap="square" rtlCol="0">
+            <a:spAutoFit/>
+          </a:bodyPr>
+          <a:lstStyle/>
+          <a:p>
+            <a:r>
+              <a:rPr lang="en-US" altLang="ko-KR" sz="1400" dirty="0" smtClean="0">
+                <a:solidFill>
+                  <a:srgbClr val="FF0000"/>
+                </a:solidFill>
+              </a:rPr>
+              <a:t>create</a:t>
+            </a:r>
+            <a:endParaRPr lang="ko-KR" altLang="en-US" sz="1400" dirty="0">
+              <a:solidFill>
+                <a:srgbClr val="FF0000"/>
+              </a:solidFill>
+            </a:endParaRPr>
+          </a:p>
+        </p:txBody>
+      </p:sp>
+      <p:pic>
+        <p:nvPicPr>
+          <p:cNvPr id="39" name="그림 38"/>
+          <p:cNvPicPr>
+            <a:picLocks noChangeAspect="1"/>
+          </p:cNvPicPr>
+          <p:nvPr/>
+        </p:nvPicPr>
+        <p:blipFill>
+          <a:blip r:embed="rId2"/>
+          <a:stretch>
+            <a:fillRect/>
+          </a:stretch>
+        </p:blipFill>
+        <p:spPr>
+          <a:xfrm>
+            <a:off x="394301" y="351121"/>
+            <a:ext cx="360000" cy="258170"/>
+          </a:xfrm>
+          <a:prstGeom prst="rect">
+            <a:avLst/>
+          </a:prstGeom>
+        </p:spPr>
+      </p:pic>
+      <p:pic>
+        <p:nvPicPr>
+          <p:cNvPr id="40" name="그림 39"/>
+          <p:cNvPicPr>
+            <a:picLocks noChangeAspect="1"/>
+          </p:cNvPicPr>
+          <p:nvPr/>
+        </p:nvPicPr>
+        <p:blipFill>
+          <a:blip r:embed="rId2"/>
+          <a:stretch>
+            <a:fillRect/>
+          </a:stretch>
+        </p:blipFill>
+        <p:spPr>
+          <a:xfrm>
+            <a:off x="394301" y="838715"/>
+            <a:ext cx="360000" cy="258170"/>
+          </a:xfrm>
+          <a:prstGeom prst="rect">
+            <a:avLst/>
+          </a:prstGeom>
+        </p:spPr>
+      </p:pic>
+      <p:grpSp>
+        <p:nvGrpSpPr>
+          <p:cNvPr id="62" name="그룹 61"/>
+          <p:cNvGrpSpPr/>
+          <p:nvPr/>
+        </p:nvGrpSpPr>
+        <p:grpSpPr>
+          <a:xfrm>
+            <a:off x="394301" y="1375421"/>
+            <a:ext cx="2023849" cy="793123"/>
+            <a:chOff x="394301" y="1375421"/>
+            <a:chExt cx="2023849" cy="793123"/>
+          </a:xfrm>
+        </p:grpSpPr>
+        <p:sp>
+          <p:nvSpPr>
+            <p:cNvPr id="11" name="모서리가 둥근 직사각형 10"/>
+            <p:cNvSpPr/>
+            <p:nvPr/>
+          </p:nvSpPr>
+          <p:spPr>
+            <a:xfrm>
+              <a:off x="438150" y="1520544"/>
+              <a:ext cx="1980000" cy="648000"/>
+            </a:xfrm>
+            <a:prstGeom prst="roundRect">
+              <a:avLst/>
+            </a:prstGeom>
+            <a:solidFill>
+              <a:schemeClr val="accent5">
+                <a:lumMod val="40000"/>
+                <a:lumOff val="60000"/>
+              </a:schemeClr>
+            </a:solidFill>
+            <a:ln>
+              <a:solidFill>
+                <a:schemeClr val="accent5">
+                  <a:lumMod val="60000"/>
+                  <a:lumOff val="40000"/>
+                </a:schemeClr>
+              </a:solidFill>
+            </a:ln>
+          </p:spPr>
+          <p:style>
+            <a:lnRef idx="2">
+              <a:schemeClr val="accent1">
+                <a:shade val="50000"/>
+              </a:schemeClr>
+            </a:lnRef>
+            <a:fillRef idx="1">
+              <a:schemeClr val="accent1"/>
+            </a:fillRef>
+            <a:effectRef idx="0">
+              <a:schemeClr val="accent1"/>
+            </a:effectRef>
+            <a:fontRef idx="minor">
+              <a:schemeClr val="lt1"/>
+            </a:fontRef>
+          </p:style>
+          <p:txBody>
+            <a:bodyPr lIns="36000" tIns="36000" rIns="36000" bIns="36000" rtlCol="0" anchor="ctr"/>
+            <a:lstStyle/>
+            <a:p>
+              <a:pPr algn="ctr"/>
+              <a:r>
+                <a:rPr lang="en-US" altLang="ko-KR" b="1" dirty="0" smtClean="0">
+                  <a:solidFill>
+                    <a:schemeClr val="tx1"/>
+                  </a:solidFill>
+                </a:rPr>
+                <a:t>Host Container</a:t>
+              </a:r>
+              <a:endParaRPr lang="ko-KR" altLang="en-US" b="1" dirty="0">
+                <a:solidFill>
+                  <a:schemeClr val="tx1"/>
+                </a:solidFill>
+              </a:endParaRPr>
+            </a:p>
+          </p:txBody>
+        </p:sp>
+        <p:pic>
+          <p:nvPicPr>
+            <p:cNvPr id="41" name="그림 40"/>
+            <p:cNvPicPr>
+              <a:picLocks noChangeAspect="1"/>
+            </p:cNvPicPr>
+            <p:nvPr/>
+          </p:nvPicPr>
+          <p:blipFill>
+            <a:blip r:embed="rId2"/>
+            <a:stretch>
+              <a:fillRect/>
+            </a:stretch>
+          </p:blipFill>
+          <p:spPr>
+            <a:xfrm>
+              <a:off x="394301" y="1375421"/>
+              <a:ext cx="360000" cy="258170"/>
+            </a:xfrm>
+            <a:prstGeom prst="rect">
+              <a:avLst/>
+            </a:prstGeom>
+          </p:spPr>
+        </p:pic>
+      </p:grpSp>
+      <p:grpSp>
+        <p:nvGrpSpPr>
+          <p:cNvPr id="61" name="그룹 60"/>
+          <p:cNvGrpSpPr/>
+          <p:nvPr/>
+        </p:nvGrpSpPr>
+        <p:grpSpPr>
+          <a:xfrm>
+            <a:off x="2490150" y="1348400"/>
+            <a:ext cx="1440001" cy="820144"/>
+            <a:chOff x="2490149" y="1348400"/>
+            <a:chExt cx="1440001" cy="820144"/>
+          </a:xfrm>
+        </p:grpSpPr>
+        <p:sp>
+          <p:nvSpPr>
+            <p:cNvPr id="16" name="모서리가 둥근 직사각형 15"/>
+            <p:cNvSpPr/>
+            <p:nvPr/>
+          </p:nvSpPr>
+          <p:spPr>
+            <a:xfrm>
+              <a:off x="2490150" y="1515614"/>
+              <a:ext cx="1440000" cy="652930"/>
+            </a:xfrm>
+            <a:prstGeom prst="roundRect">
+              <a:avLst/>
+            </a:prstGeom>
+            <a:solidFill>
+              <a:schemeClr val="accent1">
+                <a:lumMod val="40000"/>
+                <a:lumOff val="60000"/>
+              </a:schemeClr>
+            </a:solidFill>
+          </p:spPr>
+          <p:style>
+            <a:lnRef idx="2">
+              <a:schemeClr val="accent1">
+                <a:shade val="50000"/>
+              </a:schemeClr>
+            </a:lnRef>
+            <a:fillRef idx="1">
+              <a:schemeClr val="accent1"/>
+            </a:fillRef>
+            <a:effectRef idx="0">
+              <a:schemeClr val="accent1"/>
+            </a:effectRef>
+            <a:fontRef idx="minor">
+              <a:schemeClr val="lt1"/>
+            </a:fontRef>
+          </p:style>
+          <p:txBody>
+            <a:bodyPr lIns="36000" tIns="36000" rIns="36000" bIns="36000" rtlCol="0" anchor="ctr"/>
+            <a:lstStyle/>
+            <a:p>
+              <a:pPr algn="ctr"/>
+              <a:r>
+                <a:rPr lang="en-US" altLang="ko-KR" b="1" dirty="0" smtClean="0">
+                  <a:solidFill>
+                    <a:schemeClr val="tx1"/>
+                  </a:solidFill>
+                </a:rPr>
+                <a:t>Container 1</a:t>
+              </a:r>
+              <a:endParaRPr lang="ko-KR" altLang="en-US" b="1" dirty="0">
+                <a:solidFill>
+                  <a:schemeClr val="tx1"/>
+                </a:solidFill>
+              </a:endParaRPr>
+            </a:p>
+          </p:txBody>
+        </p:sp>
+        <p:pic>
+          <p:nvPicPr>
+            <p:cNvPr id="42" name="그림 41"/>
+            <p:cNvPicPr>
+              <a:picLocks noChangeAspect="1"/>
+            </p:cNvPicPr>
+            <p:nvPr/>
+          </p:nvPicPr>
+          <p:blipFill>
+            <a:blip r:embed="rId2"/>
+            <a:stretch>
+              <a:fillRect/>
+            </a:stretch>
+          </p:blipFill>
+          <p:spPr>
+            <a:xfrm>
+              <a:off x="2490149" y="1348400"/>
+              <a:ext cx="360000" cy="258170"/>
+            </a:xfrm>
+            <a:prstGeom prst="rect">
+              <a:avLst/>
+            </a:prstGeom>
+          </p:spPr>
+        </p:pic>
+      </p:grpSp>
+      <p:grpSp>
+        <p:nvGrpSpPr>
+          <p:cNvPr id="60" name="그룹 59"/>
+          <p:cNvGrpSpPr/>
+          <p:nvPr/>
+        </p:nvGrpSpPr>
+        <p:grpSpPr>
+          <a:xfrm>
+            <a:off x="4002150" y="1348400"/>
+            <a:ext cx="1476000" cy="820144"/>
+            <a:chOff x="4002150" y="1348400"/>
+            <a:chExt cx="1476000" cy="820144"/>
+          </a:xfrm>
+        </p:grpSpPr>
+        <p:sp>
+          <p:nvSpPr>
+            <p:cNvPr id="17" name="모서리가 둥근 직사각형 16"/>
+            <p:cNvSpPr/>
+            <p:nvPr/>
+          </p:nvSpPr>
+          <p:spPr>
+            <a:xfrm>
+              <a:off x="4038150" y="1515614"/>
+              <a:ext cx="1440000" cy="652930"/>
+            </a:xfrm>
+            <a:prstGeom prst="roundRect">
+              <a:avLst/>
+            </a:prstGeom>
+            <a:solidFill>
+              <a:schemeClr val="accent1">
+                <a:lumMod val="40000"/>
+                <a:lumOff val="60000"/>
+              </a:schemeClr>
+            </a:solidFill>
+          </p:spPr>
+          <p:style>
+            <a:lnRef idx="2">
+              <a:schemeClr val="accent1">
+                <a:shade val="50000"/>
+              </a:schemeClr>
+            </a:lnRef>
+            <a:fillRef idx="1">
+              <a:schemeClr val="accent1"/>
+            </a:fillRef>
+            <a:effectRef idx="0">
+              <a:schemeClr val="accent1"/>
+            </a:effectRef>
+            <a:fontRef idx="minor">
+              <a:schemeClr val="lt1"/>
+            </a:fontRef>
+          </p:style>
+          <p:txBody>
+            <a:bodyPr lIns="36000" tIns="36000" rIns="36000" bIns="36000" rtlCol="0" anchor="ctr"/>
+            <a:lstStyle/>
+            <a:p>
+              <a:pPr algn="ctr"/>
+              <a:r>
+                <a:rPr lang="en-US" altLang="ko-KR" b="1" dirty="0" smtClean="0">
+                  <a:solidFill>
+                    <a:schemeClr val="tx1"/>
+                  </a:solidFill>
+                </a:rPr>
+                <a:t>Container 2</a:t>
+              </a:r>
+              <a:endParaRPr lang="ko-KR" altLang="en-US" b="1" dirty="0">
+                <a:solidFill>
+                  <a:schemeClr val="tx1"/>
+                </a:solidFill>
+              </a:endParaRPr>
+            </a:p>
+          </p:txBody>
+        </p:sp>
+        <p:pic>
+          <p:nvPicPr>
+            <p:cNvPr id="43" name="그림 42"/>
+            <p:cNvPicPr>
+              <a:picLocks noChangeAspect="1"/>
+            </p:cNvPicPr>
+            <p:nvPr/>
+          </p:nvPicPr>
+          <p:blipFill>
+            <a:blip r:embed="rId2"/>
+            <a:stretch>
+              <a:fillRect/>
+            </a:stretch>
+          </p:blipFill>
+          <p:spPr>
+            <a:xfrm>
+              <a:off x="4002150" y="1348400"/>
+              <a:ext cx="360000" cy="258170"/>
+            </a:xfrm>
+            <a:prstGeom prst="rect">
+              <a:avLst/>
+            </a:prstGeom>
+          </p:spPr>
+        </p:pic>
+      </p:grpSp>
+      <p:sp>
+        <p:nvSpPr>
+          <p:cNvPr id="44" name="모서리가 둥근 직사각형 43"/>
+          <p:cNvSpPr/>
+          <p:nvPr/>
+        </p:nvSpPr>
+        <p:spPr>
+          <a:xfrm>
+            <a:off x="438150" y="5413556"/>
+            <a:ext cx="8136001" cy="648000"/>
+          </a:xfrm>
+          <a:prstGeom prst="roundRect">
+            <a:avLst/>
+          </a:prstGeom>
+        </p:spPr>
+        <p:style>
+          <a:lnRef idx="2">
+            <a:schemeClr val="accent1">
+              <a:shade val="50000"/>
+            </a:schemeClr>
+          </a:lnRef>
+          <a:fillRef idx="1">
+            <a:schemeClr val="accent1"/>
+          </a:fillRef>
+          <a:effectRef idx="0">
+            <a:schemeClr val="accent1"/>
+          </a:effectRef>
+          <a:fontRef idx="minor">
+            <a:schemeClr val="lt1"/>
+          </a:fontRef>
+        </p:style>
+        <p:txBody>
+          <a:bodyPr lIns="36000" tIns="36000" rIns="36000" bIns="36000" rtlCol="0" anchor="ctr"/>
+          <a:lstStyle/>
+          <a:p>
+            <a:pPr algn="ctr"/>
+            <a:r>
+              <a:rPr lang="en-US" altLang="ko-KR" b="1" dirty="0" smtClean="0"/>
+              <a:t>Docker</a:t>
+            </a:r>
+            <a:br>
+              <a:rPr lang="en-US" altLang="ko-KR" b="1" dirty="0" smtClean="0"/>
+            </a:br>
+            <a:r>
+              <a:rPr lang="en-US" altLang="ko-KR" b="1" dirty="0" smtClean="0"/>
+              <a:t>(Host Machine)</a:t>
+            </a:r>
+            <a:endParaRPr lang="ko-KR" altLang="en-US" b="1" dirty="0"/>
+          </a:p>
+        </p:txBody>
+      </p:sp>
+      <p:grpSp>
+        <p:nvGrpSpPr>
+          <p:cNvPr id="59" name="그룹 58"/>
+          <p:cNvGrpSpPr/>
+          <p:nvPr/>
+        </p:nvGrpSpPr>
+        <p:grpSpPr>
+          <a:xfrm>
+            <a:off x="394301" y="4324751"/>
+            <a:ext cx="2023849" cy="793123"/>
+            <a:chOff x="394301" y="4456949"/>
+            <a:chExt cx="2023849" cy="793123"/>
+          </a:xfrm>
+        </p:grpSpPr>
+        <p:sp>
+          <p:nvSpPr>
+            <p:cNvPr id="45" name="모서리가 둥근 직사각형 44"/>
+            <p:cNvSpPr/>
+            <p:nvPr/>
+          </p:nvSpPr>
+          <p:spPr>
+            <a:xfrm>
+              <a:off x="438150" y="4602072"/>
+              <a:ext cx="1980000" cy="648000"/>
+            </a:xfrm>
+            <a:prstGeom prst="roundRect">
+              <a:avLst/>
+            </a:prstGeom>
+            <a:solidFill>
+              <a:schemeClr val="accent5">
+                <a:lumMod val="40000"/>
+                <a:lumOff val="60000"/>
+              </a:schemeClr>
+            </a:solidFill>
+            <a:ln>
+              <a:solidFill>
+                <a:schemeClr val="accent5">
+                  <a:lumMod val="60000"/>
+                  <a:lumOff val="40000"/>
+                </a:schemeClr>
+              </a:solidFill>
+            </a:ln>
+          </p:spPr>
+          <p:style>
+            <a:lnRef idx="2">
+              <a:schemeClr val="accent1">
+                <a:shade val="50000"/>
+              </a:schemeClr>
+            </a:lnRef>
+            <a:fillRef idx="1">
+              <a:schemeClr val="accent1"/>
+            </a:fillRef>
+            <a:effectRef idx="0">
+              <a:schemeClr val="accent1"/>
+            </a:effectRef>
+            <a:fontRef idx="minor">
+              <a:schemeClr val="lt1"/>
+            </a:fontRef>
+          </p:style>
+          <p:txBody>
+            <a:bodyPr lIns="36000" tIns="36000" rIns="36000" bIns="36000" rtlCol="0" anchor="ctr"/>
+            <a:lstStyle/>
+            <a:p>
+              <a:pPr algn="ctr"/>
+              <a:r>
+                <a:rPr lang="en-US" altLang="ko-KR" b="1" dirty="0" smtClean="0">
+                  <a:solidFill>
+                    <a:schemeClr val="tx1"/>
+                  </a:solidFill>
+                </a:rPr>
+                <a:t>Agent Container</a:t>
+              </a:r>
+              <a:endParaRPr lang="ko-KR" altLang="en-US" b="1" dirty="0">
+                <a:solidFill>
+                  <a:schemeClr val="tx1"/>
+                </a:solidFill>
+              </a:endParaRPr>
+            </a:p>
+          </p:txBody>
+        </p:sp>
+        <p:pic>
+          <p:nvPicPr>
+            <p:cNvPr id="48" name="그림 47"/>
+            <p:cNvPicPr>
+              <a:picLocks noChangeAspect="1"/>
+            </p:cNvPicPr>
+            <p:nvPr/>
+          </p:nvPicPr>
+          <p:blipFill>
+            <a:blip r:embed="rId2"/>
+            <a:stretch>
+              <a:fillRect/>
+            </a:stretch>
+          </p:blipFill>
+          <p:spPr>
+            <a:xfrm>
+              <a:off x="394301" y="4456949"/>
+              <a:ext cx="360000" cy="258170"/>
+            </a:xfrm>
+            <a:prstGeom prst="rect">
+              <a:avLst/>
+            </a:prstGeom>
+          </p:spPr>
+        </p:pic>
+      </p:grpSp>
+      <p:grpSp>
+        <p:nvGrpSpPr>
+          <p:cNvPr id="55" name="그룹 54"/>
+          <p:cNvGrpSpPr/>
+          <p:nvPr/>
+        </p:nvGrpSpPr>
+        <p:grpSpPr>
+          <a:xfrm>
+            <a:off x="2499150" y="4297730"/>
+            <a:ext cx="1440001" cy="820144"/>
+            <a:chOff x="2490149" y="4429928"/>
+            <a:chExt cx="1440001" cy="820144"/>
+          </a:xfrm>
+        </p:grpSpPr>
+        <p:sp>
+          <p:nvSpPr>
+            <p:cNvPr id="46" name="모서리가 둥근 직사각형 45"/>
+            <p:cNvSpPr/>
+            <p:nvPr/>
+          </p:nvSpPr>
+          <p:spPr>
+            <a:xfrm>
+              <a:off x="2490150" y="4597142"/>
+              <a:ext cx="1440000" cy="652930"/>
+            </a:xfrm>
+            <a:prstGeom prst="roundRect">
+              <a:avLst/>
+            </a:prstGeom>
+            <a:solidFill>
+              <a:schemeClr val="accent1">
+                <a:lumMod val="40000"/>
+                <a:lumOff val="60000"/>
+              </a:schemeClr>
+            </a:solidFill>
+          </p:spPr>
+          <p:style>
+            <a:lnRef idx="2">
+              <a:schemeClr val="accent1">
+                <a:shade val="50000"/>
+              </a:schemeClr>
+            </a:lnRef>
+            <a:fillRef idx="1">
+              <a:schemeClr val="accent1"/>
+            </a:fillRef>
+            <a:effectRef idx="0">
+              <a:schemeClr val="accent1"/>
+            </a:effectRef>
+            <a:fontRef idx="minor">
+              <a:schemeClr val="lt1"/>
+            </a:fontRef>
+          </p:style>
+          <p:txBody>
+            <a:bodyPr lIns="36000" tIns="36000" rIns="36000" bIns="36000" rtlCol="0" anchor="ctr"/>
+            <a:lstStyle/>
+            <a:p>
+              <a:pPr algn="ctr"/>
+              <a:r>
+                <a:rPr lang="en-US" altLang="ko-KR" b="1" dirty="0" smtClean="0">
+                  <a:solidFill>
+                    <a:schemeClr val="tx1"/>
+                  </a:solidFill>
+                </a:rPr>
+                <a:t>Container 3</a:t>
+              </a:r>
+              <a:endParaRPr lang="ko-KR" altLang="en-US" b="1" dirty="0">
+                <a:solidFill>
+                  <a:schemeClr val="tx1"/>
+                </a:solidFill>
+              </a:endParaRPr>
+            </a:p>
+          </p:txBody>
+        </p:sp>
+        <p:pic>
+          <p:nvPicPr>
+            <p:cNvPr id="49" name="그림 48"/>
+            <p:cNvPicPr>
+              <a:picLocks noChangeAspect="1"/>
+            </p:cNvPicPr>
+            <p:nvPr/>
+          </p:nvPicPr>
+          <p:blipFill>
+            <a:blip r:embed="rId2"/>
+            <a:stretch>
+              <a:fillRect/>
+            </a:stretch>
+          </p:blipFill>
+          <p:spPr>
+            <a:xfrm>
+              <a:off x="2490149" y="4429928"/>
+              <a:ext cx="360000" cy="258170"/>
+            </a:xfrm>
+            <a:prstGeom prst="rect">
+              <a:avLst/>
+            </a:prstGeom>
+          </p:spPr>
+        </p:pic>
+      </p:grpSp>
+      <p:grpSp>
+        <p:nvGrpSpPr>
+          <p:cNvPr id="56" name="그룹 55"/>
+          <p:cNvGrpSpPr/>
+          <p:nvPr/>
+        </p:nvGrpSpPr>
+        <p:grpSpPr>
+          <a:xfrm>
+            <a:off x="4020151" y="4297730"/>
+            <a:ext cx="1476000" cy="820144"/>
+            <a:chOff x="4002150" y="4429928"/>
+            <a:chExt cx="1476000" cy="820144"/>
+          </a:xfrm>
+        </p:grpSpPr>
+        <p:sp>
+          <p:nvSpPr>
+            <p:cNvPr id="47" name="모서리가 둥근 직사각형 46"/>
+            <p:cNvSpPr/>
+            <p:nvPr/>
+          </p:nvSpPr>
+          <p:spPr>
+            <a:xfrm>
+              <a:off x="4038150" y="4597142"/>
+              <a:ext cx="1440000" cy="652930"/>
+            </a:xfrm>
+            <a:prstGeom prst="roundRect">
+              <a:avLst/>
+            </a:prstGeom>
+            <a:solidFill>
+              <a:schemeClr val="accent1">
+                <a:lumMod val="40000"/>
+                <a:lumOff val="60000"/>
+              </a:schemeClr>
+            </a:solidFill>
+          </p:spPr>
+          <p:style>
+            <a:lnRef idx="2">
+              <a:schemeClr val="accent1">
+                <a:shade val="50000"/>
+              </a:schemeClr>
+            </a:lnRef>
+            <a:fillRef idx="1">
+              <a:schemeClr val="accent1"/>
+            </a:fillRef>
+            <a:effectRef idx="0">
+              <a:schemeClr val="accent1"/>
+            </a:effectRef>
+            <a:fontRef idx="minor">
+              <a:schemeClr val="lt1"/>
+            </a:fontRef>
+          </p:style>
+          <p:txBody>
+            <a:bodyPr lIns="36000" tIns="36000" rIns="36000" bIns="36000" rtlCol="0" anchor="ctr"/>
+            <a:lstStyle/>
+            <a:p>
+              <a:pPr algn="ctr"/>
+              <a:r>
+                <a:rPr lang="en-US" altLang="ko-KR" b="1" dirty="0" smtClean="0">
+                  <a:solidFill>
+                    <a:schemeClr val="tx1"/>
+                  </a:solidFill>
+                </a:rPr>
+                <a:t>Container 4</a:t>
+              </a:r>
+              <a:endParaRPr lang="ko-KR" altLang="en-US" b="1" dirty="0">
+                <a:solidFill>
+                  <a:schemeClr val="tx1"/>
+                </a:solidFill>
+              </a:endParaRPr>
+            </a:p>
+          </p:txBody>
+        </p:sp>
+        <p:pic>
+          <p:nvPicPr>
+            <p:cNvPr id="50" name="그림 49"/>
+            <p:cNvPicPr>
+              <a:picLocks noChangeAspect="1"/>
+            </p:cNvPicPr>
+            <p:nvPr/>
+          </p:nvPicPr>
+          <p:blipFill>
+            <a:blip r:embed="rId2"/>
+            <a:stretch>
+              <a:fillRect/>
+            </a:stretch>
+          </p:blipFill>
+          <p:spPr>
+            <a:xfrm>
+              <a:off x="4002150" y="4429928"/>
+              <a:ext cx="360000" cy="258170"/>
+            </a:xfrm>
+            <a:prstGeom prst="rect">
+              <a:avLst/>
+            </a:prstGeom>
+          </p:spPr>
+        </p:pic>
+      </p:grpSp>
+      <p:grpSp>
+        <p:nvGrpSpPr>
+          <p:cNvPr id="57" name="그룹 56"/>
+          <p:cNvGrpSpPr/>
+          <p:nvPr/>
+        </p:nvGrpSpPr>
+        <p:grpSpPr>
+          <a:xfrm>
+            <a:off x="5577151" y="4297730"/>
+            <a:ext cx="1440001" cy="820144"/>
+            <a:chOff x="5586150" y="4429928"/>
+            <a:chExt cx="1440001" cy="820144"/>
+          </a:xfrm>
+        </p:grpSpPr>
+        <p:sp>
+          <p:nvSpPr>
+            <p:cNvPr id="51" name="모서리가 둥근 직사각형 50"/>
+            <p:cNvSpPr/>
+            <p:nvPr/>
+          </p:nvSpPr>
+          <p:spPr>
+            <a:xfrm>
+              <a:off x="5586151" y="4597142"/>
+              <a:ext cx="1440000" cy="652930"/>
+            </a:xfrm>
+            <a:prstGeom prst="roundRect">
+              <a:avLst/>
+            </a:prstGeom>
+            <a:solidFill>
+              <a:schemeClr val="accent1">
+                <a:lumMod val="40000"/>
+                <a:lumOff val="60000"/>
+              </a:schemeClr>
+            </a:solidFill>
+          </p:spPr>
+          <p:style>
+            <a:lnRef idx="2">
+              <a:schemeClr val="accent1">
+                <a:shade val="50000"/>
+              </a:schemeClr>
+            </a:lnRef>
+            <a:fillRef idx="1">
+              <a:schemeClr val="accent1"/>
+            </a:fillRef>
+            <a:effectRef idx="0">
+              <a:schemeClr val="accent1"/>
+            </a:effectRef>
+            <a:fontRef idx="minor">
+              <a:schemeClr val="lt1"/>
+            </a:fontRef>
+          </p:style>
+          <p:txBody>
+            <a:bodyPr lIns="36000" tIns="36000" rIns="36000" bIns="36000" rtlCol="0" anchor="ctr"/>
+            <a:lstStyle/>
+            <a:p>
+              <a:pPr algn="ctr"/>
+              <a:r>
+                <a:rPr lang="en-US" altLang="ko-KR" b="1" dirty="0" smtClean="0">
+                  <a:solidFill>
+                    <a:schemeClr val="tx1"/>
+                  </a:solidFill>
+                </a:rPr>
+                <a:t>Container 1</a:t>
+              </a:r>
+              <a:endParaRPr lang="ko-KR" altLang="en-US" b="1" dirty="0">
+                <a:solidFill>
+                  <a:schemeClr val="tx1"/>
+                </a:solidFill>
+              </a:endParaRPr>
+            </a:p>
+          </p:txBody>
+        </p:sp>
+        <p:pic>
+          <p:nvPicPr>
+            <p:cNvPr id="53" name="그림 52"/>
+            <p:cNvPicPr>
+              <a:picLocks noChangeAspect="1"/>
+            </p:cNvPicPr>
+            <p:nvPr/>
+          </p:nvPicPr>
+          <p:blipFill>
+            <a:blip r:embed="rId2"/>
+            <a:stretch>
+              <a:fillRect/>
+            </a:stretch>
+          </p:blipFill>
+          <p:spPr>
+            <a:xfrm>
+              <a:off x="5586150" y="4429928"/>
+              <a:ext cx="360000" cy="258170"/>
+            </a:xfrm>
+            <a:prstGeom prst="rect">
+              <a:avLst/>
+            </a:prstGeom>
+          </p:spPr>
+        </p:pic>
+      </p:grpSp>
+      <p:grpSp>
+        <p:nvGrpSpPr>
+          <p:cNvPr id="58" name="그룹 57"/>
+          <p:cNvGrpSpPr/>
+          <p:nvPr/>
+        </p:nvGrpSpPr>
+        <p:grpSpPr>
+          <a:xfrm>
+            <a:off x="7098151" y="4297730"/>
+            <a:ext cx="1476000" cy="820144"/>
+            <a:chOff x="7098151" y="4429928"/>
+            <a:chExt cx="1476000" cy="820144"/>
+          </a:xfrm>
+        </p:grpSpPr>
+        <p:sp>
+          <p:nvSpPr>
+            <p:cNvPr id="52" name="모서리가 둥근 직사각형 51"/>
+            <p:cNvSpPr/>
+            <p:nvPr/>
+          </p:nvSpPr>
+          <p:spPr>
+            <a:xfrm>
+              <a:off x="7134151" y="4597142"/>
+              <a:ext cx="1440000" cy="652930"/>
+            </a:xfrm>
+            <a:prstGeom prst="roundRect">
+              <a:avLst/>
+            </a:prstGeom>
+            <a:solidFill>
+              <a:schemeClr val="accent1">
+                <a:lumMod val="40000"/>
+                <a:lumOff val="60000"/>
+              </a:schemeClr>
+            </a:solidFill>
+          </p:spPr>
+          <p:style>
+            <a:lnRef idx="2">
+              <a:schemeClr val="accent1">
+                <a:shade val="50000"/>
+              </a:schemeClr>
+            </a:lnRef>
+            <a:fillRef idx="1">
+              <a:schemeClr val="accent1"/>
+            </a:fillRef>
+            <a:effectRef idx="0">
+              <a:schemeClr val="accent1"/>
+            </a:effectRef>
+            <a:fontRef idx="minor">
+              <a:schemeClr val="lt1"/>
+            </a:fontRef>
+          </p:style>
+          <p:txBody>
+            <a:bodyPr lIns="36000" tIns="36000" rIns="36000" bIns="36000" rtlCol="0" anchor="ctr"/>
+            <a:lstStyle/>
+            <a:p>
+              <a:pPr algn="ctr"/>
+              <a:r>
+                <a:rPr lang="en-US" altLang="ko-KR" b="1" dirty="0" smtClean="0">
+                  <a:solidFill>
+                    <a:schemeClr val="tx1"/>
+                  </a:solidFill>
+                </a:rPr>
+                <a:t>Container 2</a:t>
+              </a:r>
+              <a:endParaRPr lang="ko-KR" altLang="en-US" b="1" dirty="0">
+                <a:solidFill>
+                  <a:schemeClr val="tx1"/>
+                </a:solidFill>
+              </a:endParaRPr>
+            </a:p>
+          </p:txBody>
+        </p:sp>
+        <p:pic>
+          <p:nvPicPr>
+            <p:cNvPr id="54" name="그림 53"/>
+            <p:cNvPicPr>
+              <a:picLocks noChangeAspect="1"/>
+            </p:cNvPicPr>
+            <p:nvPr/>
+          </p:nvPicPr>
+          <p:blipFill>
+            <a:blip r:embed="rId2"/>
+            <a:stretch>
+              <a:fillRect/>
+            </a:stretch>
+          </p:blipFill>
+          <p:spPr>
+            <a:xfrm>
+              <a:off x="7098151" y="4429928"/>
+              <a:ext cx="360000" cy="258170"/>
+            </a:xfrm>
+            <a:prstGeom prst="rect">
+              <a:avLst/>
+            </a:prstGeom>
+          </p:spPr>
+        </p:pic>
+      </p:grpSp>
+      <p:cxnSp>
+        <p:nvCxnSpPr>
+          <p:cNvPr id="73" name="직선 화살표 연결선 72"/>
+          <p:cNvCxnSpPr>
+            <a:stCxn id="45" idx="2"/>
+          </p:cNvCxnSpPr>
+          <p:nvPr/>
+        </p:nvCxnSpPr>
+        <p:spPr>
+          <a:xfrm>
+            <a:off x="1428150" y="5117874"/>
+            <a:ext cx="1790701" cy="268250"/>
+          </a:xfrm>
+          <a:prstGeom prst="straightConnector1">
+            <a:avLst/>
+          </a:prstGeom>
+          <a:ln w="12700">
+            <a:solidFill>
+              <a:srgbClr val="FF0000"/>
+            </a:solidFill>
+            <a:tailEnd type="triangle"/>
+          </a:ln>
+        </p:spPr>
+        <p:style>
+          <a:lnRef idx="1">
+            <a:schemeClr val="accent1"/>
+          </a:lnRef>
+          <a:fillRef idx="0">
+            <a:schemeClr val="accent1"/>
+          </a:fillRef>
+          <a:effectRef idx="0">
+            <a:schemeClr val="accent1"/>
+          </a:effectRef>
+          <a:fontRef idx="minor">
+            <a:schemeClr val="tx1"/>
+          </a:fontRef>
+        </p:style>
+      </p:cxnSp>
+      <p:cxnSp>
+        <p:nvCxnSpPr>
+          <p:cNvPr id="74" name="직선 화살표 연결선 73"/>
+          <p:cNvCxnSpPr>
+            <a:endCxn id="46" idx="2"/>
+          </p:cNvCxnSpPr>
+          <p:nvPr/>
+        </p:nvCxnSpPr>
+        <p:spPr>
+          <a:xfrm flipV="1">
+            <a:off x="3218851" y="5117874"/>
+            <a:ext cx="300" cy="288000"/>
+          </a:xfrm>
+          <a:prstGeom prst="straightConnector1">
+            <a:avLst/>
+          </a:prstGeom>
+          <a:ln w="12700">
+            <a:solidFill>
+              <a:srgbClr val="FF0000"/>
+            </a:solidFill>
+            <a:tailEnd type="triangle"/>
+          </a:ln>
+        </p:spPr>
+        <p:style>
+          <a:lnRef idx="1">
+            <a:schemeClr val="accent1"/>
+          </a:lnRef>
+          <a:fillRef idx="0">
+            <a:schemeClr val="accent1"/>
+          </a:fillRef>
+          <a:effectRef idx="0">
+            <a:schemeClr val="accent1"/>
+          </a:effectRef>
+          <a:fontRef idx="minor">
+            <a:schemeClr val="tx1"/>
+          </a:fontRef>
+        </p:style>
+      </p:cxnSp>
+      <p:cxnSp>
+        <p:nvCxnSpPr>
+          <p:cNvPr id="77" name="직선 화살표 연결선 76"/>
+          <p:cNvCxnSpPr>
+            <a:endCxn id="47" idx="2"/>
+          </p:cNvCxnSpPr>
+          <p:nvPr/>
+        </p:nvCxnSpPr>
+        <p:spPr>
+          <a:xfrm flipV="1">
+            <a:off x="4776151" y="5117873"/>
+            <a:ext cx="0" cy="288000"/>
+          </a:xfrm>
+          <a:prstGeom prst="straightConnector1">
+            <a:avLst/>
+          </a:prstGeom>
+          <a:ln w="12700">
+            <a:solidFill>
+              <a:srgbClr val="FF0000"/>
+            </a:solidFill>
+            <a:tailEnd type="triangle"/>
+          </a:ln>
+        </p:spPr>
+        <p:style>
+          <a:lnRef idx="1">
+            <a:schemeClr val="accent1"/>
+          </a:lnRef>
+          <a:fillRef idx="0">
+            <a:schemeClr val="accent1"/>
+          </a:fillRef>
+          <a:effectRef idx="0">
+            <a:schemeClr val="accent1"/>
+          </a:effectRef>
+          <a:fontRef idx="minor">
+            <a:schemeClr val="tx1"/>
+          </a:fontRef>
+        </p:style>
+      </p:cxnSp>
+      <p:sp>
+        <p:nvSpPr>
+          <p:cNvPr id="81" name="TextBox 80"/>
+          <p:cNvSpPr txBox="1"/>
+          <p:nvPr/>
+        </p:nvSpPr>
+        <p:spPr>
+          <a:xfrm>
+            <a:off x="3645307" y="5122105"/>
+            <a:ext cx="704088" cy="307777"/>
+          </a:xfrm>
+          <a:prstGeom prst="rect">
+            <a:avLst/>
+          </a:prstGeom>
+          <a:noFill/>
+        </p:spPr>
+        <p:txBody>
+          <a:bodyPr wrap="square" rtlCol="0">
+            <a:spAutoFit/>
+          </a:bodyPr>
+          <a:lstStyle/>
+          <a:p>
+            <a:r>
+              <a:rPr lang="en-US" altLang="ko-KR" sz="1400" dirty="0" smtClean="0">
+                <a:solidFill>
+                  <a:srgbClr val="FF0000"/>
+                </a:solidFill>
+              </a:rPr>
+              <a:t>create</a:t>
+            </a:r>
+            <a:endParaRPr lang="ko-KR" altLang="en-US" sz="1400" dirty="0">
+              <a:solidFill>
+                <a:srgbClr val="FF0000"/>
+              </a:solidFill>
+            </a:endParaRPr>
+          </a:p>
+        </p:txBody>
+      </p:sp>
+    </p:spTree>
+    <p:extLst>
+      <p:ext uri="{BB962C8B-B14F-4D97-AF65-F5344CB8AC3E}">
+        <p14:creationId xmlns:p14="http://schemas.microsoft.com/office/powerpoint/2010/main" val="2291894328"/>
+      </p:ext>
+    </p:extLst>
+  </p:cSld>
+  <p:clrMapOvr>
+    <a:masterClrMapping/>
+  </p:clrMapOvr>
+  <p:timing>
+    <p:tnLst>
+      <p:par>
+        <p:cTn id="1" dur="indefinite" restart="never" nodeType="tmRoot"/>
+      </p:par>
+    </p:tnLst>
+  </p:timing>
+</p:sld>
+</file>
+
+<file path=ppt/slides/slide5.xml><?xml version="1.0" encoding="utf-8"?>
+<p:sld xmlns:a="http://schemas.openxmlformats.org/drawingml/2006/main" xmlns:r="http://schemas.openxmlformats.org/officeDocument/2006/relationships" xmlns:p="http://schemas.openxmlformats.org/presentationml/2006/main">
+  <p:cSld>
+    <p:spTree>
+      <p:nvGrpSpPr>
+        <p:cNvPr id="1" name=""/>
+        <p:cNvGrpSpPr/>
+        <p:nvPr/>
+      </p:nvGrpSpPr>
+      <p:grpSpPr>
+        <a:xfrm>
+          <a:off x="0" y="0"/>
+          <a:ext cx="0" cy="0"/>
+          <a:chOff x="0" y="0"/>
+          <a:chExt cx="0" cy="0"/>
+        </a:xfrm>
+      </p:grpSpPr>
       <p:grpSp>
         <p:nvGrpSpPr>
           <p:cNvPr id="48" name="그룹 47"/>
@@ -10046,7 +11424,7 @@
 </p:sld>
 </file>
 
-<file path=ppt/slides/slide5.xml><?xml version="1.0" encoding="utf-8"?>
+<file path=ppt/slides/slide6.xml><?xml version="1.0" encoding="utf-8"?>
 <p:sld xmlns:a="http://schemas.openxmlformats.org/drawingml/2006/main" xmlns:r="http://schemas.openxmlformats.org/officeDocument/2006/relationships" xmlns:p="http://schemas.openxmlformats.org/presentationml/2006/main">
   <p:cSld>
     <p:spTree>

</xml_diff>

<commit_message>
docs: DinD, DooD 이미지 추가
</commit_message>
<xml_diff>
--- a/markdown_image.pptx
+++ b/markdown_image.pptx
@@ -5,15 +5,17 @@
     <p:sldMasterId id="2147483648" r:id="rId1"/>
   </p:sldMasterIdLst>
   <p:notesMasterIdLst>
-    <p:notesMasterId r:id="rId8"/>
+    <p:notesMasterId r:id="rId10"/>
   </p:notesMasterIdLst>
   <p:sldIdLst>
     <p:sldId id="256" r:id="rId2"/>
     <p:sldId id="258" r:id="rId3"/>
     <p:sldId id="259" r:id="rId4"/>
     <p:sldId id="262" r:id="rId5"/>
-    <p:sldId id="260" r:id="rId6"/>
-    <p:sldId id="261" r:id="rId7"/>
+    <p:sldId id="263" r:id="rId6"/>
+    <p:sldId id="264" r:id="rId7"/>
+    <p:sldId id="260" r:id="rId8"/>
+    <p:sldId id="261" r:id="rId9"/>
   </p:sldIdLst>
   <p:sldSz cx="12192000" cy="6858000"/>
   <p:notesSz cx="6858000" cy="9144000"/>
@@ -202,7 +204,7 @@
           <a:p>
             <a:fld id="{06073691-9509-499D-804B-789F8428B2A1}" type="datetimeFigureOut">
               <a:rPr lang="ko-KR" altLang="en-US" smtClean="0"/>
-              <a:t>2023-01-08</a:t>
+              <a:t>2023-02-19</a:t>
             </a:fld>
             <a:endParaRPr lang="ko-KR" altLang="en-US"/>
           </a:p>
@@ -619,7 +621,7 @@
           <a:p>
             <a:fld id="{0EEAD409-0A73-4A8A-B948-17E588047228}" type="slidenum">
               <a:rPr lang="ko-KR" altLang="en-US" smtClean="0"/>
-              <a:t>5</a:t>
+              <a:t>7</a:t>
             </a:fld>
             <a:endParaRPr lang="ko-KR" altLang="en-US"/>
           </a:p>
@@ -769,7 +771,7 @@
           <a:p>
             <a:fld id="{0CB960C3-B77A-4865-944D-F41BAAC8ADB3}" type="datetimeFigureOut">
               <a:rPr lang="ko-KR" altLang="en-US" smtClean="0"/>
-              <a:t>2023-01-08</a:t>
+              <a:t>2023-02-19</a:t>
             </a:fld>
             <a:endParaRPr lang="ko-KR" altLang="en-US"/>
           </a:p>
@@ -939,7 +941,7 @@
           <a:p>
             <a:fld id="{0CB960C3-B77A-4865-944D-F41BAAC8ADB3}" type="datetimeFigureOut">
               <a:rPr lang="ko-KR" altLang="en-US" smtClean="0"/>
-              <a:t>2023-01-08</a:t>
+              <a:t>2023-02-19</a:t>
             </a:fld>
             <a:endParaRPr lang="ko-KR" altLang="en-US"/>
           </a:p>
@@ -1119,7 +1121,7 @@
           <a:p>
             <a:fld id="{0CB960C3-B77A-4865-944D-F41BAAC8ADB3}" type="datetimeFigureOut">
               <a:rPr lang="ko-KR" altLang="en-US" smtClean="0"/>
-              <a:t>2023-01-08</a:t>
+              <a:t>2023-02-19</a:t>
             </a:fld>
             <a:endParaRPr lang="ko-KR" altLang="en-US"/>
           </a:p>
@@ -1289,7 +1291,7 @@
           <a:p>
             <a:fld id="{0CB960C3-B77A-4865-944D-F41BAAC8ADB3}" type="datetimeFigureOut">
               <a:rPr lang="ko-KR" altLang="en-US" smtClean="0"/>
-              <a:t>2023-01-08</a:t>
+              <a:t>2023-02-19</a:t>
             </a:fld>
             <a:endParaRPr lang="ko-KR" altLang="en-US"/>
           </a:p>
@@ -1535,7 +1537,7 @@
           <a:p>
             <a:fld id="{0CB960C3-B77A-4865-944D-F41BAAC8ADB3}" type="datetimeFigureOut">
               <a:rPr lang="ko-KR" altLang="en-US" smtClean="0"/>
-              <a:t>2023-01-08</a:t>
+              <a:t>2023-02-19</a:t>
             </a:fld>
             <a:endParaRPr lang="ko-KR" altLang="en-US"/>
           </a:p>
@@ -1767,7 +1769,7 @@
           <a:p>
             <a:fld id="{0CB960C3-B77A-4865-944D-F41BAAC8ADB3}" type="datetimeFigureOut">
               <a:rPr lang="ko-KR" altLang="en-US" smtClean="0"/>
-              <a:t>2023-01-08</a:t>
+              <a:t>2023-02-19</a:t>
             </a:fld>
             <a:endParaRPr lang="ko-KR" altLang="en-US"/>
           </a:p>
@@ -2134,7 +2136,7 @@
           <a:p>
             <a:fld id="{0CB960C3-B77A-4865-944D-F41BAAC8ADB3}" type="datetimeFigureOut">
               <a:rPr lang="ko-KR" altLang="en-US" smtClean="0"/>
-              <a:t>2023-01-08</a:t>
+              <a:t>2023-02-19</a:t>
             </a:fld>
             <a:endParaRPr lang="ko-KR" altLang="en-US"/>
           </a:p>
@@ -2252,7 +2254,7 @@
           <a:p>
             <a:fld id="{0CB960C3-B77A-4865-944D-F41BAAC8ADB3}" type="datetimeFigureOut">
               <a:rPr lang="ko-KR" altLang="en-US" smtClean="0"/>
-              <a:t>2023-01-08</a:t>
+              <a:t>2023-02-19</a:t>
             </a:fld>
             <a:endParaRPr lang="ko-KR" altLang="en-US"/>
           </a:p>
@@ -2347,7 +2349,7 @@
           <a:p>
             <a:fld id="{0CB960C3-B77A-4865-944D-F41BAAC8ADB3}" type="datetimeFigureOut">
               <a:rPr lang="ko-KR" altLang="en-US" smtClean="0"/>
-              <a:t>2023-01-08</a:t>
+              <a:t>2023-02-19</a:t>
             </a:fld>
             <a:endParaRPr lang="ko-KR" altLang="en-US"/>
           </a:p>
@@ -2624,7 +2626,7 @@
           <a:p>
             <a:fld id="{0CB960C3-B77A-4865-944D-F41BAAC8ADB3}" type="datetimeFigureOut">
               <a:rPr lang="ko-KR" altLang="en-US" smtClean="0"/>
-              <a:t>2023-01-08</a:t>
+              <a:t>2023-02-19</a:t>
             </a:fld>
             <a:endParaRPr lang="ko-KR" altLang="en-US"/>
           </a:p>
@@ -2877,7 +2879,7 @@
           <a:p>
             <a:fld id="{0CB960C3-B77A-4865-944D-F41BAAC8ADB3}" type="datetimeFigureOut">
               <a:rPr lang="ko-KR" altLang="en-US" smtClean="0"/>
-              <a:t>2023-01-08</a:t>
+              <a:t>2023-02-19</a:t>
             </a:fld>
             <a:endParaRPr lang="ko-KR" altLang="en-US"/>
           </a:p>
@@ -3090,7 +3092,7 @@
           <a:p>
             <a:fld id="{0CB960C3-B77A-4865-944D-F41BAAC8ADB3}" type="datetimeFigureOut">
               <a:rPr lang="ko-KR" altLang="en-US" smtClean="0"/>
-              <a:t>2023-01-08</a:t>
+              <a:t>2023-02-19</a:t>
             </a:fld>
             <a:endParaRPr lang="ko-KR" altLang="en-US"/>
           </a:p>
@@ -10221,6 +10223,2776 @@
           <a:chExt cx="0" cy="0"/>
         </a:xfrm>
       </p:grpSpPr>
+      <p:sp>
+        <p:nvSpPr>
+          <p:cNvPr id="15" name="AutoShape 2" descr="Docker Container Icon #346708 - Free Icons Library"/>
+          <p:cNvSpPr>
+            <a:spLocks noChangeAspect="1" noChangeArrowheads="1"/>
+          </p:cNvSpPr>
+          <p:nvPr/>
+        </p:nvSpPr>
+        <p:spPr bwMode="auto">
+          <a:xfrm>
+            <a:off x="155575" y="-144463"/>
+            <a:ext cx="304800" cy="304801"/>
+          </a:xfrm>
+          <a:prstGeom prst="rect">
+            <a:avLst/>
+          </a:prstGeom>
+          <a:noFill/>
+          <a:extLst>
+            <a:ext uri="{909E8E84-426E-40DD-AFC4-6F175D3DCCD1}">
+              <a14:hiddenFill xmlns:a14="http://schemas.microsoft.com/office/drawing/2010/main">
+                <a:solidFill>
+                  <a:srgbClr val="FFFFFF"/>
+                </a:solidFill>
+              </a14:hiddenFill>
+            </a:ext>
+          </a:extLst>
+        </p:spPr>
+        <p:txBody>
+          <a:bodyPr vert="horz" wrap="square" lIns="91440" tIns="45720" rIns="91440" bIns="45720" numCol="1" anchor="t" anchorCtr="0" compatLnSpc="1">
+            <a:prstTxWarp prst="textNoShape">
+              <a:avLst/>
+            </a:prstTxWarp>
+          </a:bodyPr>
+          <a:lstStyle/>
+          <a:p>
+            <a:endParaRPr lang="ko-KR" altLang="en-US"/>
+          </a:p>
+        </p:txBody>
+      </p:sp>
+      <p:grpSp>
+        <p:nvGrpSpPr>
+          <p:cNvPr id="18" name="그룹 17"/>
+          <p:cNvGrpSpPr/>
+          <p:nvPr/>
+        </p:nvGrpSpPr>
+        <p:grpSpPr>
+          <a:xfrm>
+            <a:off x="582259" y="188331"/>
+            <a:ext cx="9348083" cy="6480000"/>
+            <a:chOff x="610251" y="249712"/>
+            <a:chExt cx="9348083" cy="6480000"/>
+          </a:xfrm>
+        </p:grpSpPr>
+        <p:sp>
+          <p:nvSpPr>
+            <p:cNvPr id="4" name="모서리가 둥근 직사각형 3"/>
+            <p:cNvSpPr/>
+            <p:nvPr/>
+          </p:nvSpPr>
+          <p:spPr>
+            <a:xfrm>
+              <a:off x="1138334" y="249712"/>
+              <a:ext cx="8820000" cy="6480000"/>
+            </a:xfrm>
+            <a:prstGeom prst="roundRect">
+              <a:avLst/>
+            </a:prstGeom>
+            <a:noFill/>
+            <a:ln w="19050">
+              <a:solidFill>
+                <a:schemeClr val="accent1"/>
+              </a:solidFill>
+            </a:ln>
+          </p:spPr>
+          <p:style>
+            <a:lnRef idx="2">
+              <a:schemeClr val="accent1">
+                <a:shade val="50000"/>
+              </a:schemeClr>
+            </a:lnRef>
+            <a:fillRef idx="1">
+              <a:schemeClr val="accent1"/>
+            </a:fillRef>
+            <a:effectRef idx="0">
+              <a:schemeClr val="accent1"/>
+            </a:effectRef>
+            <a:fontRef idx="minor">
+              <a:schemeClr val="lt1"/>
+            </a:fontRef>
+          </p:style>
+          <p:txBody>
+            <a:bodyPr lIns="36000" tIns="36000" rIns="36000" bIns="36000" rtlCol="0" anchor="b"/>
+            <a:lstStyle/>
+            <a:p>
+              <a:pPr algn="ctr"/>
+              <a:r>
+                <a:rPr lang="en-US" altLang="ko-KR" b="1" dirty="0" smtClean="0">
+                  <a:solidFill>
+                    <a:schemeClr val="tx1"/>
+                  </a:solidFill>
+                </a:rPr>
+                <a:t>Host Machine</a:t>
+              </a:r>
+              <a:endParaRPr lang="ko-KR" altLang="en-US" b="1" dirty="0">
+                <a:solidFill>
+                  <a:schemeClr val="tx1"/>
+                </a:solidFill>
+              </a:endParaRPr>
+            </a:p>
+          </p:txBody>
+        </p:sp>
+        <p:grpSp>
+          <p:nvGrpSpPr>
+            <p:cNvPr id="7" name="그룹 6"/>
+            <p:cNvGrpSpPr/>
+            <p:nvPr/>
+          </p:nvGrpSpPr>
+          <p:grpSpPr>
+            <a:xfrm>
+              <a:off x="1932766" y="4601376"/>
+              <a:ext cx="7463504" cy="1228534"/>
+              <a:chOff x="3750315" y="5178490"/>
+              <a:chExt cx="7463504" cy="1228534"/>
+            </a:xfrm>
+          </p:grpSpPr>
+          <p:grpSp>
+            <p:nvGrpSpPr>
+              <p:cNvPr id="3" name="그룹 2"/>
+              <p:cNvGrpSpPr/>
+              <p:nvPr/>
+            </p:nvGrpSpPr>
+            <p:grpSpPr>
+              <a:xfrm>
+                <a:off x="3750315" y="5188525"/>
+                <a:ext cx="1925912" cy="1208465"/>
+                <a:chOff x="186021" y="4761497"/>
+                <a:chExt cx="1925912" cy="1208465"/>
+              </a:xfrm>
+            </p:grpSpPr>
+            <p:pic>
+              <p:nvPicPr>
+                <p:cNvPr id="63" name="그림 62"/>
+                <p:cNvPicPr>
+                  <a:picLocks/>
+                </p:cNvPicPr>
+                <p:nvPr/>
+              </p:nvPicPr>
+              <p:blipFill>
+                <a:blip r:embed="rId2"/>
+                <a:stretch>
+                  <a:fillRect/>
+                </a:stretch>
+              </p:blipFill>
+              <p:spPr>
+                <a:xfrm>
+                  <a:off x="742424" y="4761497"/>
+                  <a:ext cx="900000" cy="648000"/>
+                </a:xfrm>
+                <a:prstGeom prst="rect">
+                  <a:avLst/>
+                </a:prstGeom>
+              </p:spPr>
+            </p:pic>
+            <p:sp>
+              <p:nvSpPr>
+                <p:cNvPr id="64" name="TextBox 63"/>
+                <p:cNvSpPr txBox="1"/>
+                <p:nvPr/>
+              </p:nvSpPr>
+              <p:spPr>
+                <a:xfrm>
+                  <a:off x="186021" y="5409497"/>
+                  <a:ext cx="1925912" cy="560465"/>
+                </a:xfrm>
+                <a:prstGeom prst="rect">
+                  <a:avLst/>
+                </a:prstGeom>
+                <a:noFill/>
+              </p:spPr>
+              <p:txBody>
+                <a:bodyPr wrap="square" lIns="36000" tIns="36000" rIns="36000" bIns="36000" rtlCol="0">
+                  <a:spAutoFit/>
+                </a:bodyPr>
+                <a:lstStyle/>
+                <a:p>
+                  <a:pPr algn="ctr">
+                    <a:lnSpc>
+                      <a:spcPct val="110000"/>
+                    </a:lnSpc>
+                  </a:pPr>
+                  <a:r>
+                    <a:rPr lang="en-US" altLang="ko-KR" sz="1600" b="1" dirty="0" smtClean="0"/>
+                    <a:t>Docker Client</a:t>
+                  </a:r>
+                  <a:br>
+                    <a:rPr lang="en-US" altLang="ko-KR" sz="1600" b="1" dirty="0" smtClean="0"/>
+                  </a:br>
+                  <a:r>
+                    <a:rPr lang="en-US" altLang="ko-KR" sz="1400" b="1" dirty="0" smtClean="0">
+                      <a:solidFill>
+                        <a:schemeClr val="tx1">
+                          <a:lumMod val="50000"/>
+                          <a:lumOff val="50000"/>
+                        </a:schemeClr>
+                      </a:solidFill>
+                    </a:rPr>
+                    <a:t>/</a:t>
+                  </a:r>
+                  <a:r>
+                    <a:rPr lang="en-US" altLang="ko-KR" sz="1400" b="1" dirty="0" err="1" smtClean="0">
+                      <a:solidFill>
+                        <a:schemeClr val="tx1">
+                          <a:lumMod val="50000"/>
+                          <a:lumOff val="50000"/>
+                        </a:schemeClr>
+                      </a:solidFill>
+                    </a:rPr>
+                    <a:t>usr</a:t>
+                  </a:r>
+                  <a:r>
+                    <a:rPr lang="en-US" altLang="ko-KR" sz="1400" b="1" dirty="0" smtClean="0">
+                      <a:solidFill>
+                        <a:schemeClr val="tx1">
+                          <a:lumMod val="50000"/>
+                          <a:lumOff val="50000"/>
+                        </a:schemeClr>
+                      </a:solidFill>
+                    </a:rPr>
+                    <a:t>/bin/</a:t>
+                  </a:r>
+                  <a:r>
+                    <a:rPr lang="en-US" altLang="ko-KR" sz="1400" b="1" dirty="0" err="1" smtClean="0">
+                      <a:solidFill>
+                        <a:schemeClr val="tx1">
+                          <a:lumMod val="50000"/>
+                          <a:lumOff val="50000"/>
+                        </a:schemeClr>
+                      </a:solidFill>
+                    </a:rPr>
+                    <a:t>docker</a:t>
+                  </a:r>
+                  <a:endParaRPr lang="ko-KR" altLang="en-US" sz="1400" b="1" dirty="0">
+                    <a:solidFill>
+                      <a:schemeClr val="tx1">
+                        <a:lumMod val="50000"/>
+                        <a:lumOff val="50000"/>
+                      </a:schemeClr>
+                    </a:solidFill>
+                  </a:endParaRPr>
+                </a:p>
+              </p:txBody>
+            </p:sp>
+          </p:grpSp>
+          <p:grpSp>
+            <p:nvGrpSpPr>
+              <p:cNvPr id="5" name="그룹 4"/>
+              <p:cNvGrpSpPr/>
+              <p:nvPr/>
+            </p:nvGrpSpPr>
+            <p:grpSpPr>
+              <a:xfrm>
+                <a:off x="6519111" y="5178490"/>
+                <a:ext cx="1925912" cy="1228534"/>
+                <a:chOff x="2911370" y="4761497"/>
+                <a:chExt cx="1925912" cy="1228534"/>
+              </a:xfrm>
+            </p:grpSpPr>
+            <p:pic>
+              <p:nvPicPr>
+                <p:cNvPr id="65" name="그림 64"/>
+                <p:cNvPicPr>
+                  <a:picLocks/>
+                </p:cNvPicPr>
+                <p:nvPr/>
+              </p:nvPicPr>
+              <p:blipFill>
+                <a:blip r:embed="rId2"/>
+                <a:stretch>
+                  <a:fillRect/>
+                </a:stretch>
+              </p:blipFill>
+              <p:spPr>
+                <a:xfrm>
+                  <a:off x="3467773" y="4761497"/>
+                  <a:ext cx="900000" cy="648000"/>
+                </a:xfrm>
+                <a:prstGeom prst="rect">
+                  <a:avLst/>
+                </a:prstGeom>
+              </p:spPr>
+            </p:pic>
+            <p:sp>
+              <p:nvSpPr>
+                <p:cNvPr id="66" name="TextBox 65"/>
+                <p:cNvSpPr txBox="1"/>
+                <p:nvPr/>
+              </p:nvSpPr>
+              <p:spPr>
+                <a:xfrm>
+                  <a:off x="2911370" y="5409497"/>
+                  <a:ext cx="1925912" cy="580534"/>
+                </a:xfrm>
+                <a:prstGeom prst="rect">
+                  <a:avLst/>
+                </a:prstGeom>
+                <a:noFill/>
+              </p:spPr>
+              <p:txBody>
+                <a:bodyPr wrap="square" lIns="36000" tIns="36000" rIns="36000" bIns="36000" rtlCol="0">
+                  <a:spAutoFit/>
+                </a:bodyPr>
+                <a:lstStyle/>
+                <a:p>
+                  <a:pPr algn="ctr">
+                    <a:lnSpc>
+                      <a:spcPct val="110000"/>
+                    </a:lnSpc>
+                  </a:pPr>
+                  <a:r>
+                    <a:rPr lang="en-US" altLang="ko-KR" sz="1600" b="1" dirty="0" smtClean="0"/>
+                    <a:t>Docker Socket</a:t>
+                  </a:r>
+                  <a:br>
+                    <a:rPr lang="en-US" altLang="ko-KR" sz="1600" b="1" dirty="0" smtClean="0"/>
+                  </a:br>
+                  <a:r>
+                    <a:rPr lang="en-US" altLang="ko-KR" sz="1400" b="1" dirty="0" smtClean="0">
+                      <a:solidFill>
+                        <a:schemeClr val="tx1">
+                          <a:lumMod val="50000"/>
+                          <a:lumOff val="50000"/>
+                        </a:schemeClr>
+                      </a:solidFill>
+                    </a:rPr>
+                    <a:t>/</a:t>
+                  </a:r>
+                  <a:r>
+                    <a:rPr lang="en-US" altLang="ko-KR" sz="1400" b="1" dirty="0" err="1" smtClean="0">
+                      <a:solidFill>
+                        <a:schemeClr val="tx1">
+                          <a:lumMod val="50000"/>
+                          <a:lumOff val="50000"/>
+                        </a:schemeClr>
+                      </a:solidFill>
+                    </a:rPr>
+                    <a:t>var</a:t>
+                  </a:r>
+                  <a:r>
+                    <a:rPr lang="en-US" altLang="ko-KR" sz="1400" b="1" dirty="0" smtClean="0">
+                      <a:solidFill>
+                        <a:schemeClr val="tx1">
+                          <a:lumMod val="50000"/>
+                          <a:lumOff val="50000"/>
+                        </a:schemeClr>
+                      </a:solidFill>
+                    </a:rPr>
+                    <a:t>/run/</a:t>
+                  </a:r>
+                  <a:r>
+                    <a:rPr lang="en-US" altLang="ko-KR" sz="1400" b="1" dirty="0" err="1" smtClean="0">
+                      <a:solidFill>
+                        <a:schemeClr val="tx1">
+                          <a:lumMod val="50000"/>
+                          <a:lumOff val="50000"/>
+                        </a:schemeClr>
+                      </a:solidFill>
+                    </a:rPr>
+                    <a:t>docker</a:t>
+                  </a:r>
+                  <a:r>
+                    <a:rPr lang="en-US" altLang="ko-KR" sz="1400" b="1" dirty="0" err="1" smtClean="0">
+                      <a:solidFill>
+                        <a:schemeClr val="tx1">
+                          <a:lumMod val="50000"/>
+                          <a:lumOff val="50000"/>
+                        </a:schemeClr>
+                      </a:solidFill>
+                    </a:rPr>
+                    <a:t>.sock</a:t>
+                  </a:r>
+                  <a:endParaRPr lang="ko-KR" altLang="en-US" sz="1400" b="1" dirty="0">
+                    <a:solidFill>
+                      <a:schemeClr val="tx1">
+                        <a:lumMod val="50000"/>
+                        <a:lumOff val="50000"/>
+                      </a:schemeClr>
+                    </a:solidFill>
+                  </a:endParaRPr>
+                </a:p>
+              </p:txBody>
+            </p:sp>
+          </p:grpSp>
+          <p:grpSp>
+            <p:nvGrpSpPr>
+              <p:cNvPr id="6" name="그룹 5"/>
+              <p:cNvGrpSpPr/>
+              <p:nvPr/>
+            </p:nvGrpSpPr>
+            <p:grpSpPr>
+              <a:xfrm>
+                <a:off x="9287907" y="5178490"/>
+                <a:ext cx="1925912" cy="1228534"/>
+                <a:chOff x="5723613" y="4761497"/>
+                <a:chExt cx="1925912" cy="1228534"/>
+              </a:xfrm>
+            </p:grpSpPr>
+            <p:pic>
+              <p:nvPicPr>
+                <p:cNvPr id="67" name="그림 66"/>
+                <p:cNvPicPr>
+                  <a:picLocks/>
+                </p:cNvPicPr>
+                <p:nvPr/>
+              </p:nvPicPr>
+              <p:blipFill>
+                <a:blip r:embed="rId2"/>
+                <a:stretch>
+                  <a:fillRect/>
+                </a:stretch>
+              </p:blipFill>
+              <p:spPr>
+                <a:xfrm>
+                  <a:off x="6280016" y="4761497"/>
+                  <a:ext cx="900000" cy="648000"/>
+                </a:xfrm>
+                <a:prstGeom prst="rect">
+                  <a:avLst/>
+                </a:prstGeom>
+              </p:spPr>
+            </p:pic>
+            <p:sp>
+              <p:nvSpPr>
+                <p:cNvPr id="68" name="TextBox 67"/>
+                <p:cNvSpPr txBox="1"/>
+                <p:nvPr/>
+              </p:nvSpPr>
+              <p:spPr>
+                <a:xfrm>
+                  <a:off x="5723613" y="5409497"/>
+                  <a:ext cx="1925912" cy="580534"/>
+                </a:xfrm>
+                <a:prstGeom prst="rect">
+                  <a:avLst/>
+                </a:prstGeom>
+                <a:noFill/>
+              </p:spPr>
+              <p:txBody>
+                <a:bodyPr wrap="square" lIns="36000" tIns="36000" rIns="36000" bIns="36000" rtlCol="0">
+                  <a:spAutoFit/>
+                </a:bodyPr>
+                <a:lstStyle/>
+                <a:p>
+                  <a:pPr algn="ctr">
+                    <a:lnSpc>
+                      <a:spcPct val="110000"/>
+                    </a:lnSpc>
+                  </a:pPr>
+                  <a:r>
+                    <a:rPr lang="en-US" altLang="ko-KR" sz="1600" b="1" dirty="0" smtClean="0"/>
+                    <a:t>Docker </a:t>
+                  </a:r>
+                  <a:r>
+                    <a:rPr lang="en-US" altLang="ko-KR" sz="1600" b="1" dirty="0" smtClean="0"/>
+                    <a:t>Daemon</a:t>
+                  </a:r>
+                  <a:r>
+                    <a:rPr lang="en-US" altLang="ko-KR" sz="1600" b="1" dirty="0" smtClean="0"/>
+                    <a:t/>
+                  </a:r>
+                  <a:br>
+                    <a:rPr lang="en-US" altLang="ko-KR" sz="1600" b="1" dirty="0" smtClean="0"/>
+                  </a:br>
+                  <a:r>
+                    <a:rPr lang="en-US" altLang="ko-KR" sz="1400" b="1" dirty="0" smtClean="0">
+                      <a:solidFill>
+                        <a:schemeClr val="tx1">
+                          <a:lumMod val="50000"/>
+                          <a:lumOff val="50000"/>
+                        </a:schemeClr>
+                      </a:solidFill>
+                    </a:rPr>
+                    <a:t>/</a:t>
+                  </a:r>
+                  <a:r>
+                    <a:rPr lang="en-US" altLang="ko-KR" sz="1400" b="1" dirty="0" err="1" smtClean="0">
+                      <a:solidFill>
+                        <a:schemeClr val="tx1">
+                          <a:lumMod val="50000"/>
+                          <a:lumOff val="50000"/>
+                        </a:schemeClr>
+                      </a:solidFill>
+                    </a:rPr>
+                    <a:t>usr</a:t>
+                  </a:r>
+                  <a:r>
+                    <a:rPr lang="en-US" altLang="ko-KR" sz="1400" b="1" dirty="0" smtClean="0">
+                      <a:solidFill>
+                        <a:schemeClr val="tx1">
+                          <a:lumMod val="50000"/>
+                          <a:lumOff val="50000"/>
+                        </a:schemeClr>
+                      </a:solidFill>
+                    </a:rPr>
+                    <a:t>/bin/</a:t>
+                  </a:r>
+                  <a:r>
+                    <a:rPr lang="en-US" altLang="ko-KR" sz="1400" b="1" dirty="0" err="1" smtClean="0">
+                      <a:solidFill>
+                        <a:schemeClr val="tx1">
+                          <a:lumMod val="50000"/>
+                          <a:lumOff val="50000"/>
+                        </a:schemeClr>
+                      </a:solidFill>
+                    </a:rPr>
+                    <a:t>dockerd</a:t>
+                  </a:r>
+                  <a:endParaRPr lang="ko-KR" altLang="en-US" sz="1400" b="1" dirty="0">
+                    <a:solidFill>
+                      <a:schemeClr val="tx1">
+                        <a:lumMod val="50000"/>
+                        <a:lumOff val="50000"/>
+                      </a:schemeClr>
+                    </a:solidFill>
+                  </a:endParaRPr>
+                </a:p>
+              </p:txBody>
+            </p:sp>
+          </p:grpSp>
+          <p:sp>
+            <p:nvSpPr>
+              <p:cNvPr id="69" name="오른쪽 화살표 68"/>
+              <p:cNvSpPr/>
+              <p:nvPr/>
+            </p:nvSpPr>
+            <p:spPr>
+              <a:xfrm>
+                <a:off x="5737669" y="5612757"/>
+                <a:ext cx="720000" cy="360000"/>
+              </a:xfrm>
+              <a:prstGeom prst="rightArrow">
+                <a:avLst/>
+              </a:prstGeom>
+              <a:solidFill>
+                <a:schemeClr val="tx2"/>
+              </a:solidFill>
+              <a:ln>
+                <a:noFill/>
+              </a:ln>
+              <a:effectLst>
+                <a:outerShdw blurRad="50800" dist="38100" dir="2700000" algn="tl" rotWithShape="0">
+                  <a:prstClr val="black">
+                    <a:alpha val="40000"/>
+                  </a:prstClr>
+                </a:outerShdw>
+              </a:effectLst>
+            </p:spPr>
+            <p:style>
+              <a:lnRef idx="2">
+                <a:schemeClr val="accent1">
+                  <a:shade val="50000"/>
+                </a:schemeClr>
+              </a:lnRef>
+              <a:fillRef idx="1">
+                <a:schemeClr val="accent1"/>
+              </a:fillRef>
+              <a:effectRef idx="0">
+                <a:schemeClr val="accent1"/>
+              </a:effectRef>
+              <a:fontRef idx="minor">
+                <a:schemeClr val="lt1"/>
+              </a:fontRef>
+            </p:style>
+            <p:txBody>
+              <a:bodyPr rtlCol="0" anchor="ctr"/>
+              <a:lstStyle/>
+              <a:p>
+                <a:pPr algn="ctr"/>
+                <a:endParaRPr lang="ko-KR" altLang="en-US"/>
+              </a:p>
+            </p:txBody>
+          </p:sp>
+          <p:sp>
+            <p:nvSpPr>
+              <p:cNvPr id="70" name="오른쪽 화살표 69"/>
+              <p:cNvSpPr/>
+              <p:nvPr/>
+            </p:nvSpPr>
+            <p:spPr>
+              <a:xfrm>
+                <a:off x="8506465" y="5612757"/>
+                <a:ext cx="720000" cy="360000"/>
+              </a:xfrm>
+              <a:prstGeom prst="rightArrow">
+                <a:avLst/>
+              </a:prstGeom>
+              <a:solidFill>
+                <a:schemeClr val="tx2"/>
+              </a:solidFill>
+              <a:ln>
+                <a:noFill/>
+              </a:ln>
+              <a:effectLst>
+                <a:outerShdw blurRad="50800" dist="38100" dir="2700000" algn="tl" rotWithShape="0">
+                  <a:prstClr val="black">
+                    <a:alpha val="40000"/>
+                  </a:prstClr>
+                </a:outerShdw>
+              </a:effectLst>
+            </p:spPr>
+            <p:style>
+              <a:lnRef idx="2">
+                <a:schemeClr val="accent1">
+                  <a:shade val="50000"/>
+                </a:schemeClr>
+              </a:lnRef>
+              <a:fillRef idx="1">
+                <a:schemeClr val="accent1"/>
+              </a:fillRef>
+              <a:effectRef idx="0">
+                <a:schemeClr val="accent1"/>
+              </a:effectRef>
+              <a:fontRef idx="minor">
+                <a:schemeClr val="lt1"/>
+              </a:fontRef>
+            </p:style>
+            <p:txBody>
+              <a:bodyPr rtlCol="0" anchor="ctr"/>
+              <a:lstStyle/>
+              <a:p>
+                <a:pPr algn="ctr"/>
+                <a:endParaRPr lang="ko-KR" altLang="en-US"/>
+              </a:p>
+            </p:txBody>
+          </p:sp>
+        </p:grpSp>
+        <p:grpSp>
+          <p:nvGrpSpPr>
+            <p:cNvPr id="10" name="그룹 9"/>
+            <p:cNvGrpSpPr/>
+            <p:nvPr/>
+          </p:nvGrpSpPr>
+          <p:grpSpPr>
+            <a:xfrm>
+              <a:off x="1489967" y="1814099"/>
+              <a:ext cx="8116735" cy="2301100"/>
+              <a:chOff x="3331925" y="1490111"/>
+              <a:chExt cx="8116735" cy="2301100"/>
+            </a:xfrm>
+          </p:grpSpPr>
+          <p:sp>
+            <p:nvSpPr>
+              <p:cNvPr id="71" name="모서리가 둥근 직사각형 70"/>
+              <p:cNvSpPr/>
+              <p:nvPr/>
+            </p:nvSpPr>
+            <p:spPr>
+              <a:xfrm>
+                <a:off x="3564293" y="1811211"/>
+                <a:ext cx="7884367" cy="1980000"/>
+              </a:xfrm>
+              <a:prstGeom prst="roundRect">
+                <a:avLst/>
+              </a:prstGeom>
+              <a:noFill/>
+              <a:ln w="19050">
+                <a:solidFill>
+                  <a:srgbClr val="C00000"/>
+                </a:solidFill>
+              </a:ln>
+            </p:spPr>
+            <p:style>
+              <a:lnRef idx="2">
+                <a:schemeClr val="accent1">
+                  <a:shade val="50000"/>
+                </a:schemeClr>
+              </a:lnRef>
+              <a:fillRef idx="1">
+                <a:schemeClr val="accent1"/>
+              </a:fillRef>
+              <a:effectRef idx="0">
+                <a:schemeClr val="accent1"/>
+              </a:effectRef>
+              <a:fontRef idx="minor">
+                <a:schemeClr val="lt1"/>
+              </a:fontRef>
+            </p:style>
+            <p:txBody>
+              <a:bodyPr lIns="36000" tIns="36000" rIns="36000" bIns="36000" rtlCol="0" anchor="t"/>
+              <a:lstStyle/>
+              <a:p>
+                <a:pPr algn="ctr"/>
+                <a:r>
+                  <a:rPr lang="en-US" altLang="ko-KR" b="1" dirty="0" smtClean="0">
+                    <a:solidFill>
+                      <a:schemeClr val="tx1"/>
+                    </a:solidFill>
+                  </a:rPr>
+                  <a:t>Jenkins Container</a:t>
+                </a:r>
+                <a:endParaRPr lang="ko-KR" altLang="en-US" b="1" dirty="0">
+                  <a:solidFill>
+                    <a:schemeClr val="tx1"/>
+                  </a:solidFill>
+                </a:endParaRPr>
+              </a:p>
+            </p:txBody>
+          </p:sp>
+          <p:grpSp>
+            <p:nvGrpSpPr>
+              <p:cNvPr id="72" name="그룹 71"/>
+              <p:cNvGrpSpPr/>
+              <p:nvPr/>
+            </p:nvGrpSpPr>
+            <p:grpSpPr>
+              <a:xfrm>
+                <a:off x="3774724" y="2371457"/>
+                <a:ext cx="7463504" cy="1228534"/>
+                <a:chOff x="3750315" y="5178490"/>
+                <a:chExt cx="7463504" cy="1228534"/>
+              </a:xfrm>
+            </p:grpSpPr>
+            <p:grpSp>
+              <p:nvGrpSpPr>
+                <p:cNvPr id="75" name="그룹 74"/>
+                <p:cNvGrpSpPr/>
+                <p:nvPr/>
+              </p:nvGrpSpPr>
+              <p:grpSpPr>
+                <a:xfrm>
+                  <a:off x="3750315" y="5188525"/>
+                  <a:ext cx="1925912" cy="1208465"/>
+                  <a:chOff x="186021" y="4761497"/>
+                  <a:chExt cx="1925912" cy="1208465"/>
+                </a:xfrm>
+              </p:grpSpPr>
+              <p:pic>
+                <p:nvPicPr>
+                  <p:cNvPr id="86" name="그림 85"/>
+                  <p:cNvPicPr>
+                    <a:picLocks/>
+                  </p:cNvPicPr>
+                  <p:nvPr/>
+                </p:nvPicPr>
+                <p:blipFill>
+                  <a:blip r:embed="rId2"/>
+                  <a:stretch>
+                    <a:fillRect/>
+                  </a:stretch>
+                </p:blipFill>
+                <p:spPr>
+                  <a:xfrm>
+                    <a:off x="742424" y="4761497"/>
+                    <a:ext cx="900000" cy="648000"/>
+                  </a:xfrm>
+                  <a:prstGeom prst="rect">
+                    <a:avLst/>
+                  </a:prstGeom>
+                </p:spPr>
+              </p:pic>
+              <p:sp>
+                <p:nvSpPr>
+                  <p:cNvPr id="87" name="TextBox 86"/>
+                  <p:cNvSpPr txBox="1"/>
+                  <p:nvPr/>
+                </p:nvSpPr>
+                <p:spPr>
+                  <a:xfrm>
+                    <a:off x="186021" y="5409497"/>
+                    <a:ext cx="1925912" cy="560465"/>
+                  </a:xfrm>
+                  <a:prstGeom prst="rect">
+                    <a:avLst/>
+                  </a:prstGeom>
+                  <a:noFill/>
+                </p:spPr>
+                <p:txBody>
+                  <a:bodyPr wrap="square" lIns="36000" tIns="36000" rIns="36000" bIns="36000" rtlCol="0">
+                    <a:spAutoFit/>
+                  </a:bodyPr>
+                  <a:lstStyle/>
+                  <a:p>
+                    <a:pPr algn="ctr">
+                      <a:lnSpc>
+                        <a:spcPct val="110000"/>
+                      </a:lnSpc>
+                    </a:pPr>
+                    <a:r>
+                      <a:rPr lang="en-US" altLang="ko-KR" sz="1600" b="1" dirty="0" smtClean="0"/>
+                      <a:t>Docker Client</a:t>
+                    </a:r>
+                    <a:br>
+                      <a:rPr lang="en-US" altLang="ko-KR" sz="1600" b="1" dirty="0" smtClean="0"/>
+                    </a:br>
+                    <a:r>
+                      <a:rPr lang="en-US" altLang="ko-KR" sz="1400" b="1" dirty="0" smtClean="0">
+                        <a:solidFill>
+                          <a:schemeClr val="tx1">
+                            <a:lumMod val="50000"/>
+                            <a:lumOff val="50000"/>
+                          </a:schemeClr>
+                        </a:solidFill>
+                      </a:rPr>
+                      <a:t>/</a:t>
+                    </a:r>
+                    <a:r>
+                      <a:rPr lang="en-US" altLang="ko-KR" sz="1400" b="1" dirty="0" err="1" smtClean="0">
+                        <a:solidFill>
+                          <a:schemeClr val="tx1">
+                            <a:lumMod val="50000"/>
+                            <a:lumOff val="50000"/>
+                          </a:schemeClr>
+                        </a:solidFill>
+                      </a:rPr>
+                      <a:t>usr</a:t>
+                    </a:r>
+                    <a:r>
+                      <a:rPr lang="en-US" altLang="ko-KR" sz="1400" b="1" dirty="0" smtClean="0">
+                        <a:solidFill>
+                          <a:schemeClr val="tx1">
+                            <a:lumMod val="50000"/>
+                            <a:lumOff val="50000"/>
+                          </a:schemeClr>
+                        </a:solidFill>
+                      </a:rPr>
+                      <a:t>/bin/</a:t>
+                    </a:r>
+                    <a:r>
+                      <a:rPr lang="en-US" altLang="ko-KR" sz="1400" b="1" dirty="0" err="1" smtClean="0">
+                        <a:solidFill>
+                          <a:schemeClr val="tx1">
+                            <a:lumMod val="50000"/>
+                            <a:lumOff val="50000"/>
+                          </a:schemeClr>
+                        </a:solidFill>
+                      </a:rPr>
+                      <a:t>docker</a:t>
+                    </a:r>
+                    <a:endParaRPr lang="ko-KR" altLang="en-US" sz="1400" b="1" dirty="0">
+                      <a:solidFill>
+                        <a:schemeClr val="tx1">
+                          <a:lumMod val="50000"/>
+                          <a:lumOff val="50000"/>
+                        </a:schemeClr>
+                      </a:solidFill>
+                    </a:endParaRPr>
+                  </a:p>
+                </p:txBody>
+              </p:sp>
+            </p:grpSp>
+            <p:grpSp>
+              <p:nvGrpSpPr>
+                <p:cNvPr id="76" name="그룹 75"/>
+                <p:cNvGrpSpPr/>
+                <p:nvPr/>
+              </p:nvGrpSpPr>
+              <p:grpSpPr>
+                <a:xfrm>
+                  <a:off x="6519111" y="5178490"/>
+                  <a:ext cx="1925912" cy="1228534"/>
+                  <a:chOff x="2911370" y="4761497"/>
+                  <a:chExt cx="1925912" cy="1228534"/>
+                </a:xfrm>
+              </p:grpSpPr>
+              <p:pic>
+                <p:nvPicPr>
+                  <p:cNvPr id="84" name="그림 83"/>
+                  <p:cNvPicPr>
+                    <a:picLocks/>
+                  </p:cNvPicPr>
+                  <p:nvPr/>
+                </p:nvPicPr>
+                <p:blipFill>
+                  <a:blip r:embed="rId2"/>
+                  <a:stretch>
+                    <a:fillRect/>
+                  </a:stretch>
+                </p:blipFill>
+                <p:spPr>
+                  <a:xfrm>
+                    <a:off x="3467773" y="4761497"/>
+                    <a:ext cx="900000" cy="648000"/>
+                  </a:xfrm>
+                  <a:prstGeom prst="rect">
+                    <a:avLst/>
+                  </a:prstGeom>
+                </p:spPr>
+              </p:pic>
+              <p:sp>
+                <p:nvSpPr>
+                  <p:cNvPr id="85" name="TextBox 84"/>
+                  <p:cNvSpPr txBox="1"/>
+                  <p:nvPr/>
+                </p:nvSpPr>
+                <p:spPr>
+                  <a:xfrm>
+                    <a:off x="2911370" y="5409497"/>
+                    <a:ext cx="1925912" cy="580534"/>
+                  </a:xfrm>
+                  <a:prstGeom prst="rect">
+                    <a:avLst/>
+                  </a:prstGeom>
+                  <a:noFill/>
+                </p:spPr>
+                <p:txBody>
+                  <a:bodyPr wrap="square" lIns="36000" tIns="36000" rIns="36000" bIns="36000" rtlCol="0">
+                    <a:spAutoFit/>
+                  </a:bodyPr>
+                  <a:lstStyle/>
+                  <a:p>
+                    <a:pPr algn="ctr">
+                      <a:lnSpc>
+                        <a:spcPct val="110000"/>
+                      </a:lnSpc>
+                    </a:pPr>
+                    <a:r>
+                      <a:rPr lang="en-US" altLang="ko-KR" sz="1600" b="1" dirty="0" smtClean="0"/>
+                      <a:t>Docker Socket</a:t>
+                    </a:r>
+                    <a:br>
+                      <a:rPr lang="en-US" altLang="ko-KR" sz="1600" b="1" dirty="0" smtClean="0"/>
+                    </a:br>
+                    <a:r>
+                      <a:rPr lang="en-US" altLang="ko-KR" sz="1400" b="1" dirty="0" smtClean="0">
+                        <a:solidFill>
+                          <a:schemeClr val="tx1">
+                            <a:lumMod val="50000"/>
+                            <a:lumOff val="50000"/>
+                          </a:schemeClr>
+                        </a:solidFill>
+                      </a:rPr>
+                      <a:t>/</a:t>
+                    </a:r>
+                    <a:r>
+                      <a:rPr lang="en-US" altLang="ko-KR" sz="1400" b="1" dirty="0" err="1" smtClean="0">
+                        <a:solidFill>
+                          <a:schemeClr val="tx1">
+                            <a:lumMod val="50000"/>
+                            <a:lumOff val="50000"/>
+                          </a:schemeClr>
+                        </a:solidFill>
+                      </a:rPr>
+                      <a:t>var</a:t>
+                    </a:r>
+                    <a:r>
+                      <a:rPr lang="en-US" altLang="ko-KR" sz="1400" b="1" dirty="0" smtClean="0">
+                        <a:solidFill>
+                          <a:schemeClr val="tx1">
+                            <a:lumMod val="50000"/>
+                            <a:lumOff val="50000"/>
+                          </a:schemeClr>
+                        </a:solidFill>
+                      </a:rPr>
+                      <a:t>/run/</a:t>
+                    </a:r>
+                    <a:r>
+                      <a:rPr lang="en-US" altLang="ko-KR" sz="1400" b="1" dirty="0" err="1" smtClean="0">
+                        <a:solidFill>
+                          <a:schemeClr val="tx1">
+                            <a:lumMod val="50000"/>
+                            <a:lumOff val="50000"/>
+                          </a:schemeClr>
+                        </a:solidFill>
+                      </a:rPr>
+                      <a:t>docker</a:t>
+                    </a:r>
+                    <a:r>
+                      <a:rPr lang="en-US" altLang="ko-KR" sz="1400" b="1" dirty="0" err="1" smtClean="0">
+                        <a:solidFill>
+                          <a:schemeClr val="tx1">
+                            <a:lumMod val="50000"/>
+                            <a:lumOff val="50000"/>
+                          </a:schemeClr>
+                        </a:solidFill>
+                      </a:rPr>
+                      <a:t>.sock</a:t>
+                    </a:r>
+                    <a:endParaRPr lang="ko-KR" altLang="en-US" sz="1400" b="1" dirty="0">
+                      <a:solidFill>
+                        <a:schemeClr val="tx1">
+                          <a:lumMod val="50000"/>
+                          <a:lumOff val="50000"/>
+                        </a:schemeClr>
+                      </a:solidFill>
+                    </a:endParaRPr>
+                  </a:p>
+                </p:txBody>
+              </p:sp>
+            </p:grpSp>
+            <p:grpSp>
+              <p:nvGrpSpPr>
+                <p:cNvPr id="78" name="그룹 77"/>
+                <p:cNvGrpSpPr/>
+                <p:nvPr/>
+              </p:nvGrpSpPr>
+              <p:grpSpPr>
+                <a:xfrm>
+                  <a:off x="9287907" y="5178490"/>
+                  <a:ext cx="1925912" cy="1228534"/>
+                  <a:chOff x="5723613" y="4761497"/>
+                  <a:chExt cx="1925912" cy="1228534"/>
+                </a:xfrm>
+              </p:grpSpPr>
+              <p:pic>
+                <p:nvPicPr>
+                  <p:cNvPr id="82" name="그림 81"/>
+                  <p:cNvPicPr>
+                    <a:picLocks/>
+                  </p:cNvPicPr>
+                  <p:nvPr/>
+                </p:nvPicPr>
+                <p:blipFill>
+                  <a:blip r:embed="rId2"/>
+                  <a:stretch>
+                    <a:fillRect/>
+                  </a:stretch>
+                </p:blipFill>
+                <p:spPr>
+                  <a:xfrm>
+                    <a:off x="6280016" y="4761497"/>
+                    <a:ext cx="900000" cy="648000"/>
+                  </a:xfrm>
+                  <a:prstGeom prst="rect">
+                    <a:avLst/>
+                  </a:prstGeom>
+                </p:spPr>
+              </p:pic>
+              <p:sp>
+                <p:nvSpPr>
+                  <p:cNvPr id="83" name="TextBox 82"/>
+                  <p:cNvSpPr txBox="1"/>
+                  <p:nvPr/>
+                </p:nvSpPr>
+                <p:spPr>
+                  <a:xfrm>
+                    <a:off x="5723613" y="5409497"/>
+                    <a:ext cx="1925912" cy="580534"/>
+                  </a:xfrm>
+                  <a:prstGeom prst="rect">
+                    <a:avLst/>
+                  </a:prstGeom>
+                  <a:noFill/>
+                </p:spPr>
+                <p:txBody>
+                  <a:bodyPr wrap="square" lIns="36000" tIns="36000" rIns="36000" bIns="36000" rtlCol="0">
+                    <a:spAutoFit/>
+                  </a:bodyPr>
+                  <a:lstStyle/>
+                  <a:p>
+                    <a:pPr algn="ctr">
+                      <a:lnSpc>
+                        <a:spcPct val="110000"/>
+                      </a:lnSpc>
+                    </a:pPr>
+                    <a:r>
+                      <a:rPr lang="en-US" altLang="ko-KR" sz="1600" b="1" dirty="0" smtClean="0"/>
+                      <a:t>Docker </a:t>
+                    </a:r>
+                    <a:r>
+                      <a:rPr lang="en-US" altLang="ko-KR" sz="1600" b="1" dirty="0" smtClean="0"/>
+                      <a:t>Daemon</a:t>
+                    </a:r>
+                    <a:r>
+                      <a:rPr lang="en-US" altLang="ko-KR" sz="1600" b="1" dirty="0" smtClean="0"/>
+                      <a:t/>
+                    </a:r>
+                    <a:br>
+                      <a:rPr lang="en-US" altLang="ko-KR" sz="1600" b="1" dirty="0" smtClean="0"/>
+                    </a:br>
+                    <a:r>
+                      <a:rPr lang="en-US" altLang="ko-KR" sz="1400" b="1" dirty="0" smtClean="0">
+                        <a:solidFill>
+                          <a:schemeClr val="tx1">
+                            <a:lumMod val="50000"/>
+                            <a:lumOff val="50000"/>
+                          </a:schemeClr>
+                        </a:solidFill>
+                      </a:rPr>
+                      <a:t>/</a:t>
+                    </a:r>
+                    <a:r>
+                      <a:rPr lang="en-US" altLang="ko-KR" sz="1400" b="1" dirty="0" err="1" smtClean="0">
+                        <a:solidFill>
+                          <a:schemeClr val="tx1">
+                            <a:lumMod val="50000"/>
+                            <a:lumOff val="50000"/>
+                          </a:schemeClr>
+                        </a:solidFill>
+                      </a:rPr>
+                      <a:t>usr</a:t>
+                    </a:r>
+                    <a:r>
+                      <a:rPr lang="en-US" altLang="ko-KR" sz="1400" b="1" dirty="0" smtClean="0">
+                        <a:solidFill>
+                          <a:schemeClr val="tx1">
+                            <a:lumMod val="50000"/>
+                            <a:lumOff val="50000"/>
+                          </a:schemeClr>
+                        </a:solidFill>
+                      </a:rPr>
+                      <a:t>/bin/</a:t>
+                    </a:r>
+                    <a:r>
+                      <a:rPr lang="en-US" altLang="ko-KR" sz="1400" b="1" dirty="0" err="1" smtClean="0">
+                        <a:solidFill>
+                          <a:schemeClr val="tx1">
+                            <a:lumMod val="50000"/>
+                            <a:lumOff val="50000"/>
+                          </a:schemeClr>
+                        </a:solidFill>
+                      </a:rPr>
+                      <a:t>dockerd</a:t>
+                    </a:r>
+                    <a:endParaRPr lang="ko-KR" altLang="en-US" sz="1400" b="1" dirty="0">
+                      <a:solidFill>
+                        <a:schemeClr val="tx1">
+                          <a:lumMod val="50000"/>
+                          <a:lumOff val="50000"/>
+                        </a:schemeClr>
+                      </a:solidFill>
+                    </a:endParaRPr>
+                  </a:p>
+                </p:txBody>
+              </p:sp>
+            </p:grpSp>
+            <p:sp>
+              <p:nvSpPr>
+                <p:cNvPr id="79" name="오른쪽 화살표 78"/>
+                <p:cNvSpPr/>
+                <p:nvPr/>
+              </p:nvSpPr>
+              <p:spPr>
+                <a:xfrm>
+                  <a:off x="5737669" y="5612757"/>
+                  <a:ext cx="720000" cy="360000"/>
+                </a:xfrm>
+                <a:prstGeom prst="rightArrow">
+                  <a:avLst/>
+                </a:prstGeom>
+                <a:solidFill>
+                  <a:srgbClr val="A50021"/>
+                </a:solidFill>
+                <a:ln>
+                  <a:noFill/>
+                </a:ln>
+                <a:effectLst>
+                  <a:outerShdw blurRad="50800" dist="38100" dir="2700000" algn="tl" rotWithShape="0">
+                    <a:prstClr val="black">
+                      <a:alpha val="40000"/>
+                    </a:prstClr>
+                  </a:outerShdw>
+                </a:effectLst>
+              </p:spPr>
+              <p:style>
+                <a:lnRef idx="2">
+                  <a:schemeClr val="accent1">
+                    <a:shade val="50000"/>
+                  </a:schemeClr>
+                </a:lnRef>
+                <a:fillRef idx="1">
+                  <a:schemeClr val="accent1"/>
+                </a:fillRef>
+                <a:effectRef idx="0">
+                  <a:schemeClr val="accent1"/>
+                </a:effectRef>
+                <a:fontRef idx="minor">
+                  <a:schemeClr val="lt1"/>
+                </a:fontRef>
+              </p:style>
+              <p:txBody>
+                <a:bodyPr rtlCol="0" anchor="ctr"/>
+                <a:lstStyle/>
+                <a:p>
+                  <a:pPr algn="ctr"/>
+                  <a:endParaRPr lang="ko-KR" altLang="en-US"/>
+                </a:p>
+              </p:txBody>
+            </p:sp>
+            <p:sp>
+              <p:nvSpPr>
+                <p:cNvPr id="80" name="오른쪽 화살표 79"/>
+                <p:cNvSpPr/>
+                <p:nvPr/>
+              </p:nvSpPr>
+              <p:spPr>
+                <a:xfrm>
+                  <a:off x="8506465" y="5612757"/>
+                  <a:ext cx="720000" cy="360000"/>
+                </a:xfrm>
+                <a:prstGeom prst="rightArrow">
+                  <a:avLst/>
+                </a:prstGeom>
+                <a:solidFill>
+                  <a:srgbClr val="A50021"/>
+                </a:solidFill>
+                <a:ln>
+                  <a:noFill/>
+                </a:ln>
+                <a:effectLst>
+                  <a:outerShdw blurRad="50800" dist="38100" dir="2700000" algn="tl" rotWithShape="0">
+                    <a:prstClr val="black">
+                      <a:alpha val="40000"/>
+                    </a:prstClr>
+                  </a:outerShdw>
+                </a:effectLst>
+              </p:spPr>
+              <p:style>
+                <a:lnRef idx="2">
+                  <a:schemeClr val="accent1">
+                    <a:shade val="50000"/>
+                  </a:schemeClr>
+                </a:lnRef>
+                <a:fillRef idx="1">
+                  <a:schemeClr val="accent1"/>
+                </a:fillRef>
+                <a:effectRef idx="0">
+                  <a:schemeClr val="accent1"/>
+                </a:effectRef>
+                <a:fontRef idx="minor">
+                  <a:schemeClr val="lt1"/>
+                </a:fontRef>
+              </p:style>
+              <p:txBody>
+                <a:bodyPr rtlCol="0" anchor="ctr"/>
+                <a:lstStyle/>
+                <a:p>
+                  <a:pPr algn="ctr"/>
+                  <a:endParaRPr lang="ko-KR" altLang="en-US" b="1" dirty="0"/>
+                </a:p>
+              </p:txBody>
+            </p:sp>
+          </p:grpSp>
+          <p:pic>
+            <p:nvPicPr>
+              <p:cNvPr id="2" name="그림 1"/>
+              <p:cNvPicPr>
+                <a:picLocks/>
+              </p:cNvPicPr>
+              <p:nvPr/>
+            </p:nvPicPr>
+            <p:blipFill>
+              <a:blip r:embed="rId3"/>
+              <a:stretch>
+                <a:fillRect/>
+              </a:stretch>
+            </p:blipFill>
+            <p:spPr>
+              <a:xfrm>
+                <a:off x="3331925" y="1490111"/>
+                <a:ext cx="720000" cy="828000"/>
+              </a:xfrm>
+              <a:prstGeom prst="rect">
+                <a:avLst/>
+              </a:prstGeom>
+            </p:spPr>
+          </p:pic>
+        </p:grpSp>
+        <p:pic>
+          <p:nvPicPr>
+            <p:cNvPr id="9" name="그림 8"/>
+            <p:cNvPicPr>
+              <a:picLocks noChangeAspect="1"/>
+            </p:cNvPicPr>
+            <p:nvPr/>
+          </p:nvPicPr>
+          <p:blipFill>
+            <a:blip r:embed="rId4">
+              <a:extLst>
+                <a:ext uri="{28A0092B-C50C-407E-A947-70E740481C1C}">
+                  <a14:useLocalDpi xmlns:a14="http://schemas.microsoft.com/office/drawing/2010/main" val="0"/>
+                </a:ext>
+              </a:extLst>
+            </a:blip>
+            <a:stretch>
+              <a:fillRect/>
+            </a:stretch>
+          </p:blipFill>
+          <p:spPr>
+            <a:xfrm>
+              <a:off x="610251" y="2820655"/>
+              <a:ext cx="1019516" cy="1338114"/>
+            </a:xfrm>
+            <a:prstGeom prst="rect">
+              <a:avLst/>
+            </a:prstGeom>
+          </p:spPr>
+        </p:pic>
+        <p:grpSp>
+          <p:nvGrpSpPr>
+            <p:cNvPr id="14" name="그룹 13"/>
+            <p:cNvGrpSpPr/>
+            <p:nvPr/>
+          </p:nvGrpSpPr>
+          <p:grpSpPr>
+            <a:xfrm>
+              <a:off x="8003157" y="497657"/>
+              <a:ext cx="1603545" cy="1091220"/>
+              <a:chOff x="8026761" y="659581"/>
+              <a:chExt cx="1603545" cy="1091220"/>
+            </a:xfrm>
+          </p:grpSpPr>
+          <p:sp>
+            <p:nvSpPr>
+              <p:cNvPr id="102" name="모서리가 둥근 직사각형 101"/>
+              <p:cNvSpPr/>
+              <p:nvPr/>
+            </p:nvSpPr>
+            <p:spPr>
+              <a:xfrm>
+                <a:off x="8190306" y="850801"/>
+                <a:ext cx="1440000" cy="900000"/>
+              </a:xfrm>
+              <a:prstGeom prst="roundRect">
+                <a:avLst/>
+              </a:prstGeom>
+              <a:noFill/>
+              <a:ln w="19050">
+                <a:solidFill>
+                  <a:srgbClr val="326CE5"/>
+                </a:solidFill>
+              </a:ln>
+            </p:spPr>
+            <p:style>
+              <a:lnRef idx="2">
+                <a:schemeClr val="accent1">
+                  <a:shade val="50000"/>
+                </a:schemeClr>
+              </a:lnRef>
+              <a:fillRef idx="1">
+                <a:schemeClr val="accent1"/>
+              </a:fillRef>
+              <a:effectRef idx="0">
+                <a:schemeClr val="accent1"/>
+              </a:effectRef>
+              <a:fontRef idx="minor">
+                <a:schemeClr val="lt1"/>
+              </a:fontRef>
+            </p:style>
+            <p:txBody>
+              <a:bodyPr lIns="36000" tIns="36000" rIns="36000" bIns="36000" rtlCol="0" anchor="ctr"/>
+              <a:lstStyle/>
+              <a:p>
+                <a:pPr algn="ctr"/>
+                <a:r>
+                  <a:rPr lang="en-US" altLang="ko-KR" sz="1600" b="1" dirty="0" smtClean="0">
+                    <a:solidFill>
+                      <a:schemeClr val="tx1"/>
+                    </a:solidFill>
+                  </a:rPr>
+                  <a:t>Container</a:t>
+                </a:r>
+                <a:endParaRPr lang="ko-KR" altLang="en-US" sz="1600" b="1" dirty="0">
+                  <a:solidFill>
+                    <a:schemeClr val="tx1"/>
+                  </a:solidFill>
+                </a:endParaRPr>
+              </a:p>
+            </p:txBody>
+          </p:sp>
+          <p:pic>
+            <p:nvPicPr>
+              <p:cNvPr id="12" name="그림 11"/>
+              <p:cNvPicPr>
+                <a:picLocks noChangeAspect="1"/>
+              </p:cNvPicPr>
+              <p:nvPr/>
+            </p:nvPicPr>
+            <p:blipFill>
+              <a:blip r:embed="rId5"/>
+              <a:stretch>
+                <a:fillRect/>
+              </a:stretch>
+            </p:blipFill>
+            <p:spPr>
+              <a:xfrm>
+                <a:off x="8026761" y="659581"/>
+                <a:ext cx="468000" cy="468000"/>
+              </a:xfrm>
+              <a:prstGeom prst="rect">
+                <a:avLst/>
+              </a:prstGeom>
+            </p:spPr>
+          </p:pic>
+        </p:grpSp>
+        <p:grpSp>
+          <p:nvGrpSpPr>
+            <p:cNvPr id="104" name="그룹 103"/>
+            <p:cNvGrpSpPr/>
+            <p:nvPr/>
+          </p:nvGrpSpPr>
+          <p:grpSpPr>
+            <a:xfrm>
+              <a:off x="5805371" y="497657"/>
+              <a:ext cx="1603545" cy="1091220"/>
+              <a:chOff x="8026761" y="659581"/>
+              <a:chExt cx="1603545" cy="1091220"/>
+            </a:xfrm>
+          </p:grpSpPr>
+          <p:sp>
+            <p:nvSpPr>
+              <p:cNvPr id="105" name="모서리가 둥근 직사각형 104"/>
+              <p:cNvSpPr/>
+              <p:nvPr/>
+            </p:nvSpPr>
+            <p:spPr>
+              <a:xfrm>
+                <a:off x="8190306" y="850801"/>
+                <a:ext cx="1440000" cy="900000"/>
+              </a:xfrm>
+              <a:prstGeom prst="roundRect">
+                <a:avLst/>
+              </a:prstGeom>
+              <a:noFill/>
+              <a:ln w="19050">
+                <a:solidFill>
+                  <a:srgbClr val="326CE5"/>
+                </a:solidFill>
+              </a:ln>
+            </p:spPr>
+            <p:style>
+              <a:lnRef idx="2">
+                <a:schemeClr val="accent1">
+                  <a:shade val="50000"/>
+                </a:schemeClr>
+              </a:lnRef>
+              <a:fillRef idx="1">
+                <a:schemeClr val="accent1"/>
+              </a:fillRef>
+              <a:effectRef idx="0">
+                <a:schemeClr val="accent1"/>
+              </a:effectRef>
+              <a:fontRef idx="minor">
+                <a:schemeClr val="lt1"/>
+              </a:fontRef>
+            </p:style>
+            <p:txBody>
+              <a:bodyPr lIns="36000" tIns="36000" rIns="36000" bIns="36000" rtlCol="0" anchor="ctr"/>
+              <a:lstStyle/>
+              <a:p>
+                <a:pPr algn="ctr"/>
+                <a:r>
+                  <a:rPr lang="en-US" altLang="ko-KR" sz="1600" b="1" dirty="0" smtClean="0">
+                    <a:solidFill>
+                      <a:schemeClr val="tx1"/>
+                    </a:solidFill>
+                  </a:rPr>
+                  <a:t>Container</a:t>
+                </a:r>
+                <a:endParaRPr lang="ko-KR" altLang="en-US" sz="1600" b="1" dirty="0">
+                  <a:solidFill>
+                    <a:schemeClr val="tx1"/>
+                  </a:solidFill>
+                </a:endParaRPr>
+              </a:p>
+            </p:txBody>
+          </p:sp>
+          <p:pic>
+            <p:nvPicPr>
+              <p:cNvPr id="106" name="그림 105"/>
+              <p:cNvPicPr>
+                <a:picLocks noChangeAspect="1"/>
+              </p:cNvPicPr>
+              <p:nvPr/>
+            </p:nvPicPr>
+            <p:blipFill>
+              <a:blip r:embed="rId5"/>
+              <a:stretch>
+                <a:fillRect/>
+              </a:stretch>
+            </p:blipFill>
+            <p:spPr>
+              <a:xfrm>
+                <a:off x="8026761" y="659581"/>
+                <a:ext cx="468000" cy="468000"/>
+              </a:xfrm>
+              <a:prstGeom prst="rect">
+                <a:avLst/>
+              </a:prstGeom>
+            </p:spPr>
+          </p:pic>
+        </p:grpSp>
+        <p:sp>
+          <p:nvSpPr>
+            <p:cNvPr id="107" name="오른쪽 화살표 106"/>
+            <p:cNvSpPr/>
+            <p:nvPr/>
+          </p:nvSpPr>
+          <p:spPr>
+            <a:xfrm rot="16200000">
+              <a:off x="8073314" y="1895054"/>
+              <a:ext cx="720000" cy="360000"/>
+            </a:xfrm>
+            <a:prstGeom prst="rightArrow">
+              <a:avLst/>
+            </a:prstGeom>
+            <a:solidFill>
+              <a:srgbClr val="A50021"/>
+            </a:solidFill>
+            <a:ln>
+              <a:noFill/>
+            </a:ln>
+            <a:effectLst>
+              <a:outerShdw blurRad="50800" dist="38100" dir="2700000" algn="tl" rotWithShape="0">
+                <a:prstClr val="black">
+                  <a:alpha val="40000"/>
+                </a:prstClr>
+              </a:outerShdw>
+            </a:effectLst>
+          </p:spPr>
+          <p:style>
+            <a:lnRef idx="2">
+              <a:schemeClr val="accent1">
+                <a:shade val="50000"/>
+              </a:schemeClr>
+            </a:lnRef>
+            <a:fillRef idx="1">
+              <a:schemeClr val="accent1"/>
+            </a:fillRef>
+            <a:effectRef idx="0">
+              <a:schemeClr val="accent1"/>
+            </a:effectRef>
+            <a:fontRef idx="minor">
+              <a:schemeClr val="lt1"/>
+            </a:fontRef>
+          </p:style>
+          <p:txBody>
+            <a:bodyPr rtlCol="0" anchor="ctr"/>
+            <a:lstStyle/>
+            <a:p>
+              <a:pPr algn="ctr"/>
+              <a:endParaRPr lang="ko-KR" altLang="en-US" b="1" dirty="0"/>
+            </a:p>
+          </p:txBody>
+        </p:sp>
+        <p:sp>
+          <p:nvSpPr>
+            <p:cNvPr id="108" name="TextBox 107"/>
+            <p:cNvSpPr txBox="1"/>
+            <p:nvPr/>
+          </p:nvSpPr>
+          <p:spPr>
+            <a:xfrm>
+              <a:off x="8613314" y="1686257"/>
+              <a:ext cx="1032688" cy="377402"/>
+            </a:xfrm>
+            <a:prstGeom prst="rect">
+              <a:avLst/>
+            </a:prstGeom>
+            <a:noFill/>
+          </p:spPr>
+          <p:txBody>
+            <a:bodyPr wrap="square" lIns="36000" tIns="36000" rIns="36000" bIns="36000" rtlCol="0">
+              <a:spAutoFit/>
+            </a:bodyPr>
+            <a:lstStyle/>
+            <a:p>
+              <a:pPr algn="ctr">
+                <a:lnSpc>
+                  <a:spcPct val="110000"/>
+                </a:lnSpc>
+              </a:pPr>
+              <a:r>
+                <a:rPr lang="en-US" altLang="ko-KR" b="1" dirty="0" smtClean="0">
+                  <a:solidFill>
+                    <a:srgbClr val="A50021"/>
+                  </a:solidFill>
+                </a:rPr>
+                <a:t>create</a:t>
+              </a:r>
+              <a:endParaRPr lang="ko-KR" altLang="en-US" b="1" dirty="0">
+                <a:solidFill>
+                  <a:srgbClr val="A50021"/>
+                </a:solidFill>
+              </a:endParaRPr>
+            </a:p>
+          </p:txBody>
+        </p:sp>
+      </p:grpSp>
+    </p:spTree>
+    <p:extLst>
+      <p:ext uri="{BB962C8B-B14F-4D97-AF65-F5344CB8AC3E}">
+        <p14:creationId xmlns:p14="http://schemas.microsoft.com/office/powerpoint/2010/main" val="3944226867"/>
+      </p:ext>
+    </p:extLst>
+  </p:cSld>
+  <p:clrMapOvr>
+    <a:masterClrMapping/>
+  </p:clrMapOvr>
+  <p:timing>
+    <p:tnLst>
+      <p:par>
+        <p:cTn id="1" dur="indefinite" restart="never" nodeType="tmRoot"/>
+      </p:par>
+    </p:tnLst>
+  </p:timing>
+</p:sld>
+</file>
+
+<file path=ppt/slides/slide6.xml><?xml version="1.0" encoding="utf-8"?>
+<p:sld xmlns:a="http://schemas.openxmlformats.org/drawingml/2006/main" xmlns:r="http://schemas.openxmlformats.org/officeDocument/2006/relationships" xmlns:p="http://schemas.openxmlformats.org/presentationml/2006/main">
+  <p:cSld>
+    <p:spTree>
+      <p:nvGrpSpPr>
+        <p:cNvPr id="1" name=""/>
+        <p:cNvGrpSpPr/>
+        <p:nvPr/>
+      </p:nvGrpSpPr>
+      <p:grpSpPr>
+        <a:xfrm>
+          <a:off x="0" y="0"/>
+          <a:ext cx="0" cy="0"/>
+          <a:chOff x="0" y="0"/>
+          <a:chExt cx="0" cy="0"/>
+        </a:xfrm>
+      </p:grpSpPr>
+      <p:sp>
+        <p:nvSpPr>
+          <p:cNvPr id="6" name="모서리가 둥근 직사각형 5"/>
+          <p:cNvSpPr/>
+          <p:nvPr/>
+        </p:nvSpPr>
+        <p:spPr>
+          <a:xfrm>
+            <a:off x="1110342" y="188331"/>
+            <a:ext cx="8820000" cy="6480000"/>
+          </a:xfrm>
+          <a:prstGeom prst="roundRect">
+            <a:avLst/>
+          </a:prstGeom>
+          <a:noFill/>
+          <a:ln w="19050">
+            <a:solidFill>
+              <a:schemeClr val="accent1"/>
+            </a:solidFill>
+          </a:ln>
+        </p:spPr>
+        <p:style>
+          <a:lnRef idx="2">
+            <a:schemeClr val="accent1">
+              <a:shade val="50000"/>
+            </a:schemeClr>
+          </a:lnRef>
+          <a:fillRef idx="1">
+            <a:schemeClr val="accent1"/>
+          </a:fillRef>
+          <a:effectRef idx="0">
+            <a:schemeClr val="accent1"/>
+          </a:effectRef>
+          <a:fontRef idx="minor">
+            <a:schemeClr val="lt1"/>
+          </a:fontRef>
+        </p:style>
+        <p:txBody>
+          <a:bodyPr lIns="36000" tIns="36000" rIns="36000" bIns="0" rtlCol="0" anchor="b"/>
+          <a:lstStyle/>
+          <a:p>
+            <a:pPr algn="ctr"/>
+            <a:r>
+              <a:rPr lang="en-US" altLang="ko-KR" b="1" dirty="0" smtClean="0">
+                <a:solidFill>
+                  <a:schemeClr val="tx1"/>
+                </a:solidFill>
+              </a:rPr>
+              <a:t>Host Machine</a:t>
+            </a:r>
+            <a:endParaRPr lang="ko-KR" altLang="en-US" b="1" dirty="0">
+              <a:solidFill>
+                <a:schemeClr val="tx1"/>
+              </a:solidFill>
+            </a:endParaRPr>
+          </a:p>
+        </p:txBody>
+      </p:sp>
+      <p:grpSp>
+        <p:nvGrpSpPr>
+          <p:cNvPr id="34" name="그룹 33"/>
+          <p:cNvGrpSpPr/>
+          <p:nvPr/>
+        </p:nvGrpSpPr>
+        <p:grpSpPr>
+          <a:xfrm>
+            <a:off x="7442366" y="3019097"/>
+            <a:ext cx="1925912" cy="1228534"/>
+            <a:chOff x="5723613" y="4761497"/>
+            <a:chExt cx="1925912" cy="1228534"/>
+          </a:xfrm>
+        </p:grpSpPr>
+        <p:pic>
+          <p:nvPicPr>
+            <p:cNvPr id="37" name="그림 36"/>
+            <p:cNvPicPr>
+              <a:picLocks/>
+            </p:cNvPicPr>
+            <p:nvPr/>
+          </p:nvPicPr>
+          <p:blipFill>
+            <a:blip r:embed="rId2"/>
+            <a:stretch>
+              <a:fillRect/>
+            </a:stretch>
+          </p:blipFill>
+          <p:spPr>
+            <a:xfrm>
+              <a:off x="6280016" y="4761497"/>
+              <a:ext cx="900000" cy="648000"/>
+            </a:xfrm>
+            <a:prstGeom prst="rect">
+              <a:avLst/>
+            </a:prstGeom>
+          </p:spPr>
+        </p:pic>
+        <p:sp>
+          <p:nvSpPr>
+            <p:cNvPr id="38" name="TextBox 37"/>
+            <p:cNvSpPr txBox="1"/>
+            <p:nvPr/>
+          </p:nvSpPr>
+          <p:spPr>
+            <a:xfrm>
+              <a:off x="5723613" y="5409497"/>
+              <a:ext cx="1925912" cy="580534"/>
+            </a:xfrm>
+            <a:prstGeom prst="rect">
+              <a:avLst/>
+            </a:prstGeom>
+            <a:noFill/>
+          </p:spPr>
+          <p:txBody>
+            <a:bodyPr wrap="square" lIns="36000" tIns="36000" rIns="36000" bIns="36000" rtlCol="0">
+              <a:spAutoFit/>
+            </a:bodyPr>
+            <a:lstStyle/>
+            <a:p>
+              <a:pPr algn="ctr">
+                <a:lnSpc>
+                  <a:spcPct val="110000"/>
+                </a:lnSpc>
+              </a:pPr>
+              <a:r>
+                <a:rPr lang="en-US" altLang="ko-KR" sz="1600" b="1" dirty="0" smtClean="0"/>
+                <a:t>Docker </a:t>
+              </a:r>
+              <a:r>
+                <a:rPr lang="en-US" altLang="ko-KR" sz="1600" b="1" dirty="0" smtClean="0"/>
+                <a:t>Daemon</a:t>
+              </a:r>
+              <a:r>
+                <a:rPr lang="en-US" altLang="ko-KR" sz="1600" b="1" dirty="0" smtClean="0"/>
+                <a:t/>
+              </a:r>
+              <a:br>
+                <a:rPr lang="en-US" altLang="ko-KR" sz="1600" b="1" dirty="0" smtClean="0"/>
+              </a:br>
+              <a:r>
+                <a:rPr lang="en-US" altLang="ko-KR" sz="1400" b="1" dirty="0" smtClean="0">
+                  <a:solidFill>
+                    <a:schemeClr val="tx1">
+                      <a:lumMod val="50000"/>
+                      <a:lumOff val="50000"/>
+                    </a:schemeClr>
+                  </a:solidFill>
+                </a:rPr>
+                <a:t>/</a:t>
+              </a:r>
+              <a:r>
+                <a:rPr lang="en-US" altLang="ko-KR" sz="1400" b="1" dirty="0" err="1" smtClean="0">
+                  <a:solidFill>
+                    <a:schemeClr val="tx1">
+                      <a:lumMod val="50000"/>
+                      <a:lumOff val="50000"/>
+                    </a:schemeClr>
+                  </a:solidFill>
+                </a:rPr>
+                <a:t>usr</a:t>
+              </a:r>
+              <a:r>
+                <a:rPr lang="en-US" altLang="ko-KR" sz="1400" b="1" dirty="0" smtClean="0">
+                  <a:solidFill>
+                    <a:schemeClr val="tx1">
+                      <a:lumMod val="50000"/>
+                      <a:lumOff val="50000"/>
+                    </a:schemeClr>
+                  </a:solidFill>
+                </a:rPr>
+                <a:t>/bin/</a:t>
+              </a:r>
+              <a:r>
+                <a:rPr lang="en-US" altLang="ko-KR" sz="1400" b="1" dirty="0" err="1" smtClean="0">
+                  <a:solidFill>
+                    <a:schemeClr val="tx1">
+                      <a:lumMod val="50000"/>
+                      <a:lumOff val="50000"/>
+                    </a:schemeClr>
+                  </a:solidFill>
+                </a:rPr>
+                <a:t>dockerd</a:t>
+              </a:r>
+              <a:endParaRPr lang="ko-KR" altLang="en-US" sz="1400" b="1" dirty="0">
+                <a:solidFill>
+                  <a:schemeClr val="tx1">
+                    <a:lumMod val="50000"/>
+                    <a:lumOff val="50000"/>
+                  </a:schemeClr>
+                </a:solidFill>
+              </a:endParaRPr>
+            </a:p>
+          </p:txBody>
+        </p:sp>
+      </p:grpSp>
+      <p:sp>
+        <p:nvSpPr>
+          <p:cNvPr id="18" name="모서리가 둥근 직사각형 17"/>
+          <p:cNvSpPr/>
+          <p:nvPr/>
+        </p:nvSpPr>
+        <p:spPr>
+          <a:xfrm>
+            <a:off x="1694343" y="711543"/>
+            <a:ext cx="7884367" cy="1980000"/>
+          </a:xfrm>
+          <a:prstGeom prst="roundRect">
+            <a:avLst/>
+          </a:prstGeom>
+          <a:noFill/>
+          <a:ln w="19050">
+            <a:solidFill>
+              <a:srgbClr val="C00000"/>
+            </a:solidFill>
+          </a:ln>
+        </p:spPr>
+        <p:style>
+          <a:lnRef idx="2">
+            <a:schemeClr val="accent1">
+              <a:shade val="50000"/>
+            </a:schemeClr>
+          </a:lnRef>
+          <a:fillRef idx="1">
+            <a:schemeClr val="accent1"/>
+          </a:fillRef>
+          <a:effectRef idx="0">
+            <a:schemeClr val="accent1"/>
+          </a:effectRef>
+          <a:fontRef idx="minor">
+            <a:schemeClr val="lt1"/>
+          </a:fontRef>
+        </p:style>
+        <p:txBody>
+          <a:bodyPr lIns="36000" tIns="36000" rIns="36000" bIns="36000" rtlCol="0" anchor="t"/>
+          <a:lstStyle/>
+          <a:p>
+            <a:pPr algn="ctr"/>
+            <a:r>
+              <a:rPr lang="en-US" altLang="ko-KR" b="1" dirty="0" smtClean="0">
+                <a:solidFill>
+                  <a:schemeClr val="tx1"/>
+                </a:solidFill>
+              </a:rPr>
+              <a:t>Jenkins Container</a:t>
+            </a:r>
+            <a:endParaRPr lang="ko-KR" altLang="en-US" b="1" dirty="0">
+              <a:solidFill>
+                <a:schemeClr val="tx1"/>
+              </a:solidFill>
+            </a:endParaRPr>
+          </a:p>
+        </p:txBody>
+      </p:sp>
+      <p:pic>
+        <p:nvPicPr>
+          <p:cNvPr id="20" name="그림 19"/>
+          <p:cNvPicPr>
+            <a:picLocks/>
+          </p:cNvPicPr>
+          <p:nvPr/>
+        </p:nvPicPr>
+        <p:blipFill>
+          <a:blip r:embed="rId3"/>
+          <a:stretch>
+            <a:fillRect/>
+          </a:stretch>
+        </p:blipFill>
+        <p:spPr>
+          <a:xfrm>
+            <a:off x="1461975" y="390443"/>
+            <a:ext cx="720000" cy="828000"/>
+          </a:xfrm>
+          <a:prstGeom prst="rect">
+            <a:avLst/>
+          </a:prstGeom>
+        </p:spPr>
+      </p:pic>
+      <p:pic>
+        <p:nvPicPr>
+          <p:cNvPr id="9" name="그림 8"/>
+          <p:cNvPicPr>
+            <a:picLocks noChangeAspect="1"/>
+          </p:cNvPicPr>
+          <p:nvPr/>
+        </p:nvPicPr>
+        <p:blipFill>
+          <a:blip r:embed="rId4">
+            <a:extLst>
+              <a:ext uri="{28A0092B-C50C-407E-A947-70E740481C1C}">
+                <a14:useLocalDpi xmlns:a14="http://schemas.microsoft.com/office/drawing/2010/main" val="0"/>
+              </a:ext>
+            </a:extLst>
+          </a:blip>
+          <a:stretch>
+            <a:fillRect/>
+          </a:stretch>
+        </p:blipFill>
+        <p:spPr>
+          <a:xfrm>
+            <a:off x="582259" y="2759274"/>
+            <a:ext cx="1019516" cy="1338114"/>
+          </a:xfrm>
+          <a:prstGeom prst="rect">
+            <a:avLst/>
+          </a:prstGeom>
+        </p:spPr>
+      </p:pic>
+      <p:grpSp>
+        <p:nvGrpSpPr>
+          <p:cNvPr id="10" name="그룹 9"/>
+          <p:cNvGrpSpPr/>
+          <p:nvPr/>
+        </p:nvGrpSpPr>
+        <p:grpSpPr>
+          <a:xfrm>
+            <a:off x="5424688" y="4812332"/>
+            <a:ext cx="1603545" cy="1091220"/>
+            <a:chOff x="8026761" y="659581"/>
+            <a:chExt cx="1603545" cy="1091220"/>
+          </a:xfrm>
+        </p:grpSpPr>
+        <p:sp>
+          <p:nvSpPr>
+            <p:cNvPr id="16" name="모서리가 둥근 직사각형 15"/>
+            <p:cNvSpPr/>
+            <p:nvPr/>
+          </p:nvSpPr>
+          <p:spPr>
+            <a:xfrm>
+              <a:off x="8190306" y="850801"/>
+              <a:ext cx="1440000" cy="900000"/>
+            </a:xfrm>
+            <a:prstGeom prst="roundRect">
+              <a:avLst/>
+            </a:prstGeom>
+            <a:noFill/>
+            <a:ln w="19050">
+              <a:solidFill>
+                <a:srgbClr val="326CE5"/>
+              </a:solidFill>
+            </a:ln>
+          </p:spPr>
+          <p:style>
+            <a:lnRef idx="2">
+              <a:schemeClr val="accent1">
+                <a:shade val="50000"/>
+              </a:schemeClr>
+            </a:lnRef>
+            <a:fillRef idx="1">
+              <a:schemeClr val="accent1"/>
+            </a:fillRef>
+            <a:effectRef idx="0">
+              <a:schemeClr val="accent1"/>
+            </a:effectRef>
+            <a:fontRef idx="minor">
+              <a:schemeClr val="lt1"/>
+            </a:fontRef>
+          </p:style>
+          <p:txBody>
+            <a:bodyPr lIns="36000" tIns="36000" rIns="36000" bIns="36000" rtlCol="0" anchor="ctr"/>
+            <a:lstStyle/>
+            <a:p>
+              <a:pPr algn="ctr"/>
+              <a:r>
+                <a:rPr lang="en-US" altLang="ko-KR" sz="1600" b="1" dirty="0" smtClean="0">
+                  <a:solidFill>
+                    <a:schemeClr val="tx1"/>
+                  </a:solidFill>
+                </a:rPr>
+                <a:t>Container</a:t>
+              </a:r>
+              <a:endParaRPr lang="ko-KR" altLang="en-US" sz="1600" b="1" dirty="0">
+                <a:solidFill>
+                  <a:schemeClr val="tx1"/>
+                </a:solidFill>
+              </a:endParaRPr>
+            </a:p>
+          </p:txBody>
+        </p:sp>
+        <p:pic>
+          <p:nvPicPr>
+            <p:cNvPr id="17" name="그림 16"/>
+            <p:cNvPicPr>
+              <a:picLocks noChangeAspect="1"/>
+            </p:cNvPicPr>
+            <p:nvPr/>
+          </p:nvPicPr>
+          <p:blipFill>
+            <a:blip r:embed="rId5"/>
+            <a:stretch>
+              <a:fillRect/>
+            </a:stretch>
+          </p:blipFill>
+          <p:spPr>
+            <a:xfrm>
+              <a:off x="8026761" y="659581"/>
+              <a:ext cx="468000" cy="468000"/>
+            </a:xfrm>
+            <a:prstGeom prst="rect">
+              <a:avLst/>
+            </a:prstGeom>
+          </p:spPr>
+        </p:pic>
+      </p:grpSp>
+      <p:grpSp>
+        <p:nvGrpSpPr>
+          <p:cNvPr id="11" name="그룹 10"/>
+          <p:cNvGrpSpPr/>
+          <p:nvPr/>
+        </p:nvGrpSpPr>
+        <p:grpSpPr>
+          <a:xfrm>
+            <a:off x="7612577" y="4812332"/>
+            <a:ext cx="1603545" cy="1091220"/>
+            <a:chOff x="8026761" y="659581"/>
+            <a:chExt cx="1603545" cy="1091220"/>
+          </a:xfrm>
+        </p:grpSpPr>
+        <p:sp>
+          <p:nvSpPr>
+            <p:cNvPr id="14" name="모서리가 둥근 직사각형 13"/>
+            <p:cNvSpPr/>
+            <p:nvPr/>
+          </p:nvSpPr>
+          <p:spPr>
+            <a:xfrm>
+              <a:off x="8190306" y="850801"/>
+              <a:ext cx="1440000" cy="900000"/>
+            </a:xfrm>
+            <a:prstGeom prst="roundRect">
+              <a:avLst/>
+            </a:prstGeom>
+            <a:noFill/>
+            <a:ln w="19050">
+              <a:solidFill>
+                <a:srgbClr val="326CE5"/>
+              </a:solidFill>
+            </a:ln>
+          </p:spPr>
+          <p:style>
+            <a:lnRef idx="2">
+              <a:schemeClr val="accent1">
+                <a:shade val="50000"/>
+              </a:schemeClr>
+            </a:lnRef>
+            <a:fillRef idx="1">
+              <a:schemeClr val="accent1"/>
+            </a:fillRef>
+            <a:effectRef idx="0">
+              <a:schemeClr val="accent1"/>
+            </a:effectRef>
+            <a:fontRef idx="minor">
+              <a:schemeClr val="lt1"/>
+            </a:fontRef>
+          </p:style>
+          <p:txBody>
+            <a:bodyPr lIns="36000" tIns="36000" rIns="36000" bIns="36000" rtlCol="0" anchor="ctr"/>
+            <a:lstStyle/>
+            <a:p>
+              <a:pPr algn="ctr"/>
+              <a:r>
+                <a:rPr lang="en-US" altLang="ko-KR" sz="1600" b="1" dirty="0" smtClean="0">
+                  <a:solidFill>
+                    <a:schemeClr val="tx1"/>
+                  </a:solidFill>
+                </a:rPr>
+                <a:t>Container</a:t>
+              </a:r>
+              <a:endParaRPr lang="ko-KR" altLang="en-US" sz="1600" b="1" dirty="0">
+                <a:solidFill>
+                  <a:schemeClr val="tx1"/>
+                </a:solidFill>
+              </a:endParaRPr>
+            </a:p>
+          </p:txBody>
+        </p:sp>
+        <p:pic>
+          <p:nvPicPr>
+            <p:cNvPr id="15" name="그림 14"/>
+            <p:cNvPicPr>
+              <a:picLocks noChangeAspect="1"/>
+            </p:cNvPicPr>
+            <p:nvPr/>
+          </p:nvPicPr>
+          <p:blipFill>
+            <a:blip r:embed="rId5"/>
+            <a:stretch>
+              <a:fillRect/>
+            </a:stretch>
+          </p:blipFill>
+          <p:spPr>
+            <a:xfrm>
+              <a:off x="8026761" y="659581"/>
+              <a:ext cx="468000" cy="468000"/>
+            </a:xfrm>
+            <a:prstGeom prst="rect">
+              <a:avLst/>
+            </a:prstGeom>
+          </p:spPr>
+        </p:pic>
+      </p:grpSp>
+      <p:sp>
+        <p:nvSpPr>
+          <p:cNvPr id="13" name="TextBox 12"/>
+          <p:cNvSpPr txBox="1"/>
+          <p:nvPr/>
+        </p:nvSpPr>
+        <p:spPr>
+          <a:xfrm>
+            <a:off x="8609117" y="4341839"/>
+            <a:ext cx="852124" cy="377402"/>
+          </a:xfrm>
+          <a:prstGeom prst="rect">
+            <a:avLst/>
+          </a:prstGeom>
+          <a:noFill/>
+        </p:spPr>
+        <p:txBody>
+          <a:bodyPr wrap="square" lIns="36000" tIns="36000" rIns="36000" bIns="36000" rtlCol="0">
+            <a:spAutoFit/>
+          </a:bodyPr>
+          <a:lstStyle/>
+          <a:p>
+            <a:pPr algn="ctr">
+              <a:lnSpc>
+                <a:spcPct val="110000"/>
+              </a:lnSpc>
+            </a:pPr>
+            <a:r>
+              <a:rPr lang="en-US" altLang="ko-KR" b="1" dirty="0" smtClean="0">
+                <a:solidFill>
+                  <a:schemeClr val="tx2"/>
+                </a:solidFill>
+              </a:rPr>
+              <a:t>create</a:t>
+            </a:r>
+            <a:endParaRPr lang="ko-KR" altLang="en-US" b="1" dirty="0">
+              <a:solidFill>
+                <a:schemeClr val="tx2"/>
+              </a:solidFill>
+            </a:endParaRPr>
+          </a:p>
+        </p:txBody>
+      </p:sp>
+      <p:grpSp>
+        <p:nvGrpSpPr>
+          <p:cNvPr id="50" name="그룹 49"/>
+          <p:cNvGrpSpPr/>
+          <p:nvPr/>
+        </p:nvGrpSpPr>
+        <p:grpSpPr>
+          <a:xfrm>
+            <a:off x="2273569" y="1855755"/>
+            <a:ext cx="1944000" cy="1728000"/>
+            <a:chOff x="2002975" y="3218030"/>
+            <a:chExt cx="1944000" cy="1728000"/>
+          </a:xfrm>
+        </p:grpSpPr>
+        <p:sp>
+          <p:nvSpPr>
+            <p:cNvPr id="43" name="모서리가 둥근 직사각형 42"/>
+            <p:cNvSpPr/>
+            <p:nvPr/>
+          </p:nvSpPr>
+          <p:spPr>
+            <a:xfrm>
+              <a:off x="2002975" y="3218030"/>
+              <a:ext cx="1944000" cy="1728000"/>
+            </a:xfrm>
+            <a:prstGeom prst="roundRect">
+              <a:avLst/>
+            </a:prstGeom>
+            <a:solidFill>
+              <a:schemeClr val="bg1"/>
+            </a:solidFill>
+            <a:ln w="19050">
+              <a:solidFill>
+                <a:schemeClr val="accent6"/>
+              </a:solidFill>
+            </a:ln>
+          </p:spPr>
+          <p:style>
+            <a:lnRef idx="2">
+              <a:schemeClr val="accent1">
+                <a:shade val="50000"/>
+              </a:schemeClr>
+            </a:lnRef>
+            <a:fillRef idx="1">
+              <a:schemeClr val="accent1"/>
+            </a:fillRef>
+            <a:effectRef idx="0">
+              <a:schemeClr val="accent1"/>
+            </a:effectRef>
+            <a:fontRef idx="minor">
+              <a:schemeClr val="lt1"/>
+            </a:fontRef>
+          </p:style>
+          <p:txBody>
+            <a:bodyPr lIns="36000" tIns="36000" rIns="36000" bIns="36000" rtlCol="0" anchor="t"/>
+            <a:lstStyle/>
+            <a:p>
+              <a:pPr algn="ctr"/>
+              <a:r>
+                <a:rPr lang="en-US" altLang="ko-KR" sz="1600" b="1" dirty="0" smtClean="0">
+                  <a:solidFill>
+                    <a:schemeClr val="tx1"/>
+                  </a:solidFill>
+                </a:rPr>
+                <a:t>Volume Mounted</a:t>
+              </a:r>
+              <a:endParaRPr lang="ko-KR" altLang="en-US" sz="1600" b="1" dirty="0">
+                <a:solidFill>
+                  <a:schemeClr val="tx1"/>
+                </a:solidFill>
+              </a:endParaRPr>
+            </a:p>
+          </p:txBody>
+        </p:sp>
+        <p:grpSp>
+          <p:nvGrpSpPr>
+            <p:cNvPr id="32" name="그룹 31"/>
+            <p:cNvGrpSpPr/>
+            <p:nvPr/>
+          </p:nvGrpSpPr>
+          <p:grpSpPr>
+            <a:xfrm>
+              <a:off x="2012019" y="3669220"/>
+              <a:ext cx="1925912" cy="1208465"/>
+              <a:chOff x="186021" y="4761497"/>
+              <a:chExt cx="1925912" cy="1208465"/>
+            </a:xfrm>
+          </p:grpSpPr>
+          <p:pic>
+            <p:nvPicPr>
+              <p:cNvPr id="41" name="그림 40"/>
+              <p:cNvPicPr>
+                <a:picLocks/>
+              </p:cNvPicPr>
+              <p:nvPr/>
+            </p:nvPicPr>
+            <p:blipFill>
+              <a:blip r:embed="rId2"/>
+              <a:stretch>
+                <a:fillRect/>
+              </a:stretch>
+            </p:blipFill>
+            <p:spPr>
+              <a:xfrm>
+                <a:off x="742424" y="4761497"/>
+                <a:ext cx="900000" cy="648000"/>
+              </a:xfrm>
+              <a:prstGeom prst="rect">
+                <a:avLst/>
+              </a:prstGeom>
+            </p:spPr>
+          </p:pic>
+          <p:sp>
+            <p:nvSpPr>
+              <p:cNvPr id="42" name="TextBox 41"/>
+              <p:cNvSpPr txBox="1"/>
+              <p:nvPr/>
+            </p:nvSpPr>
+            <p:spPr>
+              <a:xfrm>
+                <a:off x="186021" y="5409497"/>
+                <a:ext cx="1925912" cy="560465"/>
+              </a:xfrm>
+              <a:prstGeom prst="rect">
+                <a:avLst/>
+              </a:prstGeom>
+              <a:noFill/>
+            </p:spPr>
+            <p:txBody>
+              <a:bodyPr wrap="square" lIns="36000" tIns="36000" rIns="36000" bIns="36000" rtlCol="0">
+                <a:spAutoFit/>
+              </a:bodyPr>
+              <a:lstStyle/>
+              <a:p>
+                <a:pPr algn="ctr">
+                  <a:lnSpc>
+                    <a:spcPct val="110000"/>
+                  </a:lnSpc>
+                </a:pPr>
+                <a:r>
+                  <a:rPr lang="en-US" altLang="ko-KR" sz="1600" b="1" dirty="0" smtClean="0"/>
+                  <a:t>Docker Client</a:t>
+                </a:r>
+                <a:br>
+                  <a:rPr lang="en-US" altLang="ko-KR" sz="1600" b="1" dirty="0" smtClean="0"/>
+                </a:br>
+                <a:r>
+                  <a:rPr lang="en-US" altLang="ko-KR" sz="1400" b="1" dirty="0" smtClean="0">
+                    <a:solidFill>
+                      <a:schemeClr val="tx1">
+                        <a:lumMod val="50000"/>
+                        <a:lumOff val="50000"/>
+                      </a:schemeClr>
+                    </a:solidFill>
+                  </a:rPr>
+                  <a:t>/</a:t>
+                </a:r>
+                <a:r>
+                  <a:rPr lang="en-US" altLang="ko-KR" sz="1400" b="1" dirty="0" err="1" smtClean="0">
+                    <a:solidFill>
+                      <a:schemeClr val="tx1">
+                        <a:lumMod val="50000"/>
+                        <a:lumOff val="50000"/>
+                      </a:schemeClr>
+                    </a:solidFill>
+                  </a:rPr>
+                  <a:t>usr</a:t>
+                </a:r>
+                <a:r>
+                  <a:rPr lang="en-US" altLang="ko-KR" sz="1400" b="1" dirty="0" smtClean="0">
+                    <a:solidFill>
+                      <a:schemeClr val="tx1">
+                        <a:lumMod val="50000"/>
+                        <a:lumOff val="50000"/>
+                      </a:schemeClr>
+                    </a:solidFill>
+                  </a:rPr>
+                  <a:t>/bin/</a:t>
+                </a:r>
+                <a:r>
+                  <a:rPr lang="en-US" altLang="ko-KR" sz="1400" b="1" dirty="0" err="1" smtClean="0">
+                    <a:solidFill>
+                      <a:schemeClr val="tx1">
+                        <a:lumMod val="50000"/>
+                        <a:lumOff val="50000"/>
+                      </a:schemeClr>
+                    </a:solidFill>
+                  </a:rPr>
+                  <a:t>docker</a:t>
+                </a:r>
+                <a:endParaRPr lang="ko-KR" altLang="en-US" sz="1400" b="1" dirty="0">
+                  <a:solidFill>
+                    <a:schemeClr val="tx1">
+                      <a:lumMod val="50000"/>
+                      <a:lumOff val="50000"/>
+                    </a:schemeClr>
+                  </a:solidFill>
+                </a:endParaRPr>
+              </a:p>
+            </p:txBody>
+          </p:sp>
+        </p:grpSp>
+      </p:grpSp>
+      <p:grpSp>
+        <p:nvGrpSpPr>
+          <p:cNvPr id="49" name="그룹 48"/>
+          <p:cNvGrpSpPr/>
+          <p:nvPr/>
+        </p:nvGrpSpPr>
+        <p:grpSpPr>
+          <a:xfrm>
+            <a:off x="4898843" y="1855755"/>
+            <a:ext cx="1944000" cy="1728000"/>
+            <a:chOff x="4628249" y="3218030"/>
+            <a:chExt cx="1944000" cy="1728000"/>
+          </a:xfrm>
+        </p:grpSpPr>
+        <p:sp>
+          <p:nvSpPr>
+            <p:cNvPr id="44" name="모서리가 둥근 직사각형 43"/>
+            <p:cNvSpPr/>
+            <p:nvPr/>
+          </p:nvSpPr>
+          <p:spPr>
+            <a:xfrm>
+              <a:off x="4628249" y="3218030"/>
+              <a:ext cx="1944000" cy="1728000"/>
+            </a:xfrm>
+            <a:prstGeom prst="roundRect">
+              <a:avLst/>
+            </a:prstGeom>
+            <a:solidFill>
+              <a:schemeClr val="bg1"/>
+            </a:solidFill>
+            <a:ln w="19050">
+              <a:solidFill>
+                <a:schemeClr val="accent6"/>
+              </a:solidFill>
+            </a:ln>
+          </p:spPr>
+          <p:style>
+            <a:lnRef idx="2">
+              <a:schemeClr val="accent1">
+                <a:shade val="50000"/>
+              </a:schemeClr>
+            </a:lnRef>
+            <a:fillRef idx="1">
+              <a:schemeClr val="accent1"/>
+            </a:fillRef>
+            <a:effectRef idx="0">
+              <a:schemeClr val="accent1"/>
+            </a:effectRef>
+            <a:fontRef idx="minor">
+              <a:schemeClr val="lt1"/>
+            </a:fontRef>
+          </p:style>
+          <p:txBody>
+            <a:bodyPr lIns="36000" tIns="36000" rIns="36000" bIns="36000" rtlCol="0" anchor="t"/>
+            <a:lstStyle/>
+            <a:p>
+              <a:pPr algn="ctr"/>
+              <a:r>
+                <a:rPr lang="en-US" altLang="ko-KR" sz="1600" b="1" dirty="0" smtClean="0">
+                  <a:solidFill>
+                    <a:schemeClr val="tx1"/>
+                  </a:solidFill>
+                </a:rPr>
+                <a:t>Volume Mounted</a:t>
+              </a:r>
+              <a:endParaRPr lang="ko-KR" altLang="en-US" sz="1600" b="1" dirty="0">
+                <a:solidFill>
+                  <a:schemeClr val="tx1"/>
+                </a:solidFill>
+              </a:endParaRPr>
+            </a:p>
+          </p:txBody>
+        </p:sp>
+        <p:grpSp>
+          <p:nvGrpSpPr>
+            <p:cNvPr id="33" name="그룹 32"/>
+            <p:cNvGrpSpPr/>
+            <p:nvPr/>
+          </p:nvGrpSpPr>
+          <p:grpSpPr>
+            <a:xfrm>
+              <a:off x="4637293" y="3669220"/>
+              <a:ext cx="1925912" cy="1228534"/>
+              <a:chOff x="2911370" y="4761497"/>
+              <a:chExt cx="1925912" cy="1228534"/>
+            </a:xfrm>
+          </p:grpSpPr>
+          <p:pic>
+            <p:nvPicPr>
+              <p:cNvPr id="39" name="그림 38"/>
+              <p:cNvPicPr>
+                <a:picLocks/>
+              </p:cNvPicPr>
+              <p:nvPr/>
+            </p:nvPicPr>
+            <p:blipFill>
+              <a:blip r:embed="rId2"/>
+              <a:stretch>
+                <a:fillRect/>
+              </a:stretch>
+            </p:blipFill>
+            <p:spPr>
+              <a:xfrm>
+                <a:off x="3467773" y="4761497"/>
+                <a:ext cx="900000" cy="648000"/>
+              </a:xfrm>
+              <a:prstGeom prst="rect">
+                <a:avLst/>
+              </a:prstGeom>
+            </p:spPr>
+          </p:pic>
+          <p:sp>
+            <p:nvSpPr>
+              <p:cNvPr id="40" name="TextBox 39"/>
+              <p:cNvSpPr txBox="1"/>
+              <p:nvPr/>
+            </p:nvSpPr>
+            <p:spPr>
+              <a:xfrm>
+                <a:off x="2911370" y="5409497"/>
+                <a:ext cx="1925912" cy="580534"/>
+              </a:xfrm>
+              <a:prstGeom prst="rect">
+                <a:avLst/>
+              </a:prstGeom>
+              <a:noFill/>
+            </p:spPr>
+            <p:txBody>
+              <a:bodyPr wrap="square" lIns="36000" tIns="36000" rIns="36000" bIns="36000" rtlCol="0">
+                <a:spAutoFit/>
+              </a:bodyPr>
+              <a:lstStyle/>
+              <a:p>
+                <a:pPr algn="ctr">
+                  <a:lnSpc>
+                    <a:spcPct val="110000"/>
+                  </a:lnSpc>
+                </a:pPr>
+                <a:r>
+                  <a:rPr lang="en-US" altLang="ko-KR" sz="1600" b="1" dirty="0" smtClean="0"/>
+                  <a:t>Docker Socket</a:t>
+                </a:r>
+                <a:br>
+                  <a:rPr lang="en-US" altLang="ko-KR" sz="1600" b="1" dirty="0" smtClean="0"/>
+                </a:br>
+                <a:r>
+                  <a:rPr lang="en-US" altLang="ko-KR" sz="1400" b="1" dirty="0" smtClean="0">
+                    <a:solidFill>
+                      <a:schemeClr val="tx1">
+                        <a:lumMod val="50000"/>
+                        <a:lumOff val="50000"/>
+                      </a:schemeClr>
+                    </a:solidFill>
+                  </a:rPr>
+                  <a:t>/</a:t>
+                </a:r>
+                <a:r>
+                  <a:rPr lang="en-US" altLang="ko-KR" sz="1400" b="1" dirty="0" err="1" smtClean="0">
+                    <a:solidFill>
+                      <a:schemeClr val="tx1">
+                        <a:lumMod val="50000"/>
+                        <a:lumOff val="50000"/>
+                      </a:schemeClr>
+                    </a:solidFill>
+                  </a:rPr>
+                  <a:t>var</a:t>
+                </a:r>
+                <a:r>
+                  <a:rPr lang="en-US" altLang="ko-KR" sz="1400" b="1" dirty="0" smtClean="0">
+                    <a:solidFill>
+                      <a:schemeClr val="tx1">
+                        <a:lumMod val="50000"/>
+                        <a:lumOff val="50000"/>
+                      </a:schemeClr>
+                    </a:solidFill>
+                  </a:rPr>
+                  <a:t>/run/</a:t>
+                </a:r>
+                <a:r>
+                  <a:rPr lang="en-US" altLang="ko-KR" sz="1400" b="1" dirty="0" err="1" smtClean="0">
+                    <a:solidFill>
+                      <a:schemeClr val="tx1">
+                        <a:lumMod val="50000"/>
+                        <a:lumOff val="50000"/>
+                      </a:schemeClr>
+                    </a:solidFill>
+                  </a:rPr>
+                  <a:t>docker</a:t>
+                </a:r>
+                <a:r>
+                  <a:rPr lang="en-US" altLang="ko-KR" sz="1400" b="1" dirty="0" err="1" smtClean="0">
+                    <a:solidFill>
+                      <a:schemeClr val="tx1">
+                        <a:lumMod val="50000"/>
+                        <a:lumOff val="50000"/>
+                      </a:schemeClr>
+                    </a:solidFill>
+                  </a:rPr>
+                  <a:t>.sock</a:t>
+                </a:r>
+                <a:endParaRPr lang="ko-KR" altLang="en-US" sz="1400" b="1" dirty="0">
+                  <a:solidFill>
+                    <a:schemeClr val="tx1">
+                      <a:lumMod val="50000"/>
+                      <a:lumOff val="50000"/>
+                    </a:schemeClr>
+                  </a:solidFill>
+                </a:endParaRPr>
+              </a:p>
+            </p:txBody>
+          </p:sp>
+        </p:grpSp>
+      </p:grpSp>
+      <p:sp>
+        <p:nvSpPr>
+          <p:cNvPr id="35" name="오른쪽 화살표 34"/>
+          <p:cNvSpPr/>
+          <p:nvPr/>
+        </p:nvSpPr>
+        <p:spPr>
+          <a:xfrm>
+            <a:off x="4053809" y="2539755"/>
+            <a:ext cx="1008000" cy="360000"/>
+          </a:xfrm>
+          <a:prstGeom prst="rightArrow">
+            <a:avLst/>
+          </a:prstGeom>
+          <a:solidFill>
+            <a:schemeClr val="tx2"/>
+          </a:solidFill>
+          <a:ln>
+            <a:noFill/>
+          </a:ln>
+          <a:effectLst>
+            <a:outerShdw blurRad="50800" dist="38100" dir="2700000" algn="tl" rotWithShape="0">
+              <a:prstClr val="black">
+                <a:alpha val="40000"/>
+              </a:prstClr>
+            </a:outerShdw>
+          </a:effectLst>
+        </p:spPr>
+        <p:style>
+          <a:lnRef idx="2">
+            <a:schemeClr val="accent1">
+              <a:shade val="50000"/>
+            </a:schemeClr>
+          </a:lnRef>
+          <a:fillRef idx="1">
+            <a:schemeClr val="accent1"/>
+          </a:fillRef>
+          <a:effectRef idx="0">
+            <a:schemeClr val="accent1"/>
+          </a:effectRef>
+          <a:fontRef idx="minor">
+            <a:schemeClr val="lt1"/>
+          </a:fontRef>
+        </p:style>
+        <p:txBody>
+          <a:bodyPr rtlCol="0" anchor="ctr"/>
+          <a:lstStyle/>
+          <a:p>
+            <a:pPr algn="ctr"/>
+            <a:endParaRPr lang="ko-KR" altLang="en-US"/>
+          </a:p>
+        </p:txBody>
+      </p:sp>
+      <p:sp>
+        <p:nvSpPr>
+          <p:cNvPr id="51" name="오른쪽 화살표 50"/>
+          <p:cNvSpPr/>
+          <p:nvPr/>
+        </p:nvSpPr>
+        <p:spPr>
+          <a:xfrm rot="1800000">
+            <a:off x="6682484" y="2726669"/>
+            <a:ext cx="1008000" cy="360000"/>
+          </a:xfrm>
+          <a:prstGeom prst="rightArrow">
+            <a:avLst/>
+          </a:prstGeom>
+          <a:solidFill>
+            <a:schemeClr val="tx2"/>
+          </a:solidFill>
+          <a:ln>
+            <a:noFill/>
+          </a:ln>
+          <a:effectLst>
+            <a:outerShdw blurRad="50800" dist="38100" dir="2700000" algn="tl" rotWithShape="0">
+              <a:prstClr val="black">
+                <a:alpha val="40000"/>
+              </a:prstClr>
+            </a:outerShdw>
+          </a:effectLst>
+        </p:spPr>
+        <p:style>
+          <a:lnRef idx="2">
+            <a:schemeClr val="accent1">
+              <a:shade val="50000"/>
+            </a:schemeClr>
+          </a:lnRef>
+          <a:fillRef idx="1">
+            <a:schemeClr val="accent1"/>
+          </a:fillRef>
+          <a:effectRef idx="0">
+            <a:schemeClr val="accent1"/>
+          </a:effectRef>
+          <a:fontRef idx="minor">
+            <a:schemeClr val="lt1"/>
+          </a:fontRef>
+        </p:style>
+        <p:txBody>
+          <a:bodyPr rtlCol="0" anchor="ctr"/>
+          <a:lstStyle/>
+          <a:p>
+            <a:pPr algn="ctr"/>
+            <a:endParaRPr lang="ko-KR" altLang="en-US"/>
+          </a:p>
+        </p:txBody>
+      </p:sp>
+      <p:sp>
+        <p:nvSpPr>
+          <p:cNvPr id="52" name="오른쪽 화살표 51"/>
+          <p:cNvSpPr/>
+          <p:nvPr/>
+        </p:nvSpPr>
+        <p:spPr>
+          <a:xfrm rot="5400000">
+            <a:off x="8081322" y="4436443"/>
+            <a:ext cx="648000" cy="360000"/>
+          </a:xfrm>
+          <a:prstGeom prst="rightArrow">
+            <a:avLst/>
+          </a:prstGeom>
+          <a:solidFill>
+            <a:schemeClr val="tx2"/>
+          </a:solidFill>
+          <a:ln>
+            <a:noFill/>
+          </a:ln>
+          <a:effectLst>
+            <a:outerShdw blurRad="50800" dist="38100" dir="2700000" algn="tl" rotWithShape="0">
+              <a:prstClr val="black">
+                <a:alpha val="40000"/>
+              </a:prstClr>
+            </a:outerShdw>
+          </a:effectLst>
+        </p:spPr>
+        <p:style>
+          <a:lnRef idx="2">
+            <a:schemeClr val="accent1">
+              <a:shade val="50000"/>
+            </a:schemeClr>
+          </a:lnRef>
+          <a:fillRef idx="1">
+            <a:schemeClr val="accent1"/>
+          </a:fillRef>
+          <a:effectRef idx="0">
+            <a:schemeClr val="accent1"/>
+          </a:effectRef>
+          <a:fontRef idx="minor">
+            <a:schemeClr val="lt1"/>
+          </a:fontRef>
+        </p:style>
+        <p:txBody>
+          <a:bodyPr rtlCol="0" anchor="ctr"/>
+          <a:lstStyle/>
+          <a:p>
+            <a:pPr algn="ctr"/>
+            <a:endParaRPr lang="ko-KR" altLang="en-US"/>
+          </a:p>
+        </p:txBody>
+      </p:sp>
+    </p:spTree>
+    <p:extLst>
+      <p:ext uri="{BB962C8B-B14F-4D97-AF65-F5344CB8AC3E}">
+        <p14:creationId xmlns:p14="http://schemas.microsoft.com/office/powerpoint/2010/main" val="1180868979"/>
+      </p:ext>
+    </p:extLst>
+  </p:cSld>
+  <p:clrMapOvr>
+    <a:masterClrMapping/>
+  </p:clrMapOvr>
+  <p:timing>
+    <p:tnLst>
+      <p:par>
+        <p:cTn id="1" dur="indefinite" restart="never" nodeType="tmRoot"/>
+      </p:par>
+    </p:tnLst>
+  </p:timing>
+</p:sld>
+</file>
+
+<file path=ppt/slides/slide7.xml><?xml version="1.0" encoding="utf-8"?>
+<p:sld xmlns:a="http://schemas.openxmlformats.org/drawingml/2006/main" xmlns:r="http://schemas.openxmlformats.org/officeDocument/2006/relationships" xmlns:p="http://schemas.openxmlformats.org/presentationml/2006/main">
+  <p:cSld>
+    <p:spTree>
+      <p:nvGrpSpPr>
+        <p:cNvPr id="1" name=""/>
+        <p:cNvGrpSpPr/>
+        <p:nvPr/>
+      </p:nvGrpSpPr>
+      <p:grpSpPr>
+        <a:xfrm>
+          <a:off x="0" y="0"/>
+          <a:ext cx="0" cy="0"/>
+          <a:chOff x="0" y="0"/>
+          <a:chExt cx="0" cy="0"/>
+        </a:xfrm>
+      </p:grpSpPr>
       <p:grpSp>
         <p:nvGrpSpPr>
           <p:cNvPr id="48" name="그룹 47"/>
@@ -11424,7 +14196,7 @@
 </p:sld>
 </file>
 
-<file path=ppt/slides/slide6.xml><?xml version="1.0" encoding="utf-8"?>
+<file path=ppt/slides/slide8.xml><?xml version="1.0" encoding="utf-8"?>
 <p:sld xmlns:a="http://schemas.openxmlformats.org/drawingml/2006/main" xmlns:r="http://schemas.openxmlformats.org/officeDocument/2006/relationships" xmlns:p="http://schemas.openxmlformats.org/presentationml/2006/main">
   <p:cSld>
     <p:spTree>

</xml_diff>